<commit_message>
changes to slides 2, 4, 6
</commit_message>
<xml_diff>
--- a/whatscooking.pptx
+++ b/whatscooking.pptx
@@ -6,10 +6,11 @@
   </p:sldMasterIdLst>
   <p:sldIdLst>
     <p:sldId id="256" r:id="rId2"/>
-    <p:sldId id="257" r:id="rId3"/>
+    <p:sldId id="261" r:id="rId3"/>
     <p:sldId id="258" r:id="rId4"/>
-    <p:sldId id="259" r:id="rId5"/>
-    <p:sldId id="260" r:id="rId6"/>
+    <p:sldId id="262" r:id="rId5"/>
+    <p:sldId id="259" r:id="rId6"/>
+    <p:sldId id="263" r:id="rId7"/>
   </p:sldIdLst>
   <p:sldSz cx="12192000" cy="6858000"/>
   <p:notesSz cx="6858000" cy="9144000"/>
@@ -263,7 +264,7 @@
           <a:p>
             <a:fld id="{1EADCE8D-6A8D-4A51-9A58-657A5970637E}" type="datetimeFigureOut">
               <a:rPr lang="ru-RU" smtClean="0"/>
-              <a:t>21.12.2021</a:t>
+              <a:t>22.12.2021</a:t>
             </a:fld>
             <a:endParaRPr lang="ru-RU"/>
           </a:p>
@@ -461,7 +462,7 @@
           <a:p>
             <a:fld id="{1EADCE8D-6A8D-4A51-9A58-657A5970637E}" type="datetimeFigureOut">
               <a:rPr lang="ru-RU" smtClean="0"/>
-              <a:t>21.12.2021</a:t>
+              <a:t>22.12.2021</a:t>
             </a:fld>
             <a:endParaRPr lang="ru-RU"/>
           </a:p>
@@ -669,7 +670,7 @@
           <a:p>
             <a:fld id="{1EADCE8D-6A8D-4A51-9A58-657A5970637E}" type="datetimeFigureOut">
               <a:rPr lang="ru-RU" smtClean="0"/>
-              <a:t>21.12.2021</a:t>
+              <a:t>22.12.2021</a:t>
             </a:fld>
             <a:endParaRPr lang="ru-RU"/>
           </a:p>
@@ -867,7 +868,7 @@
           <a:p>
             <a:fld id="{1EADCE8D-6A8D-4A51-9A58-657A5970637E}" type="datetimeFigureOut">
               <a:rPr lang="ru-RU" smtClean="0"/>
-              <a:t>21.12.2021</a:t>
+              <a:t>22.12.2021</a:t>
             </a:fld>
             <a:endParaRPr lang="ru-RU"/>
           </a:p>
@@ -1142,7 +1143,7 @@
           <a:p>
             <a:fld id="{1EADCE8D-6A8D-4A51-9A58-657A5970637E}" type="datetimeFigureOut">
               <a:rPr lang="ru-RU" smtClean="0"/>
-              <a:t>21.12.2021</a:t>
+              <a:t>22.12.2021</a:t>
             </a:fld>
             <a:endParaRPr lang="ru-RU"/>
           </a:p>
@@ -1407,7 +1408,7 @@
           <a:p>
             <a:fld id="{1EADCE8D-6A8D-4A51-9A58-657A5970637E}" type="datetimeFigureOut">
               <a:rPr lang="ru-RU" smtClean="0"/>
-              <a:t>21.12.2021</a:t>
+              <a:t>22.12.2021</a:t>
             </a:fld>
             <a:endParaRPr lang="ru-RU"/>
           </a:p>
@@ -1819,7 +1820,7 @@
           <a:p>
             <a:fld id="{1EADCE8D-6A8D-4A51-9A58-657A5970637E}" type="datetimeFigureOut">
               <a:rPr lang="ru-RU" smtClean="0"/>
-              <a:t>21.12.2021</a:t>
+              <a:t>22.12.2021</a:t>
             </a:fld>
             <a:endParaRPr lang="ru-RU"/>
           </a:p>
@@ -1960,7 +1961,7 @@
           <a:p>
             <a:fld id="{1EADCE8D-6A8D-4A51-9A58-657A5970637E}" type="datetimeFigureOut">
               <a:rPr lang="ru-RU" smtClean="0"/>
-              <a:t>21.12.2021</a:t>
+              <a:t>22.12.2021</a:t>
             </a:fld>
             <a:endParaRPr lang="ru-RU"/>
           </a:p>
@@ -2073,7 +2074,7 @@
           <a:p>
             <a:fld id="{1EADCE8D-6A8D-4A51-9A58-657A5970637E}" type="datetimeFigureOut">
               <a:rPr lang="ru-RU" smtClean="0"/>
-              <a:t>21.12.2021</a:t>
+              <a:t>22.12.2021</a:t>
             </a:fld>
             <a:endParaRPr lang="ru-RU"/>
           </a:p>
@@ -2384,7 +2385,7 @@
           <a:p>
             <a:fld id="{1EADCE8D-6A8D-4A51-9A58-657A5970637E}" type="datetimeFigureOut">
               <a:rPr lang="ru-RU" smtClean="0"/>
-              <a:t>21.12.2021</a:t>
+              <a:t>22.12.2021</a:t>
             </a:fld>
             <a:endParaRPr lang="ru-RU"/>
           </a:p>
@@ -2672,7 +2673,7 @@
           <a:p>
             <a:fld id="{1EADCE8D-6A8D-4A51-9A58-657A5970637E}" type="datetimeFigureOut">
               <a:rPr lang="ru-RU" smtClean="0"/>
-              <a:t>21.12.2021</a:t>
+              <a:t>22.12.2021</a:t>
             </a:fld>
             <a:endParaRPr lang="ru-RU"/>
           </a:p>
@@ -2913,7 +2914,7 @@
           <a:p>
             <a:fld id="{1EADCE8D-6A8D-4A51-9A58-657A5970637E}" type="datetimeFigureOut">
               <a:rPr lang="ru-RU" smtClean="0"/>
-              <a:t>21.12.2021</a:t>
+              <a:t>22.12.2021</a:t>
             </a:fld>
             <a:endParaRPr lang="ru-RU"/>
           </a:p>
@@ -3653,8 +3654,8 @@
         </p:nvSpPr>
         <p:spPr>
           <a:xfrm>
-            <a:off x="2272682" y="365125"/>
-            <a:ext cx="9081117" cy="1325563"/>
+            <a:off x="2290438" y="307952"/>
+            <a:ext cx="4512939" cy="1325563"/>
           </a:xfrm>
         </p:spPr>
         <p:txBody>
@@ -3731,8 +3732,8 @@
         </p:nvSpPr>
         <p:spPr>
           <a:xfrm flipH="1">
-            <a:off x="414044" y="1766657"/>
-            <a:ext cx="11357745" cy="2523768"/>
+            <a:off x="414044" y="1793290"/>
+            <a:ext cx="6608192" cy="2246769"/>
           </a:xfrm>
           <a:prstGeom prst="rect">
             <a:avLst/>
@@ -3816,6 +3817,23 @@
               </a:rPr>
               <a:t>(target)</a:t>
             </a:r>
+            <a:r>
+              <a:rPr lang="ru-RU" dirty="0">
+                <a:solidFill>
+                  <a:schemeClr val="accent2">
+                    <a:lumMod val="50000"/>
+                  </a:schemeClr>
+                </a:solidFill>
+              </a:rPr>
+              <a:t> </a:t>
+            </a:r>
+            <a:endParaRPr lang="en-US" dirty="0">
+              <a:solidFill>
+                <a:schemeClr val="accent2">
+                  <a:lumMod val="50000"/>
+                </a:schemeClr>
+              </a:solidFill>
+            </a:endParaRPr>
           </a:p>
           <a:p>
             <a:endParaRPr lang="ru-RU" sz="1400" dirty="0">
@@ -3827,6 +3845,58 @@
             </a:endParaRPr>
           </a:p>
           <a:p>
+            <a:r>
+              <a:rPr lang="en-US" u="sng" dirty="0">
+                <a:solidFill>
+                  <a:schemeClr val="accent2">
+                    <a:lumMod val="50000"/>
+                  </a:schemeClr>
+                </a:solidFill>
+              </a:rPr>
+              <a:t>Test set:</a:t>
+            </a:r>
+          </a:p>
+          <a:p>
+            <a:r>
+              <a:rPr lang="en-US" dirty="0">
+                <a:solidFill>
+                  <a:schemeClr val="accent2">
+                    <a:lumMod val="50000"/>
+                  </a:schemeClr>
+                </a:solidFill>
+              </a:rPr>
+              <a:t>9944 </a:t>
+            </a:r>
+            <a:r>
+              <a:rPr lang="ru-RU" dirty="0">
+                <a:solidFill>
+                  <a:schemeClr val="accent2">
+                    <a:lumMod val="50000"/>
+                  </a:schemeClr>
+                </a:solidFill>
+              </a:rPr>
+              <a:t>объектов, включающих от 1 до</a:t>
+            </a:r>
+            <a:r>
+              <a:rPr lang="en-US" dirty="0">
+                <a:solidFill>
+                  <a:schemeClr val="accent2">
+                    <a:lumMod val="50000"/>
+                  </a:schemeClr>
+                </a:solidFill>
+              </a:rPr>
+              <a:t> 50</a:t>
+            </a:r>
+            <a:r>
+              <a:rPr lang="ru-RU" dirty="0">
+                <a:solidFill>
+                  <a:schemeClr val="accent2">
+                    <a:lumMod val="50000"/>
+                  </a:schemeClr>
+                </a:solidFill>
+              </a:rPr>
+              <a:t> ингредиентов</a:t>
+            </a:r>
             <a:endParaRPr lang="en-US" dirty="0">
               <a:solidFill>
                 <a:schemeClr val="accent2">
@@ -3845,7 +3915,37 @@
             </a:endParaRPr>
           </a:p>
           <a:p>
-            <a:endParaRPr lang="ru-RU" dirty="0">
+            <a:r>
+              <a:rPr lang="ru-RU" u="sng" dirty="0">
+                <a:solidFill>
+                  <a:schemeClr val="accent2">
+                    <a:lumMod val="50000"/>
+                  </a:schemeClr>
+                </a:solidFill>
+              </a:rPr>
+              <a:t>Задача:</a:t>
+            </a:r>
+            <a:r>
+              <a:rPr lang="ru-RU" dirty="0">
+                <a:solidFill>
+                  <a:schemeClr val="accent2">
+                    <a:lumMod val="50000"/>
+                  </a:schemeClr>
+                </a:solidFill>
+              </a:rPr>
+              <a:t> максимизация </a:t>
+            </a:r>
+            <a:r>
+              <a:rPr lang="en-US" b="1" dirty="0">
+                <a:solidFill>
+                  <a:schemeClr val="accent2">
+                    <a:lumMod val="50000"/>
+                  </a:schemeClr>
+                </a:solidFill>
+              </a:rPr>
+              <a:t>accuracy</a:t>
+            </a:r>
+            <a:endParaRPr lang="en-US" b="1" u="sng" dirty="0">
               <a:solidFill>
                 <a:schemeClr val="accent2">
                   <a:lumMod val="50000"/>
@@ -3853,1055 +3953,8 @@
               </a:solidFill>
             </a:endParaRPr>
           </a:p>
-          <a:p>
-            <a:r>
-              <a:rPr lang="en-US" u="sng" dirty="0">
-                <a:solidFill>
-                  <a:schemeClr val="accent2">
-                    <a:lumMod val="50000"/>
-                  </a:schemeClr>
-                </a:solidFill>
-              </a:rPr>
-              <a:t>Test set:</a:t>
-            </a:r>
-          </a:p>
-          <a:p>
-            <a:r>
-              <a:rPr lang="en-US" dirty="0">
-                <a:solidFill>
-                  <a:schemeClr val="accent2">
-                    <a:lumMod val="50000"/>
-                  </a:schemeClr>
-                </a:solidFill>
-              </a:rPr>
-              <a:t>9944 </a:t>
-            </a:r>
-            <a:r>
-              <a:rPr lang="ru-RU" dirty="0">
-                <a:solidFill>
-                  <a:schemeClr val="accent2">
-                    <a:lumMod val="50000"/>
-                  </a:schemeClr>
-                </a:solidFill>
-              </a:rPr>
-              <a:t>объектов, включающих от 1 до</a:t>
-            </a:r>
-            <a:r>
-              <a:rPr lang="en-US" dirty="0">
-                <a:solidFill>
-                  <a:schemeClr val="accent2">
-                    <a:lumMod val="50000"/>
-                  </a:schemeClr>
-                </a:solidFill>
-              </a:rPr>
-              <a:t> 50</a:t>
-            </a:r>
-            <a:r>
-              <a:rPr lang="ru-RU" dirty="0">
-                <a:solidFill>
-                  <a:schemeClr val="accent2">
-                    <a:lumMod val="50000"/>
-                  </a:schemeClr>
-                </a:solidFill>
-              </a:rPr>
-              <a:t> ингредиентов</a:t>
-            </a:r>
-            <a:endParaRPr lang="en-US" dirty="0">
-              <a:solidFill>
-                <a:schemeClr val="accent2">
-                  <a:lumMod val="50000"/>
-                </a:schemeClr>
-              </a:solidFill>
-            </a:endParaRPr>
-          </a:p>
         </p:txBody>
       </p:sp>
-      <p:graphicFrame>
-        <p:nvGraphicFramePr>
-          <p:cNvPr id="9" name="Таблица 9">
-            <a:extLst>
-              <a:ext uri="{FF2B5EF4-FFF2-40B4-BE49-F238E27FC236}">
-                <a16:creationId xmlns:a16="http://schemas.microsoft.com/office/drawing/2014/main" id="{EC92E363-BB0A-42AE-98F3-2BFAFD6D4941}"/>
-              </a:ext>
-            </a:extLst>
-          </p:cNvPr>
-          <p:cNvGraphicFramePr>
-            <a:graphicFrameLocks noGrp="1"/>
-          </p:cNvGraphicFramePr>
-          <p:nvPr>
-            <p:extLst>
-              <p:ext uri="{D42A27DB-BD31-4B8C-83A1-F6EECF244321}">
-                <p14:modId xmlns:p14="http://schemas.microsoft.com/office/powerpoint/2010/main" val="3445411744"/>
-              </p:ext>
-            </p:extLst>
-          </p:nvPr>
-        </p:nvGraphicFramePr>
-        <p:xfrm>
-          <a:off x="414044" y="2685939"/>
-          <a:ext cx="9312676" cy="822960"/>
-        </p:xfrm>
-        <a:graphic>
-          <a:graphicData uri="http://schemas.openxmlformats.org/drawingml/2006/table">
-            <a:tbl>
-              <a:tblPr firstRow="1" bandRow="1">
-                <a:tableStyleId>{5C22544A-7EE6-4342-B048-85BDC9FD1C3A}</a:tableStyleId>
-              </a:tblPr>
-              <a:tblGrid>
-                <a:gridCol w="843379">
-                  <a:extLst>
-                    <a:ext uri="{9D8B030D-6E8A-4147-A177-3AD203B41FA5}">
-                      <a16:colId xmlns:a16="http://schemas.microsoft.com/office/drawing/2014/main" val="1187419367"/>
-                    </a:ext>
-                  </a:extLst>
-                </a:gridCol>
-                <a:gridCol w="8469297">
-                  <a:extLst>
-                    <a:ext uri="{9D8B030D-6E8A-4147-A177-3AD203B41FA5}">
-                      <a16:colId xmlns:a16="http://schemas.microsoft.com/office/drawing/2014/main" val="3380421931"/>
-                    </a:ext>
-                  </a:extLst>
-                </a:gridCol>
-              </a:tblGrid>
-              <a:tr h="293347">
-                <a:tc>
-                  <a:txBody>
-                    <a:bodyPr/>
-                    <a:lstStyle/>
-                    <a:p>
-                      <a:r>
-                        <a:rPr lang="en-US" sz="1400" b="1" dirty="0" err="1">
-                          <a:solidFill>
-                            <a:schemeClr val="accent2">
-                              <a:lumMod val="50000"/>
-                            </a:schemeClr>
-                          </a:solidFill>
-                          <a:latin typeface="+mn-lt"/>
-                        </a:rPr>
-                        <a:t>russian</a:t>
-                      </a:r>
-                      <a:endParaRPr lang="ru-RU" sz="1400" b="1" dirty="0">
-                        <a:solidFill>
-                          <a:schemeClr val="accent2">
-                            <a:lumMod val="50000"/>
-                          </a:schemeClr>
-                        </a:solidFill>
-                        <a:latin typeface="+mn-lt"/>
-                      </a:endParaRPr>
-                    </a:p>
-                  </a:txBody>
-                  <a:tcPr>
-                    <a:noFill/>
-                  </a:tcPr>
-                </a:tc>
-                <a:tc>
-                  <a:txBody>
-                    <a:bodyPr/>
-                    <a:lstStyle/>
-                    <a:p>
-                      <a:pPr marL="0" marR="0" lvl="0" indent="0" algn="l" defTabSz="914400" rtl="0" eaLnBrk="1" fontAlgn="auto" latinLnBrk="0" hangingPunct="1">
-                        <a:lnSpc>
-                          <a:spcPct val="100000"/>
-                        </a:lnSpc>
-                        <a:spcBef>
-                          <a:spcPts val="0"/>
-                        </a:spcBef>
-                        <a:spcAft>
-                          <a:spcPts val="0"/>
-                        </a:spcAft>
-                        <a:buClrTx/>
-                        <a:buSzTx/>
-                        <a:buFontTx/>
-                        <a:buNone/>
-                        <a:tabLst/>
-                        <a:defRPr/>
-                      </a:pPr>
-                      <a:r>
-                        <a:rPr lang="en-US" sz="1400" b="0" dirty="0">
-                          <a:solidFill>
-                            <a:schemeClr val="accent2">
-                              <a:lumMod val="50000"/>
-                            </a:schemeClr>
-                          </a:solidFill>
-                          <a:latin typeface="+mn-lt"/>
-                        </a:rPr>
-                        <a:t>potatoes, onions, butter, bacon, mozzarella cheese, cream cheese</a:t>
-                      </a:r>
-                    </a:p>
-                  </a:txBody>
-                  <a:tcPr>
-                    <a:noFill/>
-                  </a:tcPr>
-                </a:tc>
-                <a:extLst>
-                  <a:ext uri="{0D108BD9-81ED-4DB2-BD59-A6C34878D82A}">
-                    <a16:rowId xmlns:a16="http://schemas.microsoft.com/office/drawing/2014/main" val="4212422613"/>
-                  </a:ext>
-                </a:extLst>
-              </a:tr>
-              <a:tr h="498689">
-                <a:tc>
-                  <a:txBody>
-                    <a:bodyPr/>
-                    <a:lstStyle/>
-                    <a:p>
-                      <a:r>
-                        <a:rPr lang="en-US" sz="1400" b="1" dirty="0" err="1">
-                          <a:solidFill>
-                            <a:schemeClr val="accent2">
-                              <a:lumMod val="50000"/>
-                            </a:schemeClr>
-                          </a:solidFill>
-                          <a:latin typeface="+mn-lt"/>
-                        </a:rPr>
-                        <a:t>greek</a:t>
-                      </a:r>
-                      <a:endParaRPr lang="ru-RU" sz="1400" b="1" dirty="0">
-                        <a:solidFill>
-                          <a:schemeClr val="accent2">
-                            <a:lumMod val="50000"/>
-                          </a:schemeClr>
-                        </a:solidFill>
-                        <a:latin typeface="+mn-lt"/>
-                      </a:endParaRPr>
-                    </a:p>
-                  </a:txBody>
-                  <a:tcPr>
-                    <a:noFill/>
-                  </a:tcPr>
-                </a:tc>
-                <a:tc>
-                  <a:txBody>
-                    <a:bodyPr/>
-                    <a:lstStyle/>
-                    <a:p>
-                      <a:pPr marL="0" marR="0" lvl="0" indent="0" algn="l" defTabSz="914400" rtl="0" eaLnBrk="1" fontAlgn="auto" latinLnBrk="0" hangingPunct="1">
-                        <a:lnSpc>
-                          <a:spcPct val="100000"/>
-                        </a:lnSpc>
-                        <a:spcBef>
-                          <a:spcPts val="0"/>
-                        </a:spcBef>
-                        <a:spcAft>
-                          <a:spcPts val="0"/>
-                        </a:spcAft>
-                        <a:buClrTx/>
-                        <a:buSzTx/>
-                        <a:buFontTx/>
-                        <a:buNone/>
-                        <a:tabLst/>
-                        <a:defRPr/>
-                      </a:pPr>
-                      <a:r>
-                        <a:rPr kumimoji="0" lang="ru-RU" altLang="ru-RU" sz="1400" b="0" i="0" u="none" strike="noStrike" cap="none" normalizeH="0" baseline="0" dirty="0" err="1">
-                          <a:ln>
-                            <a:noFill/>
-                          </a:ln>
-                          <a:solidFill>
-                            <a:schemeClr val="accent2">
-                              <a:lumMod val="50000"/>
-                            </a:schemeClr>
-                          </a:solidFill>
-                          <a:effectLst/>
-                          <a:latin typeface="+mn-lt"/>
-                        </a:rPr>
-                        <a:t>olive</a:t>
-                      </a:r>
-                      <a:r>
-                        <a:rPr kumimoji="0" lang="ru-RU" altLang="ru-RU" sz="1400" b="0" i="0" u="none" strike="noStrike" cap="none" normalizeH="0" baseline="0" dirty="0">
-                          <a:ln>
-                            <a:noFill/>
-                          </a:ln>
-                          <a:solidFill>
-                            <a:schemeClr val="accent2">
-                              <a:lumMod val="50000"/>
-                            </a:schemeClr>
-                          </a:solidFill>
-                          <a:effectLst/>
-                          <a:latin typeface="+mn-lt"/>
-                        </a:rPr>
-                        <a:t> </a:t>
-                      </a:r>
-                      <a:r>
-                        <a:rPr kumimoji="0" lang="ru-RU" altLang="ru-RU" sz="1400" b="0" i="0" u="none" strike="noStrike" cap="none" normalizeH="0" baseline="0" dirty="0" err="1">
-                          <a:ln>
-                            <a:noFill/>
-                          </a:ln>
-                          <a:solidFill>
-                            <a:schemeClr val="accent2">
-                              <a:lumMod val="50000"/>
-                            </a:schemeClr>
-                          </a:solidFill>
-                          <a:effectLst/>
-                          <a:latin typeface="+mn-lt"/>
-                        </a:rPr>
-                        <a:t>oil</a:t>
-                      </a:r>
-                      <a:r>
-                        <a:rPr kumimoji="0" lang="ru-RU" altLang="ru-RU" sz="1400" b="0" i="0" u="none" strike="noStrike" cap="none" normalizeH="0" baseline="0" dirty="0">
-                          <a:ln>
-                            <a:noFill/>
-                          </a:ln>
-                          <a:solidFill>
-                            <a:schemeClr val="accent2">
-                              <a:lumMod val="50000"/>
-                            </a:schemeClr>
-                          </a:solidFill>
-                          <a:effectLst/>
-                          <a:latin typeface="+mn-lt"/>
-                        </a:rPr>
-                        <a:t>, </a:t>
-                      </a:r>
-                      <a:r>
-                        <a:rPr kumimoji="0" lang="ru-RU" altLang="ru-RU" sz="1400" b="0" i="0" u="none" strike="noStrike" cap="none" normalizeH="0" baseline="0" dirty="0" err="1">
-                          <a:ln>
-                            <a:noFill/>
-                          </a:ln>
-                          <a:solidFill>
-                            <a:schemeClr val="accent2">
-                              <a:lumMod val="50000"/>
-                            </a:schemeClr>
-                          </a:solidFill>
-                          <a:effectLst/>
-                          <a:latin typeface="+mn-lt"/>
-                        </a:rPr>
-                        <a:t>chopped</a:t>
-                      </a:r>
-                      <a:r>
-                        <a:rPr kumimoji="0" lang="ru-RU" altLang="ru-RU" sz="1400" b="0" i="0" u="none" strike="noStrike" cap="none" normalizeH="0" baseline="0" dirty="0">
-                          <a:ln>
-                            <a:noFill/>
-                          </a:ln>
-                          <a:solidFill>
-                            <a:schemeClr val="accent2">
-                              <a:lumMod val="50000"/>
-                            </a:schemeClr>
-                          </a:solidFill>
-                          <a:effectLst/>
-                          <a:latin typeface="+mn-lt"/>
-                        </a:rPr>
-                        <a:t> </a:t>
-                      </a:r>
-                      <a:r>
-                        <a:rPr kumimoji="0" lang="ru-RU" altLang="ru-RU" sz="1400" b="0" i="0" u="none" strike="noStrike" cap="none" normalizeH="0" baseline="0" dirty="0" err="1">
-                          <a:ln>
-                            <a:noFill/>
-                          </a:ln>
-                          <a:solidFill>
-                            <a:schemeClr val="accent2">
-                              <a:lumMod val="50000"/>
-                            </a:schemeClr>
-                          </a:solidFill>
-                          <a:effectLst/>
-                          <a:latin typeface="+mn-lt"/>
-                        </a:rPr>
-                        <a:t>onion</a:t>
-                      </a:r>
-                      <a:r>
-                        <a:rPr kumimoji="0" lang="ru-RU" altLang="ru-RU" sz="1400" b="0" i="0" u="none" strike="noStrike" cap="none" normalizeH="0" baseline="0" dirty="0">
-                          <a:ln>
-                            <a:noFill/>
-                          </a:ln>
-                          <a:solidFill>
-                            <a:schemeClr val="accent2">
-                              <a:lumMod val="50000"/>
-                            </a:schemeClr>
-                          </a:solidFill>
-                          <a:effectLst/>
-                          <a:latin typeface="+mn-lt"/>
-                        </a:rPr>
-                        <a:t>, </a:t>
-                      </a:r>
-                      <a:r>
-                        <a:rPr kumimoji="0" lang="ru-RU" altLang="ru-RU" sz="1400" b="0" i="0" u="none" strike="noStrike" cap="none" normalizeH="0" baseline="0" dirty="0" err="1">
-                          <a:ln>
-                            <a:noFill/>
-                          </a:ln>
-                          <a:solidFill>
-                            <a:schemeClr val="accent2">
-                              <a:lumMod val="50000"/>
-                            </a:schemeClr>
-                          </a:solidFill>
-                          <a:effectLst/>
-                          <a:latin typeface="+mn-lt"/>
-                        </a:rPr>
-                        <a:t>fresh</a:t>
-                      </a:r>
-                      <a:r>
-                        <a:rPr kumimoji="0" lang="ru-RU" altLang="ru-RU" sz="1400" b="0" i="0" u="none" strike="noStrike" cap="none" normalizeH="0" baseline="0" dirty="0">
-                          <a:ln>
-                            <a:noFill/>
-                          </a:ln>
-                          <a:solidFill>
-                            <a:schemeClr val="accent2">
-                              <a:lumMod val="50000"/>
-                            </a:schemeClr>
-                          </a:solidFill>
-                          <a:effectLst/>
-                          <a:latin typeface="+mn-lt"/>
-                        </a:rPr>
-                        <a:t> </a:t>
-                      </a:r>
-                      <a:r>
-                        <a:rPr kumimoji="0" lang="ru-RU" altLang="ru-RU" sz="1400" b="0" i="0" u="none" strike="noStrike" cap="none" normalizeH="0" baseline="0" dirty="0" err="1">
-                          <a:ln>
-                            <a:noFill/>
-                          </a:ln>
-                          <a:solidFill>
-                            <a:schemeClr val="accent2">
-                              <a:lumMod val="50000"/>
-                            </a:schemeClr>
-                          </a:solidFill>
-                          <a:effectLst/>
-                          <a:latin typeface="+mn-lt"/>
-                        </a:rPr>
-                        <a:t>parsley</a:t>
-                      </a:r>
-                      <a:r>
-                        <a:rPr kumimoji="0" lang="ru-RU" altLang="ru-RU" sz="1400" b="0" i="0" u="none" strike="noStrike" cap="none" normalizeH="0" baseline="0" dirty="0">
-                          <a:ln>
-                            <a:noFill/>
-                          </a:ln>
-                          <a:solidFill>
-                            <a:schemeClr val="accent2">
-                              <a:lumMod val="50000"/>
-                            </a:schemeClr>
-                          </a:solidFill>
-                          <a:effectLst/>
-                          <a:latin typeface="+mn-lt"/>
-                        </a:rPr>
-                        <a:t>, </a:t>
-                      </a:r>
-                      <a:r>
-                        <a:rPr kumimoji="0" lang="ru-RU" altLang="ru-RU" sz="1400" b="0" i="0" u="none" strike="noStrike" cap="none" normalizeH="0" baseline="0" dirty="0" err="1">
-                          <a:ln>
-                            <a:noFill/>
-                          </a:ln>
-                          <a:solidFill>
-                            <a:schemeClr val="accent2">
-                              <a:lumMod val="50000"/>
-                            </a:schemeClr>
-                          </a:solidFill>
-                          <a:effectLst/>
-                          <a:latin typeface="+mn-lt"/>
-                        </a:rPr>
-                        <a:t>white</a:t>
-                      </a:r>
-                      <a:r>
-                        <a:rPr kumimoji="0" lang="ru-RU" altLang="ru-RU" sz="1400" b="0" i="0" u="none" strike="noStrike" cap="none" normalizeH="0" baseline="0" dirty="0">
-                          <a:ln>
-                            <a:noFill/>
-                          </a:ln>
-                          <a:solidFill>
-                            <a:schemeClr val="accent2">
-                              <a:lumMod val="50000"/>
-                            </a:schemeClr>
-                          </a:solidFill>
-                          <a:effectLst/>
-                          <a:latin typeface="+mn-lt"/>
-                        </a:rPr>
-                        <a:t> </a:t>
-                      </a:r>
-                      <a:r>
-                        <a:rPr kumimoji="0" lang="ru-RU" altLang="ru-RU" sz="1400" b="0" i="0" u="none" strike="noStrike" cap="none" normalizeH="0" baseline="0" dirty="0" err="1">
-                          <a:ln>
-                            <a:noFill/>
-                          </a:ln>
-                          <a:solidFill>
-                            <a:schemeClr val="accent2">
-                              <a:lumMod val="50000"/>
-                            </a:schemeClr>
-                          </a:solidFill>
-                          <a:effectLst/>
-                          <a:latin typeface="+mn-lt"/>
-                        </a:rPr>
-                        <a:t>bread</a:t>
-                      </a:r>
-                      <a:r>
-                        <a:rPr kumimoji="0" lang="ru-RU" altLang="ru-RU" sz="1400" b="0" i="0" u="none" strike="noStrike" cap="none" normalizeH="0" baseline="0" dirty="0">
-                          <a:ln>
-                            <a:noFill/>
-                          </a:ln>
-                          <a:solidFill>
-                            <a:schemeClr val="accent2">
-                              <a:lumMod val="50000"/>
-                            </a:schemeClr>
-                          </a:solidFill>
-                          <a:effectLst/>
-                          <a:latin typeface="+mn-lt"/>
-                        </a:rPr>
-                        <a:t>, </a:t>
-                      </a:r>
-                      <a:r>
-                        <a:rPr kumimoji="0" lang="ru-RU" altLang="ru-RU" sz="1400" b="0" i="0" u="none" strike="noStrike" cap="none" normalizeH="0" baseline="0" dirty="0" err="1">
-                          <a:ln>
-                            <a:noFill/>
-                          </a:ln>
-                          <a:solidFill>
-                            <a:schemeClr val="accent2">
-                              <a:lumMod val="50000"/>
-                            </a:schemeClr>
-                          </a:solidFill>
-                          <a:effectLst/>
-                          <a:latin typeface="+mn-lt"/>
-                        </a:rPr>
-                        <a:t>red</a:t>
-                      </a:r>
-                      <a:r>
-                        <a:rPr kumimoji="0" lang="ru-RU" altLang="ru-RU" sz="1400" b="0" i="0" u="none" strike="noStrike" cap="none" normalizeH="0" baseline="0" dirty="0">
-                          <a:ln>
-                            <a:noFill/>
-                          </a:ln>
-                          <a:solidFill>
-                            <a:schemeClr val="accent2">
-                              <a:lumMod val="50000"/>
-                            </a:schemeClr>
-                          </a:solidFill>
-                          <a:effectLst/>
-                          <a:latin typeface="+mn-lt"/>
-                        </a:rPr>
-                        <a:t> </a:t>
-                      </a:r>
-                      <a:r>
-                        <a:rPr kumimoji="0" lang="ru-RU" altLang="ru-RU" sz="1400" b="0" i="0" u="none" strike="noStrike" cap="none" normalizeH="0" baseline="0" dirty="0" err="1">
-                          <a:ln>
-                            <a:noFill/>
-                          </a:ln>
-                          <a:solidFill>
-                            <a:schemeClr val="accent2">
-                              <a:lumMod val="50000"/>
-                            </a:schemeClr>
-                          </a:solidFill>
-                          <a:effectLst/>
-                          <a:latin typeface="+mn-lt"/>
-                        </a:rPr>
-                        <a:t>wine</a:t>
-                      </a:r>
-                      <a:r>
-                        <a:rPr kumimoji="0" lang="ru-RU" altLang="ru-RU" sz="1400" b="0" i="0" u="none" strike="noStrike" cap="none" normalizeH="0" baseline="0" dirty="0">
-                          <a:ln>
-                            <a:noFill/>
-                          </a:ln>
-                          <a:solidFill>
-                            <a:schemeClr val="accent2">
-                              <a:lumMod val="50000"/>
-                            </a:schemeClr>
-                          </a:solidFill>
-                          <a:effectLst/>
-                          <a:latin typeface="+mn-lt"/>
-                        </a:rPr>
-                        <a:t> </a:t>
-                      </a:r>
-                      <a:r>
-                        <a:rPr kumimoji="0" lang="ru-RU" altLang="ru-RU" sz="1400" b="0" i="0" u="none" strike="noStrike" cap="none" normalizeH="0" baseline="0" dirty="0" err="1">
-                          <a:ln>
-                            <a:noFill/>
-                          </a:ln>
-                          <a:solidFill>
-                            <a:schemeClr val="accent2">
-                              <a:lumMod val="50000"/>
-                            </a:schemeClr>
-                          </a:solidFill>
-                          <a:effectLst/>
-                          <a:latin typeface="+mn-lt"/>
-                        </a:rPr>
-                        <a:t>vinegar</a:t>
-                      </a:r>
-                      <a:r>
-                        <a:rPr kumimoji="0" lang="ru-RU" altLang="ru-RU" sz="1400" b="0" i="0" u="none" strike="noStrike" cap="none" normalizeH="0" baseline="0" dirty="0">
-                          <a:ln>
-                            <a:noFill/>
-                          </a:ln>
-                          <a:solidFill>
-                            <a:schemeClr val="accent2">
-                              <a:lumMod val="50000"/>
-                            </a:schemeClr>
-                          </a:solidFill>
-                          <a:effectLst/>
-                          <a:latin typeface="+mn-lt"/>
-                        </a:rPr>
-                        <a:t>, </a:t>
-                      </a:r>
-                      <a:r>
-                        <a:rPr kumimoji="0" lang="ru-RU" altLang="ru-RU" sz="1400" b="0" i="0" u="none" strike="noStrike" cap="none" normalizeH="0" baseline="0" dirty="0" err="1">
-                          <a:ln>
-                            <a:noFill/>
-                          </a:ln>
-                          <a:solidFill>
-                            <a:schemeClr val="accent2">
-                              <a:lumMod val="50000"/>
-                            </a:schemeClr>
-                          </a:solidFill>
-                          <a:effectLst/>
-                          <a:latin typeface="+mn-lt"/>
-                        </a:rPr>
-                        <a:t>fresh</a:t>
-                      </a:r>
-                      <a:r>
-                        <a:rPr kumimoji="0" lang="ru-RU" altLang="ru-RU" sz="1400" b="0" i="0" u="none" strike="noStrike" cap="none" normalizeH="0" baseline="0" dirty="0">
-                          <a:ln>
-                            <a:noFill/>
-                          </a:ln>
-                          <a:solidFill>
-                            <a:schemeClr val="accent2">
-                              <a:lumMod val="50000"/>
-                            </a:schemeClr>
-                          </a:solidFill>
-                          <a:effectLst/>
-                          <a:latin typeface="+mn-lt"/>
-                        </a:rPr>
-                        <a:t> </a:t>
-                      </a:r>
-                      <a:r>
-                        <a:rPr kumimoji="0" lang="ru-RU" altLang="ru-RU" sz="1400" b="0" i="0" u="none" strike="noStrike" cap="none" normalizeH="0" baseline="0" dirty="0" err="1">
-                          <a:ln>
-                            <a:noFill/>
-                          </a:ln>
-                          <a:solidFill>
-                            <a:schemeClr val="accent2">
-                              <a:lumMod val="50000"/>
-                            </a:schemeClr>
-                          </a:solidFill>
-                          <a:effectLst/>
-                          <a:latin typeface="+mn-lt"/>
-                        </a:rPr>
-                        <a:t>parsley</a:t>
-                      </a:r>
-                      <a:r>
-                        <a:rPr kumimoji="0" lang="ru-RU" altLang="ru-RU" sz="1400" b="0" i="0" u="none" strike="noStrike" cap="none" normalizeH="0" baseline="0" dirty="0">
-                          <a:ln>
-                            <a:noFill/>
-                          </a:ln>
-                          <a:solidFill>
-                            <a:schemeClr val="accent2">
-                              <a:lumMod val="50000"/>
-                            </a:schemeClr>
-                          </a:solidFill>
-                          <a:effectLst/>
-                          <a:latin typeface="+mn-lt"/>
-                        </a:rPr>
-                        <a:t> </a:t>
-                      </a:r>
-                      <a:r>
-                        <a:rPr kumimoji="0" lang="ru-RU" altLang="ru-RU" sz="1400" b="0" i="0" u="none" strike="noStrike" cap="none" normalizeH="0" baseline="0" dirty="0" err="1">
-                          <a:ln>
-                            <a:noFill/>
-                          </a:ln>
-                          <a:solidFill>
-                            <a:schemeClr val="accent2">
-                              <a:lumMod val="50000"/>
-                            </a:schemeClr>
-                          </a:solidFill>
-                          <a:effectLst/>
-                          <a:latin typeface="+mn-lt"/>
-                        </a:rPr>
-                        <a:t>leaves</a:t>
-                      </a:r>
-                      <a:r>
-                        <a:rPr kumimoji="0" lang="ru-RU" altLang="ru-RU" sz="1400" b="0" i="0" u="none" strike="noStrike" cap="none" normalizeH="0" baseline="0" dirty="0">
-                          <a:ln>
-                            <a:noFill/>
-                          </a:ln>
-                          <a:solidFill>
-                            <a:schemeClr val="accent2">
-                              <a:lumMod val="50000"/>
-                            </a:schemeClr>
-                          </a:solidFill>
-                          <a:effectLst/>
-                          <a:latin typeface="+mn-lt"/>
-                        </a:rPr>
-                        <a:t>, </a:t>
-                      </a:r>
-                      <a:r>
-                        <a:rPr kumimoji="0" lang="ru-RU" altLang="ru-RU" sz="1400" b="0" i="0" u="none" strike="noStrike" cap="none" normalizeH="0" baseline="0" dirty="0" err="1">
-                          <a:ln>
-                            <a:noFill/>
-                          </a:ln>
-                          <a:solidFill>
-                            <a:schemeClr val="accent2">
-                              <a:lumMod val="50000"/>
-                            </a:schemeClr>
-                          </a:solidFill>
-                          <a:effectLst/>
-                          <a:latin typeface="+mn-lt"/>
-                        </a:rPr>
-                        <a:t>eggplant</a:t>
-                      </a:r>
-                      <a:r>
-                        <a:rPr kumimoji="0" lang="ru-RU" altLang="ru-RU" sz="1400" b="0" i="0" u="none" strike="noStrike" cap="none" normalizeH="0" baseline="0" dirty="0">
-                          <a:ln>
-                            <a:noFill/>
-                          </a:ln>
-                          <a:solidFill>
-                            <a:schemeClr val="accent2">
-                              <a:lumMod val="50000"/>
-                            </a:schemeClr>
-                          </a:solidFill>
-                          <a:effectLst/>
-                          <a:latin typeface="+mn-lt"/>
-                        </a:rPr>
-                        <a:t>,</a:t>
-                      </a:r>
-                      <a:r>
-                        <a:rPr kumimoji="0" lang="en-US" altLang="ru-RU" sz="1400" b="0" i="0" u="none" strike="noStrike" cap="none" normalizeH="0" baseline="0" dirty="0">
-                          <a:ln>
-                            <a:noFill/>
-                          </a:ln>
-                          <a:solidFill>
-                            <a:schemeClr val="accent2">
-                              <a:lumMod val="50000"/>
-                            </a:schemeClr>
-                          </a:solidFill>
-                          <a:effectLst/>
-                          <a:latin typeface="+mn-lt"/>
-                        </a:rPr>
-                        <a:t> </a:t>
-                      </a:r>
-                      <a:r>
-                        <a:rPr kumimoji="0" lang="ru-RU" altLang="ru-RU" sz="1400" b="0" i="0" u="none" strike="noStrike" cap="none" normalizeH="0" baseline="0" dirty="0" err="1">
-                          <a:ln>
-                            <a:noFill/>
-                          </a:ln>
-                          <a:solidFill>
-                            <a:schemeClr val="accent2">
-                              <a:lumMod val="50000"/>
-                            </a:schemeClr>
-                          </a:solidFill>
-                          <a:effectLst/>
-                          <a:latin typeface="+mn-lt"/>
-                        </a:rPr>
-                        <a:t>garlic</a:t>
-                      </a:r>
-                      <a:r>
-                        <a:rPr kumimoji="0" lang="ru-RU" altLang="ru-RU" sz="1400" b="0" i="0" u="none" strike="noStrike" cap="none" normalizeH="0" baseline="0" dirty="0">
-                          <a:ln>
-                            <a:noFill/>
-                          </a:ln>
-                          <a:solidFill>
-                            <a:schemeClr val="accent2">
-                              <a:lumMod val="50000"/>
-                            </a:schemeClr>
-                          </a:solidFill>
-                          <a:effectLst/>
-                          <a:latin typeface="+mn-lt"/>
-                        </a:rPr>
-                        <a:t> </a:t>
-                      </a:r>
-                      <a:r>
-                        <a:rPr kumimoji="0" lang="ru-RU" altLang="ru-RU" sz="1400" b="0" i="0" u="none" strike="noStrike" cap="none" normalizeH="0" baseline="0" dirty="0" err="1">
-                          <a:ln>
-                            <a:noFill/>
-                          </a:ln>
-                          <a:solidFill>
-                            <a:schemeClr val="accent2">
-                              <a:lumMod val="50000"/>
-                            </a:schemeClr>
-                          </a:solidFill>
-                          <a:effectLst/>
-                          <a:latin typeface="+mn-lt"/>
-                        </a:rPr>
-                        <a:t>cloves</a:t>
-                      </a:r>
-                      <a:r>
-                        <a:rPr kumimoji="0" lang="ru-RU" altLang="ru-RU" sz="1400" b="0" i="0" u="none" strike="noStrike" cap="none" normalizeH="0" baseline="0" dirty="0">
-                          <a:ln>
-                            <a:noFill/>
-                          </a:ln>
-                          <a:solidFill>
-                            <a:schemeClr val="accent2">
-                              <a:lumMod val="50000"/>
-                            </a:schemeClr>
-                          </a:solidFill>
-                          <a:effectLst/>
-                          <a:latin typeface="+mn-lt"/>
-                        </a:rPr>
-                        <a:t>, </a:t>
-                      </a:r>
-                      <a:r>
-                        <a:rPr kumimoji="0" lang="ru-RU" altLang="ru-RU" sz="1400" b="0" i="0" u="none" strike="noStrike" cap="none" normalizeH="0" baseline="0" dirty="0" err="1">
-                          <a:ln>
-                            <a:noFill/>
-                          </a:ln>
-                          <a:solidFill>
-                            <a:schemeClr val="accent2">
-                              <a:lumMod val="50000"/>
-                            </a:schemeClr>
-                          </a:solidFill>
-                          <a:effectLst/>
-                          <a:latin typeface="+mn-lt"/>
-                        </a:rPr>
-                        <a:t>plum</a:t>
-                      </a:r>
-                      <a:r>
-                        <a:rPr kumimoji="0" lang="ru-RU" altLang="ru-RU" sz="1400" b="0" i="0" u="none" strike="noStrike" cap="none" normalizeH="0" baseline="0" dirty="0">
-                          <a:ln>
-                            <a:noFill/>
-                          </a:ln>
-                          <a:solidFill>
-                            <a:schemeClr val="accent2">
-                              <a:lumMod val="50000"/>
-                            </a:schemeClr>
-                          </a:solidFill>
-                          <a:effectLst/>
-                          <a:latin typeface="+mn-lt"/>
-                        </a:rPr>
-                        <a:t> </a:t>
-                      </a:r>
-                      <a:r>
-                        <a:rPr kumimoji="0" lang="ru-RU" altLang="ru-RU" sz="1400" b="0" i="0" u="none" strike="noStrike" cap="none" normalizeH="0" baseline="0" dirty="0" err="1">
-                          <a:ln>
-                            <a:noFill/>
-                          </a:ln>
-                          <a:solidFill>
-                            <a:schemeClr val="accent2">
-                              <a:lumMod val="50000"/>
-                            </a:schemeClr>
-                          </a:solidFill>
-                          <a:effectLst/>
-                          <a:latin typeface="+mn-lt"/>
-                        </a:rPr>
-                        <a:t>tomatoes</a:t>
-                      </a:r>
-                      <a:r>
-                        <a:rPr kumimoji="0" lang="ru-RU" altLang="ru-RU" sz="1400" b="0" i="0" u="none" strike="noStrike" cap="none" normalizeH="0" baseline="0" dirty="0">
-                          <a:ln>
-                            <a:noFill/>
-                          </a:ln>
-                          <a:solidFill>
-                            <a:schemeClr val="accent2">
-                              <a:lumMod val="50000"/>
-                            </a:schemeClr>
-                          </a:solidFill>
-                          <a:effectLst/>
-                          <a:latin typeface="+mn-lt"/>
-                        </a:rPr>
-                        <a:t>, </a:t>
-                      </a:r>
-                      <a:r>
-                        <a:rPr kumimoji="0" lang="ru-RU" altLang="ru-RU" sz="1400" b="0" i="0" u="none" strike="noStrike" cap="none" normalizeH="0" baseline="0" dirty="0" err="1">
-                          <a:ln>
-                            <a:noFill/>
-                          </a:ln>
-                          <a:solidFill>
-                            <a:schemeClr val="accent2">
-                              <a:lumMod val="50000"/>
-                            </a:schemeClr>
-                          </a:solidFill>
-                          <a:effectLst/>
-                          <a:latin typeface="+mn-lt"/>
-                        </a:rPr>
-                        <a:t>whole</a:t>
-                      </a:r>
-                      <a:r>
-                        <a:rPr kumimoji="0" lang="ru-RU" altLang="ru-RU" sz="1400" b="0" i="0" u="none" strike="noStrike" cap="none" normalizeH="0" baseline="0" dirty="0">
-                          <a:ln>
-                            <a:noFill/>
-                          </a:ln>
-                          <a:solidFill>
-                            <a:schemeClr val="accent2">
-                              <a:lumMod val="50000"/>
-                            </a:schemeClr>
-                          </a:solidFill>
-                          <a:effectLst/>
-                          <a:latin typeface="+mn-lt"/>
-                        </a:rPr>
-                        <a:t> </a:t>
-                      </a:r>
-                      <a:r>
-                        <a:rPr kumimoji="0" lang="ru-RU" altLang="ru-RU" sz="1400" b="0" i="0" u="none" strike="noStrike" cap="none" normalizeH="0" baseline="0" dirty="0" err="1">
-                          <a:ln>
-                            <a:noFill/>
-                          </a:ln>
-                          <a:solidFill>
-                            <a:schemeClr val="accent2">
-                              <a:lumMod val="50000"/>
-                            </a:schemeClr>
-                          </a:solidFill>
-                          <a:effectLst/>
-                          <a:latin typeface="+mn-lt"/>
-                        </a:rPr>
-                        <a:t>wheat</a:t>
-                      </a:r>
-                      <a:r>
-                        <a:rPr kumimoji="0" lang="ru-RU" altLang="ru-RU" sz="1400" b="0" i="0" u="none" strike="noStrike" cap="none" normalizeH="0" baseline="0" dirty="0">
-                          <a:ln>
-                            <a:noFill/>
-                          </a:ln>
-                          <a:solidFill>
-                            <a:schemeClr val="accent2">
-                              <a:lumMod val="50000"/>
-                            </a:schemeClr>
-                          </a:solidFill>
-                          <a:effectLst/>
-                          <a:latin typeface="+mn-lt"/>
-                        </a:rPr>
-                        <a:t> </a:t>
-                      </a:r>
-                      <a:r>
-                        <a:rPr kumimoji="0" lang="ru-RU" altLang="ru-RU" sz="1400" b="0" i="0" u="none" strike="noStrike" cap="none" normalizeH="0" baseline="0" dirty="0" err="1">
-                          <a:ln>
-                            <a:noFill/>
-                          </a:ln>
-                          <a:solidFill>
-                            <a:schemeClr val="accent2">
-                              <a:lumMod val="50000"/>
-                            </a:schemeClr>
-                          </a:solidFill>
-                          <a:effectLst/>
-                          <a:latin typeface="+mn-lt"/>
-                        </a:rPr>
-                        <a:t>pita</a:t>
-                      </a:r>
-                      <a:r>
-                        <a:rPr kumimoji="0" lang="ru-RU" altLang="ru-RU" sz="1400" b="0" i="0" u="none" strike="noStrike" cap="none" normalizeH="0" baseline="0" dirty="0">
-                          <a:ln>
-                            <a:noFill/>
-                          </a:ln>
-                          <a:solidFill>
-                            <a:schemeClr val="accent2">
-                              <a:lumMod val="50000"/>
-                            </a:schemeClr>
-                          </a:solidFill>
-                          <a:effectLst/>
-                          <a:latin typeface="+mn-lt"/>
-                        </a:rPr>
-                        <a:t>, </a:t>
-                      </a:r>
-                      <a:r>
-                        <a:rPr kumimoji="0" lang="ru-RU" altLang="ru-RU" sz="1400" b="0" i="0" u="none" strike="noStrike" cap="none" normalizeH="0" baseline="0" dirty="0" err="1">
-                          <a:ln>
-                            <a:noFill/>
-                          </a:ln>
-                          <a:solidFill>
-                            <a:schemeClr val="accent2">
-                              <a:lumMod val="50000"/>
-                            </a:schemeClr>
-                          </a:solidFill>
-                          <a:effectLst/>
-                          <a:latin typeface="+mn-lt"/>
-                        </a:rPr>
-                        <a:t>salt</a:t>
-                      </a:r>
-                      <a:r>
-                        <a:rPr kumimoji="0" lang="ru-RU" altLang="ru-RU" sz="1400" b="0" i="0" u="none" strike="noStrike" cap="none" normalizeH="0" baseline="0" dirty="0">
-                          <a:ln>
-                            <a:noFill/>
-                          </a:ln>
-                          <a:solidFill>
-                            <a:schemeClr val="accent2">
-                              <a:lumMod val="50000"/>
-                            </a:schemeClr>
-                          </a:solidFill>
-                          <a:effectLst/>
-                          <a:latin typeface="+mn-lt"/>
-                        </a:rPr>
-                        <a:t>, </a:t>
-                      </a:r>
-                      <a:r>
-                        <a:rPr kumimoji="0" lang="ru-RU" altLang="ru-RU" sz="1400" b="0" i="0" u="none" strike="noStrike" cap="none" normalizeH="0" baseline="0" dirty="0" err="1">
-                          <a:ln>
-                            <a:noFill/>
-                          </a:ln>
-                          <a:solidFill>
-                            <a:schemeClr val="accent2">
-                              <a:lumMod val="50000"/>
-                            </a:schemeClr>
-                          </a:solidFill>
-                          <a:effectLst/>
-                          <a:latin typeface="+mn-lt"/>
-                        </a:rPr>
-                        <a:t>fresh</a:t>
-                      </a:r>
-                      <a:r>
-                        <a:rPr kumimoji="0" lang="ru-RU" altLang="ru-RU" sz="1400" b="0" i="0" u="none" strike="noStrike" cap="none" normalizeH="0" baseline="0" dirty="0">
-                          <a:ln>
-                            <a:noFill/>
-                          </a:ln>
-                          <a:solidFill>
-                            <a:schemeClr val="accent2">
-                              <a:lumMod val="50000"/>
-                            </a:schemeClr>
-                          </a:solidFill>
-                          <a:effectLst/>
-                          <a:latin typeface="+mn-lt"/>
-                        </a:rPr>
-                        <a:t> </a:t>
-                      </a:r>
-                      <a:r>
-                        <a:rPr kumimoji="0" lang="ru-RU" altLang="ru-RU" sz="1400" b="0" i="0" u="none" strike="noStrike" cap="none" normalizeH="0" baseline="0" dirty="0" err="1">
-                          <a:ln>
-                            <a:noFill/>
-                          </a:ln>
-                          <a:solidFill>
-                            <a:schemeClr val="accent2">
-                              <a:lumMod val="50000"/>
-                            </a:schemeClr>
-                          </a:solidFill>
-                          <a:effectLst/>
-                          <a:latin typeface="+mn-lt"/>
-                        </a:rPr>
-                        <a:t>lemon</a:t>
-                      </a:r>
-                      <a:r>
-                        <a:rPr kumimoji="0" lang="ru-RU" altLang="ru-RU" sz="1400" b="0" i="0" u="none" strike="noStrike" cap="none" normalizeH="0" baseline="0" dirty="0">
-                          <a:ln>
-                            <a:noFill/>
-                          </a:ln>
-                          <a:solidFill>
-                            <a:schemeClr val="accent2">
-                              <a:lumMod val="50000"/>
-                            </a:schemeClr>
-                          </a:solidFill>
-                          <a:effectLst/>
-                          <a:latin typeface="+mn-lt"/>
-                        </a:rPr>
-                        <a:t> </a:t>
-                      </a:r>
-                      <a:r>
-                        <a:rPr kumimoji="0" lang="ru-RU" altLang="ru-RU" sz="1400" b="0" i="0" u="none" strike="noStrike" cap="none" normalizeH="0" baseline="0" dirty="0" err="1">
-                          <a:ln>
-                            <a:noFill/>
-                          </a:ln>
-                          <a:solidFill>
-                            <a:schemeClr val="accent2">
-                              <a:lumMod val="50000"/>
-                            </a:schemeClr>
-                          </a:solidFill>
-                          <a:effectLst/>
-                          <a:latin typeface="+mn-lt"/>
-                        </a:rPr>
-                        <a:t>juice</a:t>
-                      </a:r>
-                      <a:r>
-                        <a:rPr kumimoji="0" lang="ru-RU" altLang="ru-RU" sz="1400" b="0" i="0" u="none" strike="noStrike" cap="none" normalizeH="0" baseline="0" dirty="0">
-                          <a:ln>
-                            <a:noFill/>
-                          </a:ln>
-                          <a:solidFill>
-                            <a:schemeClr val="accent2">
-                              <a:lumMod val="50000"/>
-                            </a:schemeClr>
-                          </a:solidFill>
-                          <a:effectLst/>
-                          <a:latin typeface="+mn-lt"/>
-                        </a:rPr>
-                        <a:t> </a:t>
-                      </a:r>
-                    </a:p>
-                  </a:txBody>
-                  <a:tcPr>
-                    <a:noFill/>
-                  </a:tcPr>
-                </a:tc>
-                <a:extLst>
-                  <a:ext uri="{0D108BD9-81ED-4DB2-BD59-A6C34878D82A}">
-                    <a16:rowId xmlns:a16="http://schemas.microsoft.com/office/drawing/2014/main" val="1277325027"/>
-                  </a:ext>
-                </a:extLst>
-              </a:tr>
-            </a:tbl>
-          </a:graphicData>
-        </a:graphic>
-      </p:graphicFrame>
       <p:sp>
         <p:nvSpPr>
           <p:cNvPr id="10" name="TextBox 9">
@@ -4916,8 +3969,8 @@
         </p:nvSpPr>
         <p:spPr>
           <a:xfrm>
-            <a:off x="380137" y="4764798"/>
-            <a:ext cx="11357745" cy="923330"/>
+            <a:off x="297032" y="4975834"/>
+            <a:ext cx="11492514" cy="1477328"/>
           </a:xfrm>
           <a:prstGeom prst="rect">
             <a:avLst/>
@@ -4938,8 +3991,25 @@
                   </a:schemeClr>
                 </a:solidFill>
               </a:rPr>
-              <a:t>Baseline model</a:t>
-            </a:r>
+              <a:t>Baseline model		</a:t>
+            </a:r>
+            <a:r>
+              <a:rPr lang="en-US" dirty="0">
+                <a:solidFill>
+                  <a:schemeClr val="accent2">
+                    <a:lumMod val="50000"/>
+                  </a:schemeClr>
+                </a:solidFill>
+              </a:rPr>
+              <a:t>Kaggle score: 0.69046</a:t>
+            </a:r>
+            <a:endParaRPr lang="ru-RU" dirty="0">
+              <a:solidFill>
+                <a:schemeClr val="accent2">
+                  <a:lumMod val="50000"/>
+                </a:schemeClr>
+              </a:solidFill>
+            </a:endParaRPr>
           </a:p>
           <a:p>
             <a:endParaRPr lang="en-US" b="1" dirty="0">
@@ -4951,17 +4021,7 @@
             </a:endParaRPr>
           </a:p>
           <a:p>
-            <a:r>
-              <a:rPr lang="en-US" dirty="0">
-                <a:solidFill>
-                  <a:schemeClr val="accent2">
-                    <a:lumMod val="50000"/>
-                  </a:schemeClr>
-                </a:solidFill>
-              </a:rPr>
-              <a:t>Kaggle score: 0.69046</a:t>
-            </a:r>
-            <a:endParaRPr lang="ru-RU" dirty="0">
+            <a:endParaRPr lang="en-US" b="1" dirty="0">
               <a:solidFill>
                 <a:schemeClr val="accent2">
                   <a:lumMod val="50000"/>
@@ -4969,6 +4029,30 @@
               </a:solidFill>
             </a:endParaRPr>
           </a:p>
+          <a:p>
+            <a:r>
+              <a:rPr lang="en-US" b="1" dirty="0">
+                <a:solidFill>
+                  <a:schemeClr val="accent2">
+                    <a:lumMod val="50000"/>
+                  </a:schemeClr>
+                </a:solidFill>
+              </a:rPr>
+              <a:t>-</a:t>
+            </a:r>
+          </a:p>
+          <a:p>
+            <a:r>
+              <a:rPr lang="en-US" b="1" dirty="0">
+                <a:solidFill>
+                  <a:schemeClr val="accent2">
+                    <a:lumMod val="50000"/>
+                  </a:schemeClr>
+                </a:solidFill>
+              </a:rPr>
+              <a:t>-</a:t>
+            </a:r>
+          </a:p>
         </p:txBody>
       </p:sp>
       <p:cxnSp>
@@ -4980,13 +4064,15 @@
               </a:ext>
             </a:extLst>
           </p:cNvPr>
-          <p:cNvCxnSpPr/>
+          <p:cNvCxnSpPr>
+            <a:cxnSpLocks/>
+          </p:cNvCxnSpPr>
           <p:nvPr/>
         </p:nvCxnSpPr>
         <p:spPr>
-          <a:xfrm flipV="1">
-            <a:off x="497150" y="4492101"/>
-            <a:ext cx="11123720" cy="71021"/>
+          <a:xfrm>
+            <a:off x="414043" y="4917379"/>
+            <a:ext cx="11240733" cy="6025"/>
           </a:xfrm>
           <a:prstGeom prst="line">
             <a:avLst/>
@@ -5014,10 +4100,1048 @@
           </a:fontRef>
         </p:style>
       </p:cxnSp>
+      <p:pic>
+        <p:nvPicPr>
+          <p:cNvPr id="11" name="Рисунок 10">
+            <a:extLst>
+              <a:ext uri="{FF2B5EF4-FFF2-40B4-BE49-F238E27FC236}">
+                <a16:creationId xmlns:a16="http://schemas.microsoft.com/office/drawing/2014/main" id="{8DB4113E-8A50-4F56-822F-98E1156086BD}"/>
+              </a:ext>
+            </a:extLst>
+          </p:cNvPr>
+          <p:cNvPicPr>
+            <a:picLocks noChangeAspect="1"/>
+          </p:cNvPicPr>
+          <p:nvPr/>
+        </p:nvPicPr>
+        <p:blipFill>
+          <a:blip r:embed="rId3"/>
+          <a:stretch>
+            <a:fillRect/>
+          </a:stretch>
+        </p:blipFill>
+        <p:spPr>
+          <a:xfrm>
+            <a:off x="6668669" y="1245688"/>
+            <a:ext cx="1601065" cy="3456145"/>
+          </a:xfrm>
+          <a:prstGeom prst="rect">
+            <a:avLst/>
+          </a:prstGeom>
+        </p:spPr>
+      </p:pic>
+      <p:sp>
+        <p:nvSpPr>
+          <p:cNvPr id="13" name="TextBox 12">
+            <a:extLst>
+              <a:ext uri="{FF2B5EF4-FFF2-40B4-BE49-F238E27FC236}">
+                <a16:creationId xmlns:a16="http://schemas.microsoft.com/office/drawing/2014/main" id="{973F43DA-E767-4610-ACC6-B93BAD45E9DA}"/>
+              </a:ext>
+            </a:extLst>
+          </p:cNvPr>
+          <p:cNvSpPr txBox="1"/>
+          <p:nvPr/>
+        </p:nvSpPr>
+        <p:spPr>
+          <a:xfrm>
+            <a:off x="6604986" y="667056"/>
+            <a:ext cx="1979721" cy="523220"/>
+          </a:xfrm>
+          <a:prstGeom prst="rect">
+            <a:avLst/>
+          </a:prstGeom>
+          <a:noFill/>
+        </p:spPr>
+        <p:txBody>
+          <a:bodyPr wrap="square" rtlCol="0">
+            <a:spAutoFit/>
+          </a:bodyPr>
+          <a:lstStyle/>
+          <a:p>
+            <a:r>
+              <a:rPr lang="ru-RU" sz="1400" dirty="0" err="1">
+                <a:solidFill>
+                  <a:schemeClr val="accent2">
+                    <a:lumMod val="50000"/>
+                  </a:schemeClr>
+                </a:solidFill>
+              </a:rPr>
+              <a:t>Датасет</a:t>
+            </a:r>
+            <a:r>
+              <a:rPr lang="ru-RU" sz="1400" dirty="0">
+                <a:solidFill>
+                  <a:schemeClr val="accent2">
+                    <a:lumMod val="50000"/>
+                  </a:schemeClr>
+                </a:solidFill>
+              </a:rPr>
+              <a:t> несбалансированный</a:t>
+            </a:r>
+          </a:p>
+        </p:txBody>
+      </p:sp>
+      <p:sp>
+        <p:nvSpPr>
+          <p:cNvPr id="14" name="Прямоугольник: загнутый угол 13">
+            <a:extLst>
+              <a:ext uri="{FF2B5EF4-FFF2-40B4-BE49-F238E27FC236}">
+                <a16:creationId xmlns:a16="http://schemas.microsoft.com/office/drawing/2014/main" id="{D99B5015-7187-461A-B9FE-E94098311869}"/>
+              </a:ext>
+            </a:extLst>
+          </p:cNvPr>
+          <p:cNvSpPr/>
+          <p:nvPr/>
+        </p:nvSpPr>
+        <p:spPr>
+          <a:xfrm>
+            <a:off x="9250532" y="673935"/>
+            <a:ext cx="2404244" cy="1325563"/>
+          </a:xfrm>
+          <a:prstGeom prst="foldedCorner">
+            <a:avLst/>
+          </a:prstGeom>
+          <a:ln>
+            <a:solidFill>
+              <a:schemeClr val="accent2">
+                <a:lumMod val="50000"/>
+              </a:schemeClr>
+            </a:solidFill>
+          </a:ln>
+        </p:spPr>
+        <p:style>
+          <a:lnRef idx="2">
+            <a:schemeClr val="accent6"/>
+          </a:lnRef>
+          <a:fillRef idx="1">
+            <a:schemeClr val="lt1"/>
+          </a:fillRef>
+          <a:effectRef idx="0">
+            <a:schemeClr val="accent6"/>
+          </a:effectRef>
+          <a:fontRef idx="minor">
+            <a:schemeClr val="dk1"/>
+          </a:fontRef>
+        </p:style>
+        <p:txBody>
+          <a:bodyPr rtlCol="0" anchor="t"/>
+          <a:lstStyle/>
+          <a:p>
+            <a:r>
+              <a:rPr lang="en-US" b="1" dirty="0" err="1">
+                <a:solidFill>
+                  <a:schemeClr val="accent2">
+                    <a:lumMod val="50000"/>
+                  </a:schemeClr>
+                </a:solidFill>
+              </a:rPr>
+              <a:t>russian</a:t>
+            </a:r>
+            <a:endParaRPr lang="en-US" b="1" dirty="0">
+              <a:solidFill>
+                <a:schemeClr val="accent2">
+                  <a:lumMod val="50000"/>
+                </a:schemeClr>
+              </a:solidFill>
+            </a:endParaRPr>
+          </a:p>
+          <a:p>
+            <a:endParaRPr lang="en-US" b="1" dirty="0">
+              <a:solidFill>
+                <a:schemeClr val="accent2">
+                  <a:lumMod val="50000"/>
+                </a:schemeClr>
+              </a:solidFill>
+            </a:endParaRPr>
+          </a:p>
+          <a:p>
+            <a:r>
+              <a:rPr lang="en-US" sz="1400" b="0" dirty="0">
+                <a:solidFill>
+                  <a:schemeClr val="accent2">
+                    <a:lumMod val="50000"/>
+                  </a:schemeClr>
+                </a:solidFill>
+                <a:latin typeface="+mn-lt"/>
+              </a:rPr>
+              <a:t>potatoes, onions, butter, bacon, mozzarella cheese, cream cheese</a:t>
+            </a:r>
+          </a:p>
+        </p:txBody>
+      </p:sp>
+      <p:sp>
+        <p:nvSpPr>
+          <p:cNvPr id="15" name="Прямоугольник: загнутый угол 14">
+            <a:extLst>
+              <a:ext uri="{FF2B5EF4-FFF2-40B4-BE49-F238E27FC236}">
+                <a16:creationId xmlns:a16="http://schemas.microsoft.com/office/drawing/2014/main" id="{1031AE7F-D81A-45CC-80E9-78F4EF7D88F5}"/>
+              </a:ext>
+            </a:extLst>
+          </p:cNvPr>
+          <p:cNvSpPr/>
+          <p:nvPr/>
+        </p:nvSpPr>
+        <p:spPr>
+          <a:xfrm>
+            <a:off x="9250532" y="2437689"/>
+            <a:ext cx="2404244" cy="1983044"/>
+          </a:xfrm>
+          <a:prstGeom prst="foldedCorner">
+            <a:avLst/>
+          </a:prstGeom>
+          <a:ln>
+            <a:solidFill>
+              <a:schemeClr val="accent2">
+                <a:lumMod val="50000"/>
+              </a:schemeClr>
+            </a:solidFill>
+          </a:ln>
+        </p:spPr>
+        <p:style>
+          <a:lnRef idx="2">
+            <a:schemeClr val="accent6"/>
+          </a:lnRef>
+          <a:fillRef idx="1">
+            <a:schemeClr val="lt1"/>
+          </a:fillRef>
+          <a:effectRef idx="0">
+            <a:schemeClr val="accent6"/>
+          </a:effectRef>
+          <a:fontRef idx="minor">
+            <a:schemeClr val="dk1"/>
+          </a:fontRef>
+        </p:style>
+        <p:txBody>
+          <a:bodyPr rtlCol="0" anchor="t"/>
+          <a:lstStyle/>
+          <a:p>
+            <a:r>
+              <a:rPr lang="en-US" b="1" dirty="0" err="1">
+                <a:solidFill>
+                  <a:schemeClr val="accent2">
+                    <a:lumMod val="50000"/>
+                  </a:schemeClr>
+                </a:solidFill>
+              </a:rPr>
+              <a:t>greek</a:t>
+            </a:r>
+            <a:endParaRPr lang="en-US" b="1" dirty="0">
+              <a:solidFill>
+                <a:schemeClr val="accent2">
+                  <a:lumMod val="50000"/>
+                </a:schemeClr>
+              </a:solidFill>
+            </a:endParaRPr>
+          </a:p>
+          <a:p>
+            <a:endParaRPr lang="en-US" b="1" dirty="0">
+              <a:solidFill>
+                <a:schemeClr val="accent2">
+                  <a:lumMod val="50000"/>
+                </a:schemeClr>
+              </a:solidFill>
+            </a:endParaRPr>
+          </a:p>
+          <a:p>
+            <a:r>
+              <a:rPr kumimoji="0" lang="ru-RU" altLang="ru-RU" sz="1400" b="0" i="0" u="none" strike="noStrike" cap="none" normalizeH="0" baseline="0" dirty="0" err="1">
+                <a:ln>
+                  <a:noFill/>
+                </a:ln>
+                <a:solidFill>
+                  <a:schemeClr val="accent2">
+                    <a:lumMod val="50000"/>
+                  </a:schemeClr>
+                </a:solidFill>
+                <a:effectLst/>
+                <a:latin typeface="+mn-lt"/>
+              </a:rPr>
+              <a:t>olive</a:t>
+            </a:r>
+            <a:r>
+              <a:rPr kumimoji="0" lang="ru-RU" altLang="ru-RU" sz="1400" b="0" i="0" u="none" strike="noStrike" cap="none" normalizeH="0" baseline="0" dirty="0">
+                <a:ln>
+                  <a:noFill/>
+                </a:ln>
+                <a:solidFill>
+                  <a:schemeClr val="accent2">
+                    <a:lumMod val="50000"/>
+                  </a:schemeClr>
+                </a:solidFill>
+                <a:effectLst/>
+                <a:latin typeface="+mn-lt"/>
+              </a:rPr>
+              <a:t> </a:t>
+            </a:r>
+            <a:r>
+              <a:rPr kumimoji="0" lang="ru-RU" altLang="ru-RU" sz="1400" b="0" i="0" u="none" strike="noStrike" cap="none" normalizeH="0" baseline="0" dirty="0" err="1">
+                <a:ln>
+                  <a:noFill/>
+                </a:ln>
+                <a:solidFill>
+                  <a:schemeClr val="accent2">
+                    <a:lumMod val="50000"/>
+                  </a:schemeClr>
+                </a:solidFill>
+                <a:effectLst/>
+                <a:latin typeface="+mn-lt"/>
+              </a:rPr>
+              <a:t>oil</a:t>
+            </a:r>
+            <a:r>
+              <a:rPr kumimoji="0" lang="ru-RU" altLang="ru-RU" sz="1400" b="0" i="0" u="none" strike="noStrike" cap="none" normalizeH="0" baseline="0" dirty="0">
+                <a:ln>
+                  <a:noFill/>
+                </a:ln>
+                <a:solidFill>
+                  <a:schemeClr val="accent2">
+                    <a:lumMod val="50000"/>
+                  </a:schemeClr>
+                </a:solidFill>
+                <a:effectLst/>
+                <a:latin typeface="+mn-lt"/>
+              </a:rPr>
+              <a:t>, </a:t>
+            </a:r>
+            <a:r>
+              <a:rPr kumimoji="0" lang="ru-RU" altLang="ru-RU" sz="1400" b="0" i="0" u="none" strike="noStrike" cap="none" normalizeH="0" baseline="0" dirty="0" err="1">
+                <a:ln>
+                  <a:noFill/>
+                </a:ln>
+                <a:solidFill>
+                  <a:schemeClr val="accent2">
+                    <a:lumMod val="50000"/>
+                  </a:schemeClr>
+                </a:solidFill>
+                <a:effectLst/>
+                <a:latin typeface="+mn-lt"/>
+              </a:rPr>
+              <a:t>chopped</a:t>
+            </a:r>
+            <a:r>
+              <a:rPr kumimoji="0" lang="ru-RU" altLang="ru-RU" sz="1400" b="0" i="0" u="none" strike="noStrike" cap="none" normalizeH="0" baseline="0" dirty="0">
+                <a:ln>
+                  <a:noFill/>
+                </a:ln>
+                <a:solidFill>
+                  <a:schemeClr val="accent2">
+                    <a:lumMod val="50000"/>
+                  </a:schemeClr>
+                </a:solidFill>
+                <a:effectLst/>
+                <a:latin typeface="+mn-lt"/>
+              </a:rPr>
+              <a:t> </a:t>
+            </a:r>
+            <a:r>
+              <a:rPr kumimoji="0" lang="ru-RU" altLang="ru-RU" sz="1400" b="0" i="0" u="none" strike="noStrike" cap="none" normalizeH="0" baseline="0" dirty="0" err="1">
+                <a:ln>
+                  <a:noFill/>
+                </a:ln>
+                <a:solidFill>
+                  <a:schemeClr val="accent2">
+                    <a:lumMod val="50000"/>
+                  </a:schemeClr>
+                </a:solidFill>
+                <a:effectLst/>
+                <a:latin typeface="+mn-lt"/>
+              </a:rPr>
+              <a:t>onion</a:t>
+            </a:r>
+            <a:r>
+              <a:rPr kumimoji="0" lang="ru-RU" altLang="ru-RU" sz="1400" b="0" i="0" u="none" strike="noStrike" cap="none" normalizeH="0" baseline="0" dirty="0">
+                <a:ln>
+                  <a:noFill/>
+                </a:ln>
+                <a:solidFill>
+                  <a:schemeClr val="accent2">
+                    <a:lumMod val="50000"/>
+                  </a:schemeClr>
+                </a:solidFill>
+                <a:effectLst/>
+                <a:latin typeface="+mn-lt"/>
+              </a:rPr>
+              <a:t>, </a:t>
+            </a:r>
+            <a:r>
+              <a:rPr kumimoji="0" lang="ru-RU" altLang="ru-RU" sz="1400" b="0" i="0" u="none" strike="noStrike" cap="none" normalizeH="0" baseline="0" dirty="0" err="1">
+                <a:ln>
+                  <a:noFill/>
+                </a:ln>
+                <a:solidFill>
+                  <a:schemeClr val="accent2">
+                    <a:lumMod val="50000"/>
+                  </a:schemeClr>
+                </a:solidFill>
+                <a:effectLst/>
+                <a:latin typeface="+mn-lt"/>
+              </a:rPr>
+              <a:t>fresh</a:t>
+            </a:r>
+            <a:r>
+              <a:rPr kumimoji="0" lang="ru-RU" altLang="ru-RU" sz="1400" b="0" i="0" u="none" strike="noStrike" cap="none" normalizeH="0" baseline="0" dirty="0">
+                <a:ln>
+                  <a:noFill/>
+                </a:ln>
+                <a:solidFill>
+                  <a:schemeClr val="accent2">
+                    <a:lumMod val="50000"/>
+                  </a:schemeClr>
+                </a:solidFill>
+                <a:effectLst/>
+                <a:latin typeface="+mn-lt"/>
+              </a:rPr>
+              <a:t> </a:t>
+            </a:r>
+            <a:r>
+              <a:rPr kumimoji="0" lang="ru-RU" altLang="ru-RU" sz="1400" b="0" i="0" u="none" strike="noStrike" cap="none" normalizeH="0" baseline="0" dirty="0" err="1">
+                <a:ln>
+                  <a:noFill/>
+                </a:ln>
+                <a:solidFill>
+                  <a:schemeClr val="accent2">
+                    <a:lumMod val="50000"/>
+                  </a:schemeClr>
+                </a:solidFill>
+                <a:effectLst/>
+                <a:latin typeface="+mn-lt"/>
+              </a:rPr>
+              <a:t>parsley</a:t>
+            </a:r>
+            <a:r>
+              <a:rPr kumimoji="0" lang="ru-RU" altLang="ru-RU" sz="1400" b="0" i="0" u="none" strike="noStrike" cap="none" normalizeH="0" baseline="0" dirty="0">
+                <a:ln>
+                  <a:noFill/>
+                </a:ln>
+                <a:solidFill>
+                  <a:schemeClr val="accent2">
+                    <a:lumMod val="50000"/>
+                  </a:schemeClr>
+                </a:solidFill>
+                <a:effectLst/>
+                <a:latin typeface="+mn-lt"/>
+              </a:rPr>
+              <a:t>, </a:t>
+            </a:r>
+            <a:r>
+              <a:rPr kumimoji="0" lang="ru-RU" altLang="ru-RU" sz="1400" b="0" i="0" u="none" strike="noStrike" cap="none" normalizeH="0" baseline="0" dirty="0" err="1">
+                <a:ln>
+                  <a:noFill/>
+                </a:ln>
+                <a:solidFill>
+                  <a:schemeClr val="accent2">
+                    <a:lumMod val="50000"/>
+                  </a:schemeClr>
+                </a:solidFill>
+                <a:effectLst/>
+                <a:latin typeface="+mn-lt"/>
+              </a:rPr>
+              <a:t>white</a:t>
+            </a:r>
+            <a:r>
+              <a:rPr kumimoji="0" lang="ru-RU" altLang="ru-RU" sz="1400" b="0" i="0" u="none" strike="noStrike" cap="none" normalizeH="0" baseline="0" dirty="0">
+                <a:ln>
+                  <a:noFill/>
+                </a:ln>
+                <a:solidFill>
+                  <a:schemeClr val="accent2">
+                    <a:lumMod val="50000"/>
+                  </a:schemeClr>
+                </a:solidFill>
+                <a:effectLst/>
+                <a:latin typeface="+mn-lt"/>
+              </a:rPr>
+              <a:t> </a:t>
+            </a:r>
+            <a:r>
+              <a:rPr kumimoji="0" lang="ru-RU" altLang="ru-RU" sz="1400" b="0" i="0" u="none" strike="noStrike" cap="none" normalizeH="0" baseline="0" dirty="0" err="1">
+                <a:ln>
+                  <a:noFill/>
+                </a:ln>
+                <a:solidFill>
+                  <a:schemeClr val="accent2">
+                    <a:lumMod val="50000"/>
+                  </a:schemeClr>
+                </a:solidFill>
+                <a:effectLst/>
+                <a:latin typeface="+mn-lt"/>
+              </a:rPr>
+              <a:t>bread</a:t>
+            </a:r>
+            <a:r>
+              <a:rPr kumimoji="0" lang="ru-RU" altLang="ru-RU" sz="1400" b="0" i="0" u="none" strike="noStrike" cap="none" normalizeH="0" baseline="0" dirty="0">
+                <a:ln>
+                  <a:noFill/>
+                </a:ln>
+                <a:solidFill>
+                  <a:schemeClr val="accent2">
+                    <a:lumMod val="50000"/>
+                  </a:schemeClr>
+                </a:solidFill>
+                <a:effectLst/>
+                <a:latin typeface="+mn-lt"/>
+              </a:rPr>
+              <a:t>, </a:t>
+            </a:r>
+            <a:r>
+              <a:rPr kumimoji="0" lang="ru-RU" altLang="ru-RU" sz="1400" b="0" i="0" u="none" strike="noStrike" cap="none" normalizeH="0" baseline="0" dirty="0" err="1">
+                <a:ln>
+                  <a:noFill/>
+                </a:ln>
+                <a:solidFill>
+                  <a:schemeClr val="accent2">
+                    <a:lumMod val="50000"/>
+                  </a:schemeClr>
+                </a:solidFill>
+                <a:effectLst/>
+                <a:latin typeface="+mn-lt"/>
+              </a:rPr>
+              <a:t>red</a:t>
+            </a:r>
+            <a:r>
+              <a:rPr kumimoji="0" lang="ru-RU" altLang="ru-RU" sz="1400" b="0" i="0" u="none" strike="noStrike" cap="none" normalizeH="0" baseline="0" dirty="0">
+                <a:ln>
+                  <a:noFill/>
+                </a:ln>
+                <a:solidFill>
+                  <a:schemeClr val="accent2">
+                    <a:lumMod val="50000"/>
+                  </a:schemeClr>
+                </a:solidFill>
+                <a:effectLst/>
+                <a:latin typeface="+mn-lt"/>
+              </a:rPr>
+              <a:t> </a:t>
+            </a:r>
+            <a:r>
+              <a:rPr kumimoji="0" lang="ru-RU" altLang="ru-RU" sz="1400" b="0" i="0" u="none" strike="noStrike" cap="none" normalizeH="0" baseline="0" dirty="0" err="1">
+                <a:ln>
+                  <a:noFill/>
+                </a:ln>
+                <a:solidFill>
+                  <a:schemeClr val="accent2">
+                    <a:lumMod val="50000"/>
+                  </a:schemeClr>
+                </a:solidFill>
+                <a:effectLst/>
+                <a:latin typeface="+mn-lt"/>
+              </a:rPr>
+              <a:t>wine</a:t>
+            </a:r>
+            <a:r>
+              <a:rPr kumimoji="0" lang="ru-RU" altLang="ru-RU" sz="1400" b="0" i="0" u="none" strike="noStrike" cap="none" normalizeH="0" baseline="0" dirty="0">
+                <a:ln>
+                  <a:noFill/>
+                </a:ln>
+                <a:solidFill>
+                  <a:schemeClr val="accent2">
+                    <a:lumMod val="50000"/>
+                  </a:schemeClr>
+                </a:solidFill>
+                <a:effectLst/>
+                <a:latin typeface="+mn-lt"/>
+              </a:rPr>
+              <a:t> </a:t>
+            </a:r>
+            <a:r>
+              <a:rPr kumimoji="0" lang="ru-RU" altLang="ru-RU" sz="1400" b="0" i="0" u="none" strike="noStrike" cap="none" normalizeH="0" baseline="0" dirty="0" err="1">
+                <a:ln>
+                  <a:noFill/>
+                </a:ln>
+                <a:solidFill>
+                  <a:schemeClr val="accent2">
+                    <a:lumMod val="50000"/>
+                  </a:schemeClr>
+                </a:solidFill>
+                <a:effectLst/>
+                <a:latin typeface="+mn-lt"/>
+              </a:rPr>
+              <a:t>vinegar</a:t>
+            </a:r>
+            <a:r>
+              <a:rPr kumimoji="0" lang="ru-RU" altLang="ru-RU" sz="1400" b="0" i="0" u="none" strike="noStrike" cap="none" normalizeH="0" baseline="0" dirty="0">
+                <a:ln>
+                  <a:noFill/>
+                </a:ln>
+                <a:solidFill>
+                  <a:schemeClr val="accent2">
+                    <a:lumMod val="50000"/>
+                  </a:schemeClr>
+                </a:solidFill>
+                <a:effectLst/>
+                <a:latin typeface="+mn-lt"/>
+              </a:rPr>
+              <a:t>, </a:t>
+            </a:r>
+            <a:r>
+              <a:rPr kumimoji="0" lang="ru-RU" altLang="ru-RU" sz="1400" b="0" i="0" u="none" strike="noStrike" cap="none" normalizeH="0" baseline="0" dirty="0" err="1">
+                <a:ln>
+                  <a:noFill/>
+                </a:ln>
+                <a:solidFill>
+                  <a:schemeClr val="accent2">
+                    <a:lumMod val="50000"/>
+                  </a:schemeClr>
+                </a:solidFill>
+                <a:effectLst/>
+                <a:latin typeface="+mn-lt"/>
+              </a:rPr>
+              <a:t>fresh</a:t>
+            </a:r>
+            <a:r>
+              <a:rPr kumimoji="0" lang="ru-RU" altLang="ru-RU" sz="1400" b="0" i="0" u="none" strike="noStrike" cap="none" normalizeH="0" baseline="0" dirty="0">
+                <a:ln>
+                  <a:noFill/>
+                </a:ln>
+                <a:solidFill>
+                  <a:schemeClr val="accent2">
+                    <a:lumMod val="50000"/>
+                  </a:schemeClr>
+                </a:solidFill>
+                <a:effectLst/>
+                <a:latin typeface="+mn-lt"/>
+              </a:rPr>
+              <a:t> </a:t>
+            </a:r>
+            <a:r>
+              <a:rPr kumimoji="0" lang="ru-RU" altLang="ru-RU" sz="1400" b="0" i="0" u="none" strike="noStrike" cap="none" normalizeH="0" baseline="0" dirty="0" err="1">
+                <a:ln>
+                  <a:noFill/>
+                </a:ln>
+                <a:solidFill>
+                  <a:schemeClr val="accent2">
+                    <a:lumMod val="50000"/>
+                  </a:schemeClr>
+                </a:solidFill>
+                <a:effectLst/>
+                <a:latin typeface="+mn-lt"/>
+              </a:rPr>
+              <a:t>parsley</a:t>
+            </a:r>
+            <a:r>
+              <a:rPr kumimoji="0" lang="ru-RU" altLang="ru-RU" sz="1400" b="0" i="0" u="none" strike="noStrike" cap="none" normalizeH="0" baseline="0" dirty="0">
+                <a:ln>
+                  <a:noFill/>
+                </a:ln>
+                <a:solidFill>
+                  <a:schemeClr val="accent2">
+                    <a:lumMod val="50000"/>
+                  </a:schemeClr>
+                </a:solidFill>
+                <a:effectLst/>
+                <a:latin typeface="+mn-lt"/>
+              </a:rPr>
+              <a:t> </a:t>
+            </a:r>
+            <a:r>
+              <a:rPr kumimoji="0" lang="ru-RU" altLang="ru-RU" sz="1400" b="0" i="0" u="none" strike="noStrike" cap="none" normalizeH="0" baseline="0" dirty="0" err="1">
+                <a:ln>
+                  <a:noFill/>
+                </a:ln>
+                <a:solidFill>
+                  <a:schemeClr val="accent2">
+                    <a:lumMod val="50000"/>
+                  </a:schemeClr>
+                </a:solidFill>
+                <a:effectLst/>
+                <a:latin typeface="+mn-lt"/>
+              </a:rPr>
+              <a:t>leaves</a:t>
+            </a:r>
+            <a:r>
+              <a:rPr kumimoji="0" lang="ru-RU" altLang="ru-RU" sz="1400" b="0" i="0" u="none" strike="noStrike" cap="none" normalizeH="0" baseline="0" dirty="0">
+                <a:ln>
+                  <a:noFill/>
+                </a:ln>
+                <a:solidFill>
+                  <a:schemeClr val="accent2">
+                    <a:lumMod val="50000"/>
+                  </a:schemeClr>
+                </a:solidFill>
+                <a:effectLst/>
+                <a:latin typeface="+mn-lt"/>
+              </a:rPr>
+              <a:t>, </a:t>
+            </a:r>
+            <a:r>
+              <a:rPr kumimoji="0" lang="ru-RU" altLang="ru-RU" sz="1400" b="0" i="0" u="none" strike="noStrike" cap="none" normalizeH="0" baseline="0" dirty="0" err="1">
+                <a:ln>
+                  <a:noFill/>
+                </a:ln>
+                <a:solidFill>
+                  <a:schemeClr val="accent2">
+                    <a:lumMod val="50000"/>
+                  </a:schemeClr>
+                </a:solidFill>
+                <a:effectLst/>
+                <a:latin typeface="+mn-lt"/>
+              </a:rPr>
+              <a:t>eggplant</a:t>
+            </a:r>
+            <a:r>
+              <a:rPr kumimoji="0" lang="ru-RU" altLang="ru-RU" sz="1400" b="0" i="0" u="none" strike="noStrike" cap="none" normalizeH="0" baseline="0" dirty="0">
+                <a:ln>
+                  <a:noFill/>
+                </a:ln>
+                <a:solidFill>
+                  <a:schemeClr val="accent2">
+                    <a:lumMod val="50000"/>
+                  </a:schemeClr>
+                </a:solidFill>
+                <a:effectLst/>
+                <a:latin typeface="+mn-lt"/>
+              </a:rPr>
+              <a:t>,</a:t>
+            </a:r>
+            <a:r>
+              <a:rPr kumimoji="0" lang="en-US" altLang="ru-RU" sz="1400" b="0" i="0" u="none" strike="noStrike" cap="none" normalizeH="0" baseline="0" dirty="0">
+                <a:ln>
+                  <a:noFill/>
+                </a:ln>
+                <a:solidFill>
+                  <a:schemeClr val="accent2">
+                    <a:lumMod val="50000"/>
+                  </a:schemeClr>
+                </a:solidFill>
+                <a:effectLst/>
+                <a:latin typeface="+mn-lt"/>
+              </a:rPr>
+              <a:t> </a:t>
+            </a:r>
+            <a:r>
+              <a:rPr kumimoji="0" lang="ru-RU" altLang="ru-RU" sz="1400" b="0" i="0" u="none" strike="noStrike" cap="none" normalizeH="0" baseline="0" dirty="0" err="1">
+                <a:ln>
+                  <a:noFill/>
+                </a:ln>
+                <a:solidFill>
+                  <a:schemeClr val="accent2">
+                    <a:lumMod val="50000"/>
+                  </a:schemeClr>
+                </a:solidFill>
+                <a:effectLst/>
+                <a:latin typeface="+mn-lt"/>
+              </a:rPr>
+              <a:t>garlic</a:t>
+            </a:r>
+            <a:r>
+              <a:rPr kumimoji="0" lang="ru-RU" altLang="ru-RU" sz="1400" b="0" i="0" u="none" strike="noStrike" cap="none" normalizeH="0" baseline="0" dirty="0">
+                <a:ln>
+                  <a:noFill/>
+                </a:ln>
+                <a:solidFill>
+                  <a:schemeClr val="accent2">
+                    <a:lumMod val="50000"/>
+                  </a:schemeClr>
+                </a:solidFill>
+                <a:effectLst/>
+                <a:latin typeface="+mn-lt"/>
+              </a:rPr>
+              <a:t> </a:t>
+            </a:r>
+            <a:r>
+              <a:rPr kumimoji="0" lang="ru-RU" altLang="ru-RU" sz="1400" b="0" i="0" u="none" strike="noStrike" cap="none" normalizeH="0" baseline="0" dirty="0" err="1">
+                <a:ln>
+                  <a:noFill/>
+                </a:ln>
+                <a:solidFill>
+                  <a:schemeClr val="accent2">
+                    <a:lumMod val="50000"/>
+                  </a:schemeClr>
+                </a:solidFill>
+                <a:effectLst/>
+                <a:latin typeface="+mn-lt"/>
+              </a:rPr>
+              <a:t>cloves</a:t>
+            </a:r>
+            <a:r>
+              <a:rPr kumimoji="0" lang="ru-RU" altLang="ru-RU" sz="1400" b="0" i="0" u="none" strike="noStrike" cap="none" normalizeH="0" baseline="0" dirty="0">
+                <a:ln>
+                  <a:noFill/>
+                </a:ln>
+                <a:solidFill>
+                  <a:schemeClr val="accent2">
+                    <a:lumMod val="50000"/>
+                  </a:schemeClr>
+                </a:solidFill>
+                <a:effectLst/>
+                <a:latin typeface="+mn-lt"/>
+              </a:rPr>
+              <a:t>, </a:t>
+            </a:r>
+            <a:r>
+              <a:rPr kumimoji="0" lang="ru-RU" altLang="ru-RU" sz="1400" b="0" i="0" u="none" strike="noStrike" cap="none" normalizeH="0" baseline="0" dirty="0" err="1">
+                <a:ln>
+                  <a:noFill/>
+                </a:ln>
+                <a:solidFill>
+                  <a:schemeClr val="accent2">
+                    <a:lumMod val="50000"/>
+                  </a:schemeClr>
+                </a:solidFill>
+                <a:effectLst/>
+                <a:latin typeface="+mn-lt"/>
+              </a:rPr>
+              <a:t>plum</a:t>
+            </a:r>
+            <a:r>
+              <a:rPr kumimoji="0" lang="ru-RU" altLang="ru-RU" sz="1400" b="0" i="0" u="none" strike="noStrike" cap="none" normalizeH="0" baseline="0" dirty="0">
+                <a:ln>
+                  <a:noFill/>
+                </a:ln>
+                <a:solidFill>
+                  <a:schemeClr val="accent2">
+                    <a:lumMod val="50000"/>
+                  </a:schemeClr>
+                </a:solidFill>
+                <a:effectLst/>
+                <a:latin typeface="+mn-lt"/>
+              </a:rPr>
+              <a:t> </a:t>
+            </a:r>
+            <a:r>
+              <a:rPr kumimoji="0" lang="ru-RU" altLang="ru-RU" sz="1400" b="0" i="0" u="none" strike="noStrike" cap="none" normalizeH="0" baseline="0" dirty="0" err="1">
+                <a:ln>
+                  <a:noFill/>
+                </a:ln>
+                <a:solidFill>
+                  <a:schemeClr val="accent2">
+                    <a:lumMod val="50000"/>
+                  </a:schemeClr>
+                </a:solidFill>
+                <a:effectLst/>
+                <a:latin typeface="+mn-lt"/>
+              </a:rPr>
+              <a:t>tomatoes</a:t>
+            </a:r>
+            <a:r>
+              <a:rPr kumimoji="0" lang="ru-RU" altLang="ru-RU" sz="1400" b="0" i="0" u="none" strike="noStrike" cap="none" normalizeH="0" baseline="0" dirty="0">
+                <a:ln>
+                  <a:noFill/>
+                </a:ln>
+                <a:solidFill>
+                  <a:schemeClr val="accent2">
+                    <a:lumMod val="50000"/>
+                  </a:schemeClr>
+                </a:solidFill>
+                <a:effectLst/>
+                <a:latin typeface="+mn-lt"/>
+              </a:rPr>
+              <a:t>, </a:t>
+            </a:r>
+            <a:r>
+              <a:rPr kumimoji="0" lang="ru-RU" altLang="ru-RU" sz="1400" b="0" i="0" u="none" strike="noStrike" cap="none" normalizeH="0" baseline="0" dirty="0" err="1">
+                <a:ln>
+                  <a:noFill/>
+                </a:ln>
+                <a:solidFill>
+                  <a:schemeClr val="accent2">
+                    <a:lumMod val="50000"/>
+                  </a:schemeClr>
+                </a:solidFill>
+                <a:effectLst/>
+                <a:latin typeface="+mn-lt"/>
+              </a:rPr>
+              <a:t>whole</a:t>
+            </a:r>
+            <a:r>
+              <a:rPr kumimoji="0" lang="ru-RU" altLang="ru-RU" sz="1400" b="0" i="0" u="none" strike="noStrike" cap="none" normalizeH="0" baseline="0" dirty="0">
+                <a:ln>
+                  <a:noFill/>
+                </a:ln>
+                <a:solidFill>
+                  <a:schemeClr val="accent2">
+                    <a:lumMod val="50000"/>
+                  </a:schemeClr>
+                </a:solidFill>
+                <a:effectLst/>
+                <a:latin typeface="+mn-lt"/>
+              </a:rPr>
+              <a:t> </a:t>
+            </a:r>
+            <a:r>
+              <a:rPr kumimoji="0" lang="ru-RU" altLang="ru-RU" sz="1400" b="0" i="0" u="none" strike="noStrike" cap="none" normalizeH="0" baseline="0" dirty="0" err="1">
+                <a:ln>
+                  <a:noFill/>
+                </a:ln>
+                <a:solidFill>
+                  <a:schemeClr val="accent2">
+                    <a:lumMod val="50000"/>
+                  </a:schemeClr>
+                </a:solidFill>
+                <a:effectLst/>
+                <a:latin typeface="+mn-lt"/>
+              </a:rPr>
+              <a:t>wheat</a:t>
+            </a:r>
+            <a:r>
+              <a:rPr kumimoji="0" lang="ru-RU" altLang="ru-RU" sz="1400" b="0" i="0" u="none" strike="noStrike" cap="none" normalizeH="0" baseline="0" dirty="0">
+                <a:ln>
+                  <a:noFill/>
+                </a:ln>
+                <a:solidFill>
+                  <a:schemeClr val="accent2">
+                    <a:lumMod val="50000"/>
+                  </a:schemeClr>
+                </a:solidFill>
+                <a:effectLst/>
+                <a:latin typeface="+mn-lt"/>
+              </a:rPr>
+              <a:t> </a:t>
+            </a:r>
+            <a:r>
+              <a:rPr kumimoji="0" lang="ru-RU" altLang="ru-RU" sz="1400" b="0" i="0" u="none" strike="noStrike" cap="none" normalizeH="0" baseline="0" dirty="0" err="1">
+                <a:ln>
+                  <a:noFill/>
+                </a:ln>
+                <a:solidFill>
+                  <a:schemeClr val="accent2">
+                    <a:lumMod val="50000"/>
+                  </a:schemeClr>
+                </a:solidFill>
+                <a:effectLst/>
+                <a:latin typeface="+mn-lt"/>
+              </a:rPr>
+              <a:t>pita</a:t>
+            </a:r>
+            <a:r>
+              <a:rPr kumimoji="0" lang="ru-RU" altLang="ru-RU" sz="1400" b="0" i="0" u="none" strike="noStrike" cap="none" normalizeH="0" baseline="0" dirty="0">
+                <a:ln>
+                  <a:noFill/>
+                </a:ln>
+                <a:solidFill>
+                  <a:schemeClr val="accent2">
+                    <a:lumMod val="50000"/>
+                  </a:schemeClr>
+                </a:solidFill>
+                <a:effectLst/>
+                <a:latin typeface="+mn-lt"/>
+              </a:rPr>
+              <a:t>, </a:t>
+            </a:r>
+            <a:r>
+              <a:rPr kumimoji="0" lang="ru-RU" altLang="ru-RU" sz="1400" b="0" i="0" u="none" strike="noStrike" cap="none" normalizeH="0" baseline="0" dirty="0" err="1">
+                <a:ln>
+                  <a:noFill/>
+                </a:ln>
+                <a:solidFill>
+                  <a:schemeClr val="accent2">
+                    <a:lumMod val="50000"/>
+                  </a:schemeClr>
+                </a:solidFill>
+                <a:effectLst/>
+                <a:latin typeface="+mn-lt"/>
+              </a:rPr>
+              <a:t>salt</a:t>
+            </a:r>
+            <a:r>
+              <a:rPr kumimoji="0" lang="ru-RU" altLang="ru-RU" sz="1400" b="0" i="0" u="none" strike="noStrike" cap="none" normalizeH="0" baseline="0" dirty="0">
+                <a:ln>
+                  <a:noFill/>
+                </a:ln>
+                <a:solidFill>
+                  <a:schemeClr val="accent2">
+                    <a:lumMod val="50000"/>
+                  </a:schemeClr>
+                </a:solidFill>
+                <a:effectLst/>
+                <a:latin typeface="+mn-lt"/>
+              </a:rPr>
+              <a:t>, </a:t>
+            </a:r>
+            <a:r>
+              <a:rPr kumimoji="0" lang="ru-RU" altLang="ru-RU" sz="1400" b="0" i="0" u="none" strike="noStrike" cap="none" normalizeH="0" baseline="0" dirty="0" err="1">
+                <a:ln>
+                  <a:noFill/>
+                </a:ln>
+                <a:solidFill>
+                  <a:schemeClr val="accent2">
+                    <a:lumMod val="50000"/>
+                  </a:schemeClr>
+                </a:solidFill>
+                <a:effectLst/>
+                <a:latin typeface="+mn-lt"/>
+              </a:rPr>
+              <a:t>fresh</a:t>
+            </a:r>
+            <a:r>
+              <a:rPr kumimoji="0" lang="ru-RU" altLang="ru-RU" sz="1400" b="0" i="0" u="none" strike="noStrike" cap="none" normalizeH="0" baseline="0" dirty="0">
+                <a:ln>
+                  <a:noFill/>
+                </a:ln>
+                <a:solidFill>
+                  <a:schemeClr val="accent2">
+                    <a:lumMod val="50000"/>
+                  </a:schemeClr>
+                </a:solidFill>
+                <a:effectLst/>
+                <a:latin typeface="+mn-lt"/>
+              </a:rPr>
+              <a:t> </a:t>
+            </a:r>
+            <a:r>
+              <a:rPr kumimoji="0" lang="ru-RU" altLang="ru-RU" sz="1400" b="0" i="0" u="none" strike="noStrike" cap="none" normalizeH="0" baseline="0" dirty="0" err="1">
+                <a:ln>
+                  <a:noFill/>
+                </a:ln>
+                <a:solidFill>
+                  <a:schemeClr val="accent2">
+                    <a:lumMod val="50000"/>
+                  </a:schemeClr>
+                </a:solidFill>
+                <a:effectLst/>
+                <a:latin typeface="+mn-lt"/>
+              </a:rPr>
+              <a:t>lemon</a:t>
+            </a:r>
+            <a:r>
+              <a:rPr kumimoji="0" lang="ru-RU" altLang="ru-RU" sz="1400" b="0" i="0" u="none" strike="noStrike" cap="none" normalizeH="0" baseline="0" dirty="0">
+                <a:ln>
+                  <a:noFill/>
+                </a:ln>
+                <a:solidFill>
+                  <a:schemeClr val="accent2">
+                    <a:lumMod val="50000"/>
+                  </a:schemeClr>
+                </a:solidFill>
+                <a:effectLst/>
+                <a:latin typeface="+mn-lt"/>
+              </a:rPr>
+              <a:t> </a:t>
+            </a:r>
+            <a:r>
+              <a:rPr kumimoji="0" lang="ru-RU" altLang="ru-RU" sz="1400" b="0" i="0" u="none" strike="noStrike" cap="none" normalizeH="0" baseline="0" dirty="0" err="1">
+                <a:ln>
+                  <a:noFill/>
+                </a:ln>
+                <a:solidFill>
+                  <a:schemeClr val="accent2">
+                    <a:lumMod val="50000"/>
+                  </a:schemeClr>
+                </a:solidFill>
+                <a:effectLst/>
+                <a:latin typeface="+mn-lt"/>
+              </a:rPr>
+              <a:t>juice</a:t>
+            </a:r>
+            <a:endParaRPr kumimoji="0" lang="ru-RU" altLang="ru-RU" sz="1400" b="0" i="0" u="none" strike="noStrike" cap="none" normalizeH="0" baseline="0" dirty="0">
+              <a:ln>
+                <a:noFill/>
+              </a:ln>
+              <a:solidFill>
+                <a:schemeClr val="accent2">
+                  <a:lumMod val="50000"/>
+                </a:schemeClr>
+              </a:solidFill>
+              <a:effectLst/>
+              <a:latin typeface="+mn-lt"/>
+            </a:endParaRPr>
+          </a:p>
+        </p:txBody>
+      </p:sp>
     </p:spTree>
     <p:extLst>
       <p:ext uri="{BB962C8B-B14F-4D97-AF65-F5344CB8AC3E}">
-        <p14:creationId xmlns:p14="http://schemas.microsoft.com/office/powerpoint/2010/main" val="2802755799"/>
+        <p14:creationId xmlns:p14="http://schemas.microsoft.com/office/powerpoint/2010/main" val="188904722"/>
       </p:ext>
     </p:extLst>
   </p:cSld>
@@ -5097,8 +5221,8 @@
         </p:nvSpPr>
         <p:spPr>
           <a:xfrm flipH="1">
-            <a:off x="241633" y="1047850"/>
-            <a:ext cx="9557551" cy="5632311"/>
+            <a:off x="241632" y="1047850"/>
+            <a:ext cx="11668644" cy="5078313"/>
           </a:xfrm>
           <a:prstGeom prst="rect">
             <a:avLst/>
@@ -5152,6 +5276,68 @@
               </a:rPr>
               <a:t> количество ингредиентов в рецепте, кластер рецепта</a:t>
             </a:r>
+            <a:r>
+              <a:rPr lang="en-US" dirty="0">
+                <a:solidFill>
+                  <a:schemeClr val="accent2">
+                    <a:lumMod val="50000"/>
+                  </a:schemeClr>
+                </a:solidFill>
+              </a:rPr>
+              <a:t> – </a:t>
+            </a:r>
+            <a:r>
+              <a:rPr lang="ru-RU" dirty="0">
+                <a:solidFill>
+                  <a:schemeClr val="accent2">
+                    <a:lumMod val="50000"/>
+                  </a:schemeClr>
+                </a:solidFill>
+              </a:rPr>
+              <a:t>не дали качественного прироста</a:t>
+            </a:r>
+          </a:p>
+          <a:p>
+            <a:endParaRPr lang="ru-RU" u="sng" dirty="0">
+              <a:solidFill>
+                <a:schemeClr val="accent2">
+                  <a:lumMod val="50000"/>
+                </a:schemeClr>
+              </a:solidFill>
+            </a:endParaRPr>
+          </a:p>
+          <a:p>
+            <a:r>
+              <a:rPr lang="ru-RU" u="sng" dirty="0">
+                <a:solidFill>
+                  <a:schemeClr val="accent2">
+                    <a:lumMod val="50000"/>
+                  </a:schemeClr>
+                </a:solidFill>
+              </a:rPr>
+              <a:t>Работа с языковыми признаками:</a:t>
+            </a:r>
+          </a:p>
+          <a:p>
+            <a:endParaRPr lang="ru-RU" u="sng" dirty="0">
+              <a:solidFill>
+                <a:schemeClr val="accent2">
+                  <a:lumMod val="50000"/>
+                </a:schemeClr>
+              </a:solidFill>
+            </a:endParaRPr>
+          </a:p>
+          <a:p>
+            <a:r>
+              <a:rPr lang="ru-RU" dirty="0">
+                <a:solidFill>
+                  <a:schemeClr val="accent2">
+                    <a:lumMod val="50000"/>
+                  </a:schemeClr>
+                </a:solidFill>
+              </a:rPr>
+              <a:t>        языковые единицы: ингредиенты, слова, символы </a:t>
+            </a:r>
           </a:p>
           <a:p>
             <a:endParaRPr lang="ru-RU" dirty="0">
@@ -5164,27 +5350,6 @@
           </a:p>
           <a:p>
             <a:r>
-              <a:rPr lang="ru-RU" u="sng" dirty="0">
-                <a:solidFill>
-                  <a:schemeClr val="accent2">
-                    <a:lumMod val="50000"/>
-                  </a:schemeClr>
-                </a:solidFill>
-              </a:rPr>
-              <a:t>Работа с языковыми признаками:</a:t>
-            </a:r>
-          </a:p>
-          <a:p>
-            <a:endParaRPr lang="ru-RU" u="sng" dirty="0">
-              <a:solidFill>
-                <a:schemeClr val="accent2">
-                  <a:lumMod val="50000"/>
-                </a:schemeClr>
-              </a:solidFill>
-            </a:endParaRPr>
-          </a:p>
-          <a:p>
-            <a:r>
               <a:rPr lang="ru-RU" dirty="0">
                 <a:solidFill>
                   <a:schemeClr val="accent2">
@@ -5192,10 +5357,40 @@
                   </a:schemeClr>
                 </a:solidFill>
               </a:rPr>
-              <a:t>        языковые единицы: ингредиенты, слова, символы</a:t>
-            </a:r>
-          </a:p>
-          <a:p>
+              <a:t>        нормализация и очистка:</a:t>
+            </a:r>
+          </a:p>
+          <a:p>
+            <a:pPr marL="285750" indent="-285750">
+              <a:buFontTx/>
+              <a:buChar char="-"/>
+            </a:pPr>
+            <a:r>
+              <a:rPr lang="ru-RU" dirty="0">
+                <a:solidFill>
+                  <a:schemeClr val="accent2">
+                    <a:lumMod val="50000"/>
+                  </a:schemeClr>
+                </a:solidFill>
+              </a:rPr>
+              <a:t>приведение к нижнему регистру, очистка от незначимых символов </a:t>
+            </a:r>
+          </a:p>
+          <a:p>
+            <a:pPr marL="285750" indent="-285750">
+              <a:buFontTx/>
+              <a:buChar char="-"/>
+            </a:pPr>
+            <a:r>
+              <a:rPr lang="ru-RU" dirty="0" err="1">
+                <a:solidFill>
+                  <a:schemeClr val="accent2">
+                    <a:lumMod val="50000"/>
+                  </a:schemeClr>
+                </a:solidFill>
+              </a:rPr>
+              <a:t>лемматизация</a:t>
+            </a:r>
             <a:endParaRPr lang="ru-RU" dirty="0">
               <a:solidFill>
                 <a:schemeClr val="accent2">
@@ -5213,14 +5408,18 @@
                   </a:schemeClr>
                 </a:solidFill>
               </a:rPr>
-              <a:t>        нормализация и очистка:</a:t>
-            </a:r>
-          </a:p>
-          <a:p>
-            <a:pPr marL="285750" indent="-285750">
-              <a:buFontTx/>
-              <a:buChar char="-"/>
-            </a:pPr>
+              <a:t>–   сократили количество признаков примерно на 5%</a:t>
+            </a:r>
+            <a:r>
+              <a:rPr lang="de-DE" dirty="0">
+                <a:solidFill>
+                  <a:schemeClr val="accent2">
+                    <a:lumMod val="50000"/>
+                  </a:schemeClr>
+                </a:solidFill>
+              </a:rPr>
+              <a:t>, </a:t>
+            </a:r>
             <a:r>
               <a:rPr lang="ru-RU" dirty="0">
                 <a:solidFill>
@@ -5229,24 +5428,10 @@
                   </a:schemeClr>
                 </a:solidFill>
               </a:rPr>
-              <a:t>приведение к нижнему регистру, очистка от незначимых символов</a:t>
-            </a:r>
-          </a:p>
-          <a:p>
-            <a:pPr marL="285750" indent="-285750">
-              <a:buFontTx/>
-              <a:buChar char="-"/>
-            </a:pPr>
-            <a:r>
-              <a:rPr lang="ru-RU" dirty="0" err="1">
-                <a:solidFill>
-                  <a:schemeClr val="accent2">
-                    <a:lumMod val="50000"/>
-                  </a:schemeClr>
-                </a:solidFill>
-              </a:rPr>
-              <a:t>лемматизация</a:t>
-            </a:r>
+              <a:t>дали незначительное улучшение качества</a:t>
+            </a:r>
+          </a:p>
+          <a:p>
             <a:endParaRPr lang="ru-RU" dirty="0">
               <a:solidFill>
                 <a:schemeClr val="accent2">
@@ -5292,135 +5477,19 @@
               <a:buFontTx/>
               <a:buChar char="-"/>
             </a:pPr>
+            <a:r>
+              <a:rPr lang="ru-RU" dirty="0">
+                <a:solidFill>
+                  <a:schemeClr val="accent2">
+                    <a:lumMod val="50000"/>
+                  </a:schemeClr>
+                </a:solidFill>
+              </a:rPr>
+              <a:t>дали незначительное падение качества.</a:t>
+            </a:r>
+          </a:p>
+          <a:p>
             <a:endParaRPr lang="ru-RU" dirty="0">
-              <a:solidFill>
-                <a:schemeClr val="accent2">
-                  <a:lumMod val="50000"/>
-                </a:schemeClr>
-              </a:solidFill>
-            </a:endParaRPr>
-          </a:p>
-          <a:p>
-            <a:r>
-              <a:rPr lang="ru-RU" dirty="0">
-                <a:solidFill>
-                  <a:schemeClr val="accent2">
-                    <a:lumMod val="50000"/>
-                  </a:schemeClr>
-                </a:solidFill>
-              </a:rPr>
-              <a:t>        построение итоговой матрицы признаков</a:t>
-            </a:r>
-          </a:p>
-          <a:p>
-            <a:r>
-              <a:rPr lang="ru-RU" dirty="0">
-                <a:solidFill>
-                  <a:schemeClr val="accent2">
-                    <a:lumMod val="50000"/>
-                  </a:schemeClr>
-                </a:solidFill>
-              </a:rPr>
-              <a:t>- учет </a:t>
-            </a:r>
-            <a:r>
-              <a:rPr lang="en-US" dirty="0">
-                <a:solidFill>
-                  <a:schemeClr val="accent2">
-                    <a:lumMod val="50000"/>
-                  </a:schemeClr>
-                </a:solidFill>
-              </a:rPr>
-              <a:t>n-grams</a:t>
-            </a:r>
-            <a:endParaRPr lang="ru-RU" dirty="0">
-              <a:solidFill>
-                <a:schemeClr val="accent2">
-                  <a:lumMod val="50000"/>
-                </a:schemeClr>
-              </a:solidFill>
-            </a:endParaRPr>
-          </a:p>
-          <a:p>
-            <a:r>
-              <a:rPr lang="ru-RU" dirty="0">
-                <a:solidFill>
-                  <a:schemeClr val="accent2">
-                    <a:lumMod val="50000"/>
-                  </a:schemeClr>
-                </a:solidFill>
-              </a:rPr>
-              <a:t>- </a:t>
-            </a:r>
-            <a:r>
-              <a:rPr lang="en-US" dirty="0" err="1">
-                <a:solidFill>
-                  <a:schemeClr val="accent2">
-                    <a:lumMod val="50000"/>
-                  </a:schemeClr>
-                </a:solidFill>
-              </a:rPr>
-              <a:t>CountVectorizer</a:t>
-            </a:r>
-            <a:endParaRPr lang="en-US" dirty="0">
-              <a:solidFill>
-                <a:schemeClr val="accent2">
-                  <a:lumMod val="50000"/>
-                </a:schemeClr>
-              </a:solidFill>
-            </a:endParaRPr>
-          </a:p>
-          <a:p>
-            <a:r>
-              <a:rPr lang="ru-RU" dirty="0">
-                <a:solidFill>
-                  <a:schemeClr val="accent2">
-                    <a:lumMod val="50000"/>
-                  </a:schemeClr>
-                </a:solidFill>
-              </a:rPr>
-              <a:t>- </a:t>
-            </a:r>
-            <a:r>
-              <a:rPr lang="en-US" dirty="0" err="1">
-                <a:solidFill>
-                  <a:schemeClr val="accent2">
-                    <a:lumMod val="50000"/>
-                  </a:schemeClr>
-                </a:solidFill>
-              </a:rPr>
-              <a:t>TfidfVectorizer</a:t>
-            </a:r>
-            <a:endParaRPr lang="en-US" dirty="0">
-              <a:solidFill>
-                <a:schemeClr val="accent2">
-                  <a:lumMod val="50000"/>
-                </a:schemeClr>
-              </a:solidFill>
-            </a:endParaRPr>
-          </a:p>
-          <a:p>
-            <a:r>
-              <a:rPr lang="ru-RU" dirty="0">
-                <a:solidFill>
-                  <a:schemeClr val="accent2">
-                    <a:lumMod val="50000"/>
-                  </a:schemeClr>
-                </a:solidFill>
-              </a:rPr>
-              <a:t>- </a:t>
-            </a:r>
-            <a:r>
-              <a:rPr lang="en-US" dirty="0">
-                <a:solidFill>
-                  <a:schemeClr val="accent2">
-                    <a:lumMod val="50000"/>
-                  </a:schemeClr>
-                </a:solidFill>
-              </a:rPr>
-              <a:t>word2vec</a:t>
-            </a:r>
-            <a:endParaRPr lang="ru-RU" u="sng" dirty="0">
               <a:solidFill>
                 <a:schemeClr val="accent2">
                   <a:lumMod val="50000"/>
@@ -5544,45 +5613,104 @@
           </a:prstGeom>
         </p:spPr>
       </p:pic>
-      <p:pic>
-        <p:nvPicPr>
-          <p:cNvPr id="13" name="Рисунок 12" descr="Лабиринт">
-            <a:extLst>
-              <a:ext uri="{FF2B5EF4-FFF2-40B4-BE49-F238E27FC236}">
-                <a16:creationId xmlns:a16="http://schemas.microsoft.com/office/drawing/2014/main" id="{07A26D0A-2681-4C1F-973D-CE81B161124E}"/>
-              </a:ext>
-            </a:extLst>
-          </p:cNvPr>
-          <p:cNvPicPr>
-            <a:picLocks noChangeAspect="1"/>
-          </p:cNvPicPr>
+      <p:sp>
+        <p:nvSpPr>
+          <p:cNvPr id="3" name="Arrow: Right 2">
+            <a:extLst>
+              <a:ext uri="{FF2B5EF4-FFF2-40B4-BE49-F238E27FC236}">
+                <a16:creationId xmlns:a16="http://schemas.microsoft.com/office/drawing/2014/main" id="{D19C9FBB-5C05-4D62-9315-320996545E85}"/>
+              </a:ext>
+            </a:extLst>
+          </p:cNvPr>
+          <p:cNvSpPr/>
           <p:nvPr/>
-        </p:nvPicPr>
-        <p:blipFill>
-          <a:blip r:embed="rId7">
-            <a:extLst>
-              <a:ext uri="{28A0092B-C50C-407E-A947-70E740481C1C}">
-                <a14:useLocalDpi xmlns:a14="http://schemas.microsoft.com/office/drawing/2010/main" val="0"/>
-              </a:ext>
-              <a:ext uri="{96DAC541-7B7A-43D3-8B79-37D633B846F1}">
-                <asvg:svgBlip xmlns:asvg="http://schemas.microsoft.com/office/drawing/2016/SVG/main" r:embed="rId8"/>
-              </a:ext>
-            </a:extLst>
-          </a:blip>
-          <a:stretch>
-            <a:fillRect/>
-          </a:stretch>
-        </p:blipFill>
+        </p:nvSpPr>
         <p:spPr>
           <a:xfrm>
-            <a:off x="290601" y="5191956"/>
-            <a:ext cx="305084" cy="305084"/>
+            <a:off x="304791" y="4404526"/>
+            <a:ext cx="232627" cy="305084"/>
           </a:xfrm>
-          <a:prstGeom prst="rect">
+          <a:prstGeom prst="rightArrow">
             <a:avLst/>
           </a:prstGeom>
+          <a:solidFill>
+            <a:srgbClr val="FFC000"/>
+          </a:solidFill>
         </p:spPr>
-      </p:pic>
+        <p:style>
+          <a:lnRef idx="2">
+            <a:schemeClr val="accent1">
+              <a:shade val="50000"/>
+            </a:schemeClr>
+          </a:lnRef>
+          <a:fillRef idx="1">
+            <a:schemeClr val="accent1"/>
+          </a:fillRef>
+          <a:effectRef idx="0">
+            <a:schemeClr val="accent1"/>
+          </a:effectRef>
+          <a:fontRef idx="minor">
+            <a:schemeClr val="lt1"/>
+          </a:fontRef>
+        </p:style>
+        <p:txBody>
+          <a:bodyPr rtlCol="0" anchor="ctr"/>
+          <a:lstStyle/>
+          <a:p>
+            <a:pPr algn="ctr"/>
+            <a:endParaRPr lang="ru-RU"/>
+          </a:p>
+        </p:txBody>
+      </p:sp>
+      <p:sp>
+        <p:nvSpPr>
+          <p:cNvPr id="10" name="Arrow: Right 9">
+            <a:extLst>
+              <a:ext uri="{FF2B5EF4-FFF2-40B4-BE49-F238E27FC236}">
+                <a16:creationId xmlns:a16="http://schemas.microsoft.com/office/drawing/2014/main" id="{3A08C5FE-7FA1-45C7-9D48-63CA81AA62D3}"/>
+              </a:ext>
+            </a:extLst>
+          </p:cNvPr>
+          <p:cNvSpPr/>
+          <p:nvPr/>
+        </p:nvSpPr>
+        <p:spPr>
+          <a:xfrm>
+            <a:off x="304790" y="5520236"/>
+            <a:ext cx="232627" cy="305084"/>
+          </a:xfrm>
+          <a:prstGeom prst="rightArrow">
+            <a:avLst/>
+          </a:prstGeom>
+          <a:solidFill>
+            <a:srgbClr val="FFC000"/>
+          </a:solidFill>
+        </p:spPr>
+        <p:style>
+          <a:lnRef idx="2">
+            <a:schemeClr val="accent1">
+              <a:shade val="50000"/>
+            </a:schemeClr>
+          </a:lnRef>
+          <a:fillRef idx="1">
+            <a:schemeClr val="accent1"/>
+          </a:fillRef>
+          <a:effectRef idx="0">
+            <a:schemeClr val="accent1"/>
+          </a:effectRef>
+          <a:fontRef idx="minor">
+            <a:schemeClr val="lt1"/>
+          </a:fontRef>
+        </p:style>
+        <p:txBody>
+          <a:bodyPr rtlCol="0" anchor="ctr"/>
+          <a:lstStyle/>
+          <a:p>
+            <a:pPr algn="ctr"/>
+            <a:endParaRPr lang="ru-RU"/>
+          </a:p>
+        </p:txBody>
+      </p:sp>
     </p:spTree>
     <p:extLst>
       <p:ext uri="{BB962C8B-B14F-4D97-AF65-F5344CB8AC3E}">
@@ -5597,6 +5725,769 @@
 </file>
 
 <file path=ppt/slides/slide4.xml><?xml version="1.0" encoding="utf-8"?>
+<p:sld xmlns:a="http://schemas.openxmlformats.org/drawingml/2006/main" xmlns:r="http://schemas.openxmlformats.org/officeDocument/2006/relationships" xmlns:p="http://schemas.openxmlformats.org/presentationml/2006/main">
+  <p:cSld>
+    <p:spTree>
+      <p:nvGrpSpPr>
+        <p:cNvPr id="1" name=""/>
+        <p:cNvGrpSpPr/>
+        <p:nvPr/>
+      </p:nvGrpSpPr>
+      <p:grpSpPr>
+        <a:xfrm>
+          <a:off x="0" y="0"/>
+          <a:ext cx="0" cy="0"/>
+          <a:chOff x="0" y="0"/>
+          <a:chExt cx="0" cy="0"/>
+        </a:xfrm>
+      </p:grpSpPr>
+      <p:sp>
+        <p:nvSpPr>
+          <p:cNvPr id="2" name="Title 1">
+            <a:extLst>
+              <a:ext uri="{FF2B5EF4-FFF2-40B4-BE49-F238E27FC236}">
+                <a16:creationId xmlns:a16="http://schemas.microsoft.com/office/drawing/2014/main" id="{BE7D95CF-9CD9-43BF-A26D-589B5CD4689A}"/>
+              </a:ext>
+            </a:extLst>
+          </p:cNvPr>
+          <p:cNvSpPr>
+            <a:spLocks noGrp="1"/>
+          </p:cNvSpPr>
+          <p:nvPr>
+            <p:ph type="title"/>
+          </p:nvPr>
+        </p:nvSpPr>
+        <p:spPr>
+          <a:xfrm>
+            <a:off x="315662" y="1270578"/>
+            <a:ext cx="10515600" cy="3472762"/>
+          </a:xfrm>
+        </p:spPr>
+        <p:txBody>
+          <a:bodyPr>
+            <a:normAutofit/>
+          </a:bodyPr>
+          <a:lstStyle/>
+          <a:p>
+            <a:pPr lvl="0">
+              <a:lnSpc>
+                <a:spcPct val="100000"/>
+              </a:lnSpc>
+              <a:spcBef>
+                <a:spcPts val="0"/>
+              </a:spcBef>
+            </a:pPr>
+            <a:r>
+              <a:rPr lang="ru-RU" sz="1800" dirty="0">
+                <a:solidFill>
+                  <a:srgbClr val="ED7D31">
+                    <a:lumMod val="50000"/>
+                  </a:srgbClr>
+                </a:solidFill>
+                <a:latin typeface="Calibri" panose="020F0502020204030204"/>
+                <a:ea typeface="+mn-ea"/>
+                <a:cs typeface="+mn-cs"/>
+              </a:rPr>
+              <a:t> построение итоговой матрицы признаков</a:t>
+            </a:r>
+            <a:br>
+              <a:rPr lang="de-DE" sz="1800" dirty="0">
+                <a:solidFill>
+                  <a:srgbClr val="ED7D31">
+                    <a:lumMod val="50000"/>
+                  </a:srgbClr>
+                </a:solidFill>
+                <a:latin typeface="Calibri" panose="020F0502020204030204"/>
+                <a:ea typeface="+mn-ea"/>
+                <a:cs typeface="+mn-cs"/>
+              </a:rPr>
+            </a:br>
+            <a:br>
+              <a:rPr lang="ru-RU" sz="1800" dirty="0">
+                <a:solidFill>
+                  <a:srgbClr val="ED7D31">
+                    <a:lumMod val="50000"/>
+                  </a:srgbClr>
+                </a:solidFill>
+                <a:latin typeface="Calibri" panose="020F0502020204030204"/>
+                <a:ea typeface="+mn-ea"/>
+                <a:cs typeface="+mn-cs"/>
+              </a:rPr>
+            </a:br>
+            <a:r>
+              <a:rPr lang="ru-RU" sz="1800" dirty="0">
+                <a:solidFill>
+                  <a:srgbClr val="ED7D31">
+                    <a:lumMod val="50000"/>
+                  </a:srgbClr>
+                </a:solidFill>
+                <a:latin typeface="Calibri" panose="020F0502020204030204"/>
+                <a:ea typeface="+mn-ea"/>
+                <a:cs typeface="+mn-cs"/>
+              </a:rPr>
+              <a:t>- учет </a:t>
+            </a:r>
+            <a:r>
+              <a:rPr lang="en-US" sz="1800" dirty="0">
+                <a:solidFill>
+                  <a:srgbClr val="ED7D31">
+                    <a:lumMod val="50000"/>
+                  </a:srgbClr>
+                </a:solidFill>
+                <a:latin typeface="Calibri" panose="020F0502020204030204"/>
+                <a:ea typeface="+mn-ea"/>
+                <a:cs typeface="+mn-cs"/>
+              </a:rPr>
+              <a:t>n-grams</a:t>
+            </a:r>
+            <a:br>
+              <a:rPr lang="en-US" sz="1800" dirty="0">
+                <a:solidFill>
+                  <a:srgbClr val="ED7D31">
+                    <a:lumMod val="50000"/>
+                  </a:srgbClr>
+                </a:solidFill>
+                <a:latin typeface="Calibri" panose="020F0502020204030204"/>
+                <a:ea typeface="+mn-ea"/>
+                <a:cs typeface="+mn-cs"/>
+              </a:rPr>
+            </a:br>
+            <a:br>
+              <a:rPr lang="ru-RU" sz="1800" dirty="0">
+                <a:solidFill>
+                  <a:srgbClr val="ED7D31">
+                    <a:lumMod val="50000"/>
+                  </a:srgbClr>
+                </a:solidFill>
+                <a:latin typeface="Calibri" panose="020F0502020204030204"/>
+                <a:ea typeface="+mn-ea"/>
+                <a:cs typeface="+mn-cs"/>
+              </a:rPr>
+            </a:br>
+            <a:r>
+              <a:rPr lang="ru-RU" sz="1800" dirty="0">
+                <a:solidFill>
+                  <a:srgbClr val="ED7D31">
+                    <a:lumMod val="50000"/>
+                  </a:srgbClr>
+                </a:solidFill>
+                <a:latin typeface="Calibri" panose="020F0502020204030204"/>
+                <a:ea typeface="+mn-ea"/>
+                <a:cs typeface="+mn-cs"/>
+              </a:rPr>
+              <a:t>- </a:t>
+            </a:r>
+            <a:r>
+              <a:rPr lang="en-US" sz="1800" dirty="0" err="1">
+                <a:solidFill>
+                  <a:srgbClr val="ED7D31">
+                    <a:lumMod val="50000"/>
+                  </a:srgbClr>
+                </a:solidFill>
+                <a:latin typeface="Calibri" panose="020F0502020204030204"/>
+                <a:ea typeface="+mn-ea"/>
+                <a:cs typeface="+mn-cs"/>
+              </a:rPr>
+              <a:t>CountVectorizer</a:t>
+            </a:r>
+            <a:br>
+              <a:rPr lang="en-US" sz="1800" dirty="0">
+                <a:solidFill>
+                  <a:srgbClr val="ED7D31">
+                    <a:lumMod val="50000"/>
+                  </a:srgbClr>
+                </a:solidFill>
+                <a:latin typeface="Calibri" panose="020F0502020204030204"/>
+                <a:ea typeface="+mn-ea"/>
+                <a:cs typeface="+mn-cs"/>
+              </a:rPr>
+            </a:br>
+            <a:br>
+              <a:rPr lang="ru-RU" sz="1800" dirty="0">
+                <a:solidFill>
+                  <a:srgbClr val="ED7D31">
+                    <a:lumMod val="50000"/>
+                  </a:srgbClr>
+                </a:solidFill>
+                <a:latin typeface="Calibri" panose="020F0502020204030204"/>
+                <a:ea typeface="+mn-ea"/>
+                <a:cs typeface="+mn-cs"/>
+              </a:rPr>
+            </a:br>
+            <a:r>
+              <a:rPr lang="ru-RU" sz="1800" dirty="0">
+                <a:solidFill>
+                  <a:srgbClr val="ED7D31">
+                    <a:lumMod val="50000"/>
+                  </a:srgbClr>
+                </a:solidFill>
+                <a:latin typeface="Calibri" panose="020F0502020204030204"/>
+                <a:ea typeface="+mn-ea"/>
+                <a:cs typeface="+mn-cs"/>
+              </a:rPr>
+              <a:t>- </a:t>
+            </a:r>
+            <a:r>
+              <a:rPr lang="en-US" sz="1800" dirty="0" err="1">
+                <a:solidFill>
+                  <a:srgbClr val="ED7D31">
+                    <a:lumMod val="50000"/>
+                  </a:srgbClr>
+                </a:solidFill>
+                <a:latin typeface="Calibri" panose="020F0502020204030204"/>
+                <a:ea typeface="+mn-ea"/>
+                <a:cs typeface="+mn-cs"/>
+              </a:rPr>
+              <a:t>DictVectorizer</a:t>
+            </a:r>
+            <a:br>
+              <a:rPr lang="en-US" sz="1800" dirty="0">
+                <a:solidFill>
+                  <a:srgbClr val="ED7D31">
+                    <a:lumMod val="50000"/>
+                  </a:srgbClr>
+                </a:solidFill>
+                <a:latin typeface="Calibri" panose="020F0502020204030204"/>
+                <a:ea typeface="+mn-ea"/>
+                <a:cs typeface="+mn-cs"/>
+              </a:rPr>
+            </a:br>
+            <a:br>
+              <a:rPr lang="en-US" sz="1800" dirty="0">
+                <a:solidFill>
+                  <a:srgbClr val="ED7D31">
+                    <a:lumMod val="50000"/>
+                  </a:srgbClr>
+                </a:solidFill>
+                <a:latin typeface="Calibri" panose="020F0502020204030204"/>
+                <a:ea typeface="+mn-ea"/>
+                <a:cs typeface="+mn-cs"/>
+              </a:rPr>
+            </a:br>
+            <a:r>
+              <a:rPr lang="ru-RU" sz="1800" dirty="0">
+                <a:solidFill>
+                  <a:srgbClr val="ED7D31">
+                    <a:lumMod val="50000"/>
+                  </a:srgbClr>
+                </a:solidFill>
+                <a:latin typeface="Calibri" panose="020F0502020204030204"/>
+                <a:ea typeface="+mn-ea"/>
+                <a:cs typeface="+mn-cs"/>
+              </a:rPr>
+              <a:t>- </a:t>
+            </a:r>
+            <a:r>
+              <a:rPr lang="en-US" sz="1800" dirty="0" err="1">
+                <a:solidFill>
+                  <a:srgbClr val="ED7D31">
+                    <a:lumMod val="50000"/>
+                  </a:srgbClr>
+                </a:solidFill>
+                <a:latin typeface="Calibri" panose="020F0502020204030204"/>
+                <a:ea typeface="+mn-ea"/>
+                <a:cs typeface="+mn-cs"/>
+              </a:rPr>
+              <a:t>TfidfVectorizer</a:t>
+            </a:r>
+            <a:br>
+              <a:rPr lang="en-US" sz="1800" dirty="0">
+                <a:solidFill>
+                  <a:srgbClr val="ED7D31">
+                    <a:lumMod val="50000"/>
+                  </a:srgbClr>
+                </a:solidFill>
+                <a:latin typeface="Calibri" panose="020F0502020204030204"/>
+                <a:ea typeface="+mn-ea"/>
+                <a:cs typeface="+mn-cs"/>
+              </a:rPr>
+            </a:br>
+            <a:br>
+              <a:rPr lang="en-US" sz="1800" dirty="0">
+                <a:solidFill>
+                  <a:srgbClr val="ED7D31">
+                    <a:lumMod val="50000"/>
+                  </a:srgbClr>
+                </a:solidFill>
+                <a:latin typeface="Calibri" panose="020F0502020204030204"/>
+                <a:ea typeface="+mn-ea"/>
+                <a:cs typeface="+mn-cs"/>
+              </a:rPr>
+            </a:br>
+            <a:r>
+              <a:rPr lang="ru-RU" sz="1800" dirty="0">
+                <a:solidFill>
+                  <a:srgbClr val="ED7D31">
+                    <a:lumMod val="50000"/>
+                  </a:srgbClr>
+                </a:solidFill>
+                <a:latin typeface="Calibri" panose="020F0502020204030204"/>
+                <a:ea typeface="+mn-ea"/>
+                <a:cs typeface="+mn-cs"/>
+              </a:rPr>
+              <a:t>- </a:t>
+            </a:r>
+            <a:r>
+              <a:rPr lang="en-US" sz="1800" dirty="0">
+                <a:solidFill>
+                  <a:srgbClr val="ED7D31">
+                    <a:lumMod val="50000"/>
+                  </a:srgbClr>
+                </a:solidFill>
+                <a:latin typeface="Calibri" panose="020F0502020204030204"/>
+                <a:ea typeface="+mn-ea"/>
+                <a:cs typeface="+mn-cs"/>
+              </a:rPr>
+              <a:t>word2vec</a:t>
+            </a:r>
+            <a:endParaRPr lang="ru-RU" dirty="0"/>
+          </a:p>
+        </p:txBody>
+      </p:sp>
+      <p:pic>
+        <p:nvPicPr>
+          <p:cNvPr id="3" name="Рисунок 12" descr="Лабиринт">
+            <a:extLst>
+              <a:ext uri="{FF2B5EF4-FFF2-40B4-BE49-F238E27FC236}">
+                <a16:creationId xmlns:a16="http://schemas.microsoft.com/office/drawing/2014/main" id="{BBBA4AFF-22CE-4375-B2B1-B6448E3DAA57}"/>
+              </a:ext>
+            </a:extLst>
+          </p:cNvPr>
+          <p:cNvPicPr>
+            <a:picLocks noChangeAspect="1"/>
+          </p:cNvPicPr>
+          <p:nvPr/>
+        </p:nvPicPr>
+        <p:blipFill>
+          <a:blip r:embed="rId2">
+            <a:extLst>
+              <a:ext uri="{28A0092B-C50C-407E-A947-70E740481C1C}">
+                <a14:useLocalDpi xmlns:a14="http://schemas.microsoft.com/office/drawing/2010/main" val="0"/>
+              </a:ext>
+              <a:ext uri="{96DAC541-7B7A-43D3-8B79-37D633B846F1}">
+                <asvg:svgBlip xmlns:asvg="http://schemas.microsoft.com/office/drawing/2016/SVG/main" r:embed="rId3"/>
+              </a:ext>
+            </a:extLst>
+          </a:blip>
+          <a:stretch>
+            <a:fillRect/>
+          </a:stretch>
+        </p:blipFill>
+        <p:spPr>
+          <a:xfrm>
+            <a:off x="163120" y="1499402"/>
+            <a:ext cx="305084" cy="305084"/>
+          </a:xfrm>
+          <a:prstGeom prst="rect">
+            <a:avLst/>
+          </a:prstGeom>
+        </p:spPr>
+      </p:pic>
+      <p:sp>
+        <p:nvSpPr>
+          <p:cNvPr id="4" name="Заголовок 1">
+            <a:extLst>
+              <a:ext uri="{FF2B5EF4-FFF2-40B4-BE49-F238E27FC236}">
+                <a16:creationId xmlns:a16="http://schemas.microsoft.com/office/drawing/2014/main" id="{7240FAC3-6F60-437B-8921-9B955D2E1D67}"/>
+              </a:ext>
+            </a:extLst>
+          </p:cNvPr>
+          <p:cNvSpPr txBox="1">
+            <a:spLocks/>
+          </p:cNvSpPr>
+          <p:nvPr/>
+        </p:nvSpPr>
+        <p:spPr>
+          <a:xfrm>
+            <a:off x="2715034" y="0"/>
+            <a:ext cx="8758559" cy="1325563"/>
+          </a:xfrm>
+          <a:prstGeom prst="rect">
+            <a:avLst/>
+          </a:prstGeom>
+        </p:spPr>
+        <p:txBody>
+          <a:bodyPr vert="horz" lIns="91440" tIns="45720" rIns="91440" bIns="45720" rtlCol="0" anchor="ctr">
+            <a:normAutofit/>
+          </a:bodyPr>
+          <a:lstStyle>
+            <a:lvl1pPr algn="l" defTabSz="914400" rtl="0" eaLnBrk="1" latinLnBrk="0" hangingPunct="1">
+              <a:lnSpc>
+                <a:spcPct val="90000"/>
+              </a:lnSpc>
+              <a:spcBef>
+                <a:spcPct val="0"/>
+              </a:spcBef>
+              <a:buNone/>
+              <a:defRPr sz="4400" kern="1200">
+                <a:solidFill>
+                  <a:schemeClr val="tx1"/>
+                </a:solidFill>
+                <a:latin typeface="+mj-lt"/>
+                <a:ea typeface="+mj-ea"/>
+                <a:cs typeface="+mj-cs"/>
+              </a:defRPr>
+            </a:lvl1pPr>
+          </a:lstStyle>
+          <a:p>
+            <a:r>
+              <a:rPr lang="ru-RU" b="1" dirty="0">
+                <a:solidFill>
+                  <a:schemeClr val="accent2">
+                    <a:lumMod val="50000"/>
+                  </a:schemeClr>
+                </a:solidFill>
+              </a:rPr>
+              <a:t>  Признаки</a:t>
+            </a:r>
+            <a:r>
+              <a:rPr lang="en-US" b="1" dirty="0">
+                <a:solidFill>
+                  <a:schemeClr val="accent2">
+                    <a:lumMod val="50000"/>
+                  </a:schemeClr>
+                </a:solidFill>
+              </a:rPr>
+              <a:t>:</a:t>
+            </a:r>
+            <a:r>
+              <a:rPr lang="ru-RU" b="1" dirty="0">
+                <a:solidFill>
+                  <a:schemeClr val="accent2">
+                    <a:lumMod val="50000"/>
+                  </a:schemeClr>
+                </a:solidFill>
+              </a:rPr>
+              <a:t> продолжение</a:t>
+            </a:r>
+          </a:p>
+        </p:txBody>
+      </p:sp>
+      <p:pic>
+        <p:nvPicPr>
+          <p:cNvPr id="6" name="Picture 5">
+            <a:extLst>
+              <a:ext uri="{FF2B5EF4-FFF2-40B4-BE49-F238E27FC236}">
+                <a16:creationId xmlns:a16="http://schemas.microsoft.com/office/drawing/2014/main" id="{196F899C-07E9-4D5F-92D8-38F9D9F488E6}"/>
+              </a:ext>
+            </a:extLst>
+          </p:cNvPr>
+          <p:cNvPicPr>
+            <a:picLocks noChangeAspect="1"/>
+          </p:cNvPicPr>
+          <p:nvPr/>
+        </p:nvPicPr>
+        <p:blipFill>
+          <a:blip r:embed="rId4"/>
+          <a:stretch>
+            <a:fillRect/>
+          </a:stretch>
+        </p:blipFill>
+        <p:spPr>
+          <a:xfrm>
+            <a:off x="197200" y="250546"/>
+            <a:ext cx="2602446" cy="824470"/>
+          </a:xfrm>
+          <a:prstGeom prst="rect">
+            <a:avLst/>
+          </a:prstGeom>
+        </p:spPr>
+      </p:pic>
+      <p:pic>
+        <p:nvPicPr>
+          <p:cNvPr id="7" name="Picture 6">
+            <a:extLst>
+              <a:ext uri="{FF2B5EF4-FFF2-40B4-BE49-F238E27FC236}">
+                <a16:creationId xmlns:a16="http://schemas.microsoft.com/office/drawing/2014/main" id="{94DEE38F-B3FE-4986-BD26-2DB529F1443A}"/>
+              </a:ext>
+            </a:extLst>
+          </p:cNvPr>
+          <p:cNvPicPr>
+            <a:picLocks noChangeAspect="1"/>
+          </p:cNvPicPr>
+          <p:nvPr/>
+        </p:nvPicPr>
+        <p:blipFill>
+          <a:blip r:embed="rId5"/>
+          <a:stretch>
+            <a:fillRect/>
+          </a:stretch>
+        </p:blipFill>
+        <p:spPr>
+          <a:xfrm>
+            <a:off x="7614906" y="1844863"/>
+            <a:ext cx="4261432" cy="3294415"/>
+          </a:xfrm>
+          <a:prstGeom prst="rect">
+            <a:avLst/>
+          </a:prstGeom>
+        </p:spPr>
+      </p:pic>
+      <p:pic>
+        <p:nvPicPr>
+          <p:cNvPr id="10" name="Picture 9">
+            <a:extLst>
+              <a:ext uri="{FF2B5EF4-FFF2-40B4-BE49-F238E27FC236}">
+                <a16:creationId xmlns:a16="http://schemas.microsoft.com/office/drawing/2014/main" id="{3AE144B6-D076-4EA2-9EE0-D1B70DBC5F1D}"/>
+              </a:ext>
+            </a:extLst>
+          </p:cNvPr>
+          <p:cNvPicPr>
+            <a:picLocks noChangeAspect="1"/>
+          </p:cNvPicPr>
+          <p:nvPr/>
+        </p:nvPicPr>
+        <p:blipFill>
+          <a:blip r:embed="rId6"/>
+          <a:stretch>
+            <a:fillRect/>
+          </a:stretch>
+        </p:blipFill>
+        <p:spPr>
+          <a:xfrm>
+            <a:off x="3263803" y="1844863"/>
+            <a:ext cx="3881628" cy="3294415"/>
+          </a:xfrm>
+          <a:prstGeom prst="rect">
+            <a:avLst/>
+          </a:prstGeom>
+        </p:spPr>
+      </p:pic>
+      <p:sp>
+        <p:nvSpPr>
+          <p:cNvPr id="9" name="Oval 8">
+            <a:extLst>
+              <a:ext uri="{FF2B5EF4-FFF2-40B4-BE49-F238E27FC236}">
+                <a16:creationId xmlns:a16="http://schemas.microsoft.com/office/drawing/2014/main" id="{89A264EA-86D0-4AC5-BB46-3174F12CE243}"/>
+              </a:ext>
+            </a:extLst>
+          </p:cNvPr>
+          <p:cNvSpPr/>
+          <p:nvPr/>
+        </p:nvSpPr>
+        <p:spPr>
+          <a:xfrm>
+            <a:off x="3177309" y="4862279"/>
+            <a:ext cx="1865746" cy="395938"/>
+          </a:xfrm>
+          <a:prstGeom prst="ellipse">
+            <a:avLst/>
+          </a:prstGeom>
+          <a:noFill/>
+          <a:ln>
+            <a:solidFill>
+              <a:srgbClr val="FF0000"/>
+            </a:solidFill>
+          </a:ln>
+        </p:spPr>
+        <p:style>
+          <a:lnRef idx="2">
+            <a:schemeClr val="accent1">
+              <a:shade val="50000"/>
+            </a:schemeClr>
+          </a:lnRef>
+          <a:fillRef idx="1">
+            <a:schemeClr val="accent1"/>
+          </a:fillRef>
+          <a:effectRef idx="0">
+            <a:schemeClr val="accent1"/>
+          </a:effectRef>
+          <a:fontRef idx="minor">
+            <a:schemeClr val="lt1"/>
+          </a:fontRef>
+        </p:style>
+        <p:txBody>
+          <a:bodyPr rtlCol="0" anchor="ctr"/>
+          <a:lstStyle/>
+          <a:p>
+            <a:pPr algn="ctr"/>
+            <a:endParaRPr lang="ru-RU" dirty="0"/>
+          </a:p>
+        </p:txBody>
+      </p:sp>
+      <p:sp>
+        <p:nvSpPr>
+          <p:cNvPr id="12" name="TextBox 11">
+            <a:extLst>
+              <a:ext uri="{FF2B5EF4-FFF2-40B4-BE49-F238E27FC236}">
+                <a16:creationId xmlns:a16="http://schemas.microsoft.com/office/drawing/2014/main" id="{51F4B785-FB5F-4472-8FBE-1ADB4613ACDA}"/>
+              </a:ext>
+            </a:extLst>
+          </p:cNvPr>
+          <p:cNvSpPr txBox="1"/>
+          <p:nvPr/>
+        </p:nvSpPr>
+        <p:spPr>
+          <a:xfrm>
+            <a:off x="203014" y="5887263"/>
+            <a:ext cx="10307052" cy="615553"/>
+          </a:xfrm>
+          <a:prstGeom prst="rect">
+            <a:avLst/>
+          </a:prstGeom>
+          <a:noFill/>
+        </p:spPr>
+        <p:txBody>
+          <a:bodyPr wrap="none" rtlCol="0">
+            <a:spAutoFit/>
+          </a:bodyPr>
+          <a:lstStyle/>
+          <a:p>
+            <a:r>
+              <a:rPr lang="ru-RU" sz="1700" dirty="0">
+                <a:solidFill>
+                  <a:schemeClr val="accent2">
+                    <a:lumMod val="75000"/>
+                  </a:schemeClr>
+                </a:solidFill>
+              </a:rPr>
+              <a:t> </a:t>
+            </a:r>
+            <a:r>
+              <a:rPr lang="ru-RU" sz="1700" dirty="0">
+                <a:solidFill>
+                  <a:schemeClr val="accent2">
+                    <a:lumMod val="50000"/>
+                  </a:schemeClr>
+                </a:solidFill>
+              </a:rPr>
+              <a:t>Разреженная матрица </a:t>
+            </a:r>
+            <a:r>
+              <a:rPr lang="de-DE" sz="1700" dirty="0" err="1">
+                <a:solidFill>
+                  <a:schemeClr val="accent2">
+                    <a:lumMod val="50000"/>
+                  </a:schemeClr>
+                </a:solidFill>
+              </a:rPr>
+              <a:t>tfidf</a:t>
+            </a:r>
+            <a:r>
+              <a:rPr lang="de-DE" sz="1700" dirty="0">
+                <a:solidFill>
+                  <a:schemeClr val="accent2">
+                    <a:lumMod val="50000"/>
+                  </a:schemeClr>
+                </a:solidFill>
+              </a:rPr>
+              <a:t> </a:t>
+            </a:r>
+            <a:r>
+              <a:rPr lang="ru-RU" sz="1700" dirty="0">
+                <a:solidFill>
+                  <a:schemeClr val="accent2">
+                    <a:lumMod val="50000"/>
+                  </a:schemeClr>
+                </a:solidFill>
+              </a:rPr>
+              <a:t>значений для слов оказалась наилучшим балансом количества признаков (26</a:t>
+            </a:r>
+            <a:r>
+              <a:rPr lang="en-US" sz="1700" dirty="0">
+                <a:solidFill>
+                  <a:schemeClr val="accent2">
+                    <a:lumMod val="50000"/>
+                  </a:schemeClr>
+                </a:solidFill>
+              </a:rPr>
+              <a:t>9</a:t>
+            </a:r>
+            <a:r>
+              <a:rPr lang="ru-RU" sz="1700" dirty="0">
+                <a:solidFill>
+                  <a:schemeClr val="accent2">
+                    <a:lumMod val="50000"/>
+                  </a:schemeClr>
+                </a:solidFill>
+              </a:rPr>
+              <a:t>2)</a:t>
+            </a:r>
+          </a:p>
+          <a:p>
+            <a:r>
+              <a:rPr lang="ru-RU" sz="1700" dirty="0">
+                <a:solidFill>
+                  <a:schemeClr val="accent2">
+                    <a:lumMod val="50000"/>
+                  </a:schemeClr>
+                </a:solidFill>
+              </a:rPr>
+              <a:t> и представления </a:t>
+            </a:r>
+            <a:r>
+              <a:rPr lang="ru-RU" sz="1700" dirty="0" err="1">
+                <a:solidFill>
+                  <a:schemeClr val="accent2">
+                    <a:lumMod val="50000"/>
+                  </a:schemeClr>
+                </a:solidFill>
+              </a:rPr>
+              <a:t>датасета</a:t>
+            </a:r>
+            <a:endParaRPr lang="ru-RU" sz="1700" dirty="0">
+              <a:solidFill>
+                <a:schemeClr val="accent2">
+                  <a:lumMod val="50000"/>
+                </a:schemeClr>
+              </a:solidFill>
+            </a:endParaRPr>
+          </a:p>
+        </p:txBody>
+      </p:sp>
+      <p:pic>
+        <p:nvPicPr>
+          <p:cNvPr id="13" name="Рисунок 11" descr="Кубок">
+            <a:extLst>
+              <a:ext uri="{FF2B5EF4-FFF2-40B4-BE49-F238E27FC236}">
+                <a16:creationId xmlns:a16="http://schemas.microsoft.com/office/drawing/2014/main" id="{CEAC49D9-A206-4CD2-81AB-EB4E6AC28E4F}"/>
+              </a:ext>
+            </a:extLst>
+          </p:cNvPr>
+          <p:cNvPicPr>
+            <a:picLocks noChangeAspect="1"/>
+          </p:cNvPicPr>
+          <p:nvPr/>
+        </p:nvPicPr>
+        <p:blipFill>
+          <a:blip r:embed="rId7">
+            <a:extLst>
+              <a:ext uri="{28A0092B-C50C-407E-A947-70E740481C1C}">
+                <a14:useLocalDpi xmlns:a14="http://schemas.microsoft.com/office/drawing/2010/main" val="0"/>
+              </a:ext>
+              <a:ext uri="{96DAC541-7B7A-43D3-8B79-37D633B846F1}">
+                <asvg:svgBlip xmlns:asvg="http://schemas.microsoft.com/office/drawing/2016/SVG/main" r:embed="rId8"/>
+              </a:ext>
+            </a:extLst>
+          </a:blip>
+          <a:stretch>
+            <a:fillRect/>
+          </a:stretch>
+        </p:blipFill>
+        <p:spPr>
+          <a:xfrm>
+            <a:off x="2080917" y="3625570"/>
+            <a:ext cx="440610" cy="440610"/>
+          </a:xfrm>
+          <a:prstGeom prst="rect">
+            <a:avLst/>
+          </a:prstGeom>
+        </p:spPr>
+      </p:pic>
+    </p:spTree>
+    <p:extLst>
+      <p:ext uri="{BB962C8B-B14F-4D97-AF65-F5344CB8AC3E}">
+        <p14:creationId xmlns:p14="http://schemas.microsoft.com/office/powerpoint/2010/main" val="267577766"/>
+      </p:ext>
+    </p:extLst>
+  </p:cSld>
+  <p:clrMapOvr>
+    <a:masterClrMapping/>
+  </p:clrMapOvr>
+</p:sld>
+</file>
+
+<file path=ppt/slides/slide5.xml><?xml version="1.0" encoding="utf-8"?>
 <p:sld xmlns:a="http://schemas.openxmlformats.org/drawingml/2006/main" xmlns:r="http://schemas.openxmlformats.org/officeDocument/2006/relationships" xmlns:p="http://schemas.openxmlformats.org/presentationml/2006/main">
   <p:cSld>
     <p:spTree>
@@ -7264,7 +8155,7 @@
 </p:sld>
 </file>
 
-<file path=ppt/slides/slide5.xml><?xml version="1.0" encoding="utf-8"?>
+<file path=ppt/slides/slide6.xml><?xml version="1.0" encoding="utf-8"?>
 <p:sld xmlns:a="http://schemas.openxmlformats.org/drawingml/2006/main" xmlns:r="http://schemas.openxmlformats.org/officeDocument/2006/relationships" xmlns:p="http://schemas.openxmlformats.org/presentationml/2006/main">
   <p:cSld>
     <p:spTree>
@@ -7356,10 +8247,391 @@
           </a:prstGeom>
         </p:spPr>
       </p:pic>
+      <p:sp>
+        <p:nvSpPr>
+          <p:cNvPr id="3" name="TextBox 2">
+            <a:extLst>
+              <a:ext uri="{FF2B5EF4-FFF2-40B4-BE49-F238E27FC236}">
+                <a16:creationId xmlns:a16="http://schemas.microsoft.com/office/drawing/2014/main" id="{EDD7FB46-F38E-48D1-85D1-1696CDCFA077}"/>
+              </a:ext>
+            </a:extLst>
+          </p:cNvPr>
+          <p:cNvSpPr txBox="1"/>
+          <p:nvPr/>
+        </p:nvSpPr>
+        <p:spPr>
+          <a:xfrm>
+            <a:off x="1185333" y="1885244"/>
+            <a:ext cx="9042400" cy="4524315"/>
+          </a:xfrm>
+          <a:prstGeom prst="rect">
+            <a:avLst/>
+          </a:prstGeom>
+          <a:noFill/>
+        </p:spPr>
+        <p:txBody>
+          <a:bodyPr wrap="square" rtlCol="0">
+            <a:spAutoFit/>
+          </a:bodyPr>
+          <a:lstStyle/>
+          <a:p>
+            <a:pPr marL="342900" indent="-342900">
+              <a:buFont typeface="Wingdings" panose="05000000000000000000" pitchFamily="2" charset="2"/>
+              <a:buChar char="ü"/>
+            </a:pPr>
+            <a:r>
+              <a:rPr lang="ru-RU" dirty="0">
+                <a:solidFill>
+                  <a:schemeClr val="accent2">
+                    <a:lumMod val="50000"/>
+                  </a:schemeClr>
+                </a:solidFill>
+              </a:rPr>
+              <a:t>Нормализация и очистка текста и словаря не приводит к большому выигрышу в качестве</a:t>
+            </a:r>
+          </a:p>
+          <a:p>
+            <a:pPr marL="342900" indent="-342900">
+              <a:buFont typeface="Wingdings" panose="05000000000000000000" pitchFamily="2" charset="2"/>
+              <a:buChar char="ü"/>
+            </a:pPr>
+            <a:endParaRPr lang="ru-RU" dirty="0">
+              <a:solidFill>
+                <a:schemeClr val="accent2">
+                  <a:lumMod val="50000"/>
+                </a:schemeClr>
+              </a:solidFill>
+            </a:endParaRPr>
+          </a:p>
+          <a:p>
+            <a:pPr marL="342900" indent="-342900">
+              <a:buFont typeface="Wingdings" panose="05000000000000000000" pitchFamily="2" charset="2"/>
+              <a:buChar char="ü"/>
+            </a:pPr>
+            <a:r>
+              <a:rPr lang="ru-RU" dirty="0">
+                <a:solidFill>
+                  <a:schemeClr val="accent2">
+                    <a:lumMod val="50000"/>
+                  </a:schemeClr>
+                </a:solidFill>
+              </a:rPr>
+              <a:t>Работа с вектором </a:t>
+            </a:r>
+            <a:r>
+              <a:rPr lang="en-US" dirty="0" err="1">
+                <a:solidFill>
+                  <a:schemeClr val="accent2">
+                    <a:lumMod val="50000"/>
+                  </a:schemeClr>
+                </a:solidFill>
+              </a:rPr>
+              <a:t>tfidf</a:t>
+            </a:r>
+            <a:r>
+              <a:rPr lang="en-US" dirty="0">
+                <a:solidFill>
+                  <a:schemeClr val="accent2">
+                    <a:lumMod val="50000"/>
+                  </a:schemeClr>
+                </a:solidFill>
+              </a:rPr>
+              <a:t> </a:t>
+            </a:r>
+            <a:r>
+              <a:rPr lang="ru-RU" dirty="0">
+                <a:solidFill>
+                  <a:schemeClr val="accent2">
+                    <a:lumMod val="50000"/>
+                  </a:schemeClr>
+                </a:solidFill>
+              </a:rPr>
+              <a:t>дала наилучшие результаты по сравнению с учетом наличия или количества ингредиентов/слов/</a:t>
+            </a:r>
+            <a:r>
+              <a:rPr lang="en-US" dirty="0">
+                <a:solidFill>
+                  <a:schemeClr val="accent2">
+                    <a:lumMod val="50000"/>
+                  </a:schemeClr>
+                </a:solidFill>
+              </a:rPr>
+              <a:t>n-</a:t>
+            </a:r>
+            <a:r>
+              <a:rPr lang="ru-RU" dirty="0">
+                <a:solidFill>
+                  <a:schemeClr val="accent2">
+                    <a:lumMod val="50000"/>
+                  </a:schemeClr>
+                </a:solidFill>
+              </a:rPr>
+              <a:t>грамм. Возможно, более редкие слова действительно оказывают сильное влияние</a:t>
+            </a:r>
+          </a:p>
+          <a:p>
+            <a:pPr marL="342900" indent="-342900">
+              <a:buFont typeface="Wingdings" panose="05000000000000000000" pitchFamily="2" charset="2"/>
+              <a:buChar char="ü"/>
+            </a:pPr>
+            <a:endParaRPr lang="ru-RU" dirty="0">
+              <a:solidFill>
+                <a:schemeClr val="accent2">
+                  <a:lumMod val="50000"/>
+                </a:schemeClr>
+              </a:solidFill>
+            </a:endParaRPr>
+          </a:p>
+          <a:p>
+            <a:pPr marL="342900" indent="-342900">
+              <a:buFont typeface="Wingdings" panose="05000000000000000000" pitchFamily="2" charset="2"/>
+              <a:buChar char="ü"/>
+            </a:pPr>
+            <a:r>
+              <a:rPr lang="ru-RU" dirty="0">
+                <a:solidFill>
+                  <a:schemeClr val="accent2">
+                    <a:lumMod val="50000"/>
+                  </a:schemeClr>
+                </a:solidFill>
+              </a:rPr>
+              <a:t>Большое количество признаков приводит к сильному переобучению (</a:t>
+            </a:r>
+            <a:r>
+              <a:rPr lang="en-US" dirty="0">
+                <a:solidFill>
+                  <a:schemeClr val="accent2">
+                    <a:lumMod val="50000"/>
+                  </a:schemeClr>
+                </a:solidFill>
+              </a:rPr>
+              <a:t>train vs </a:t>
+            </a:r>
+            <a:r>
+              <a:rPr lang="en-US" dirty="0" err="1">
+                <a:solidFill>
+                  <a:schemeClr val="accent2">
+                    <a:lumMod val="50000"/>
+                  </a:schemeClr>
+                </a:solidFill>
+              </a:rPr>
+              <a:t>val</a:t>
+            </a:r>
+            <a:r>
+              <a:rPr lang="ru-RU" dirty="0">
+                <a:solidFill>
+                  <a:schemeClr val="accent2">
+                    <a:lumMod val="50000"/>
+                  </a:schemeClr>
+                </a:solidFill>
+              </a:rPr>
+              <a:t>), однако попытки сократить их количество не увенчались успехом</a:t>
+            </a:r>
+          </a:p>
+          <a:p>
+            <a:pPr marL="342900" indent="-342900">
+              <a:buFont typeface="Wingdings" panose="05000000000000000000" pitchFamily="2" charset="2"/>
+              <a:buChar char="ü"/>
+            </a:pPr>
+            <a:endParaRPr lang="ru-RU" dirty="0">
+              <a:solidFill>
+                <a:schemeClr val="accent2">
+                  <a:lumMod val="50000"/>
+                </a:schemeClr>
+              </a:solidFill>
+            </a:endParaRPr>
+          </a:p>
+          <a:p>
+            <a:pPr marL="342900" indent="-342900">
+              <a:buFont typeface="Wingdings" panose="05000000000000000000" pitchFamily="2" charset="2"/>
+              <a:buChar char="ü"/>
+            </a:pPr>
+            <a:r>
+              <a:rPr lang="ru-RU" dirty="0">
+                <a:solidFill>
+                  <a:schemeClr val="accent2">
+                    <a:lumMod val="50000"/>
+                  </a:schemeClr>
+                </a:solidFill>
+              </a:rPr>
+              <a:t>Более сложные из протестированных моделей </a:t>
+            </a:r>
+            <a:r>
+              <a:rPr lang="en-US" dirty="0">
+                <a:solidFill>
+                  <a:schemeClr val="accent2">
+                    <a:lumMod val="50000"/>
+                  </a:schemeClr>
+                </a:solidFill>
+              </a:rPr>
+              <a:t>- </a:t>
+            </a:r>
+            <a:r>
+              <a:rPr lang="en-US" dirty="0" err="1">
+                <a:solidFill>
+                  <a:schemeClr val="accent2">
+                    <a:lumMod val="50000"/>
+                  </a:schemeClr>
+                </a:solidFill>
+              </a:rPr>
+              <a:t>RandomForest</a:t>
+            </a:r>
+            <a:r>
+              <a:rPr lang="en-US" dirty="0">
+                <a:solidFill>
+                  <a:schemeClr val="accent2">
+                    <a:lumMod val="50000"/>
+                  </a:schemeClr>
+                </a:solidFill>
+              </a:rPr>
+              <a:t>, </a:t>
+            </a:r>
+            <a:r>
+              <a:rPr lang="en-US" dirty="0" err="1">
+                <a:solidFill>
+                  <a:schemeClr val="accent2">
+                    <a:lumMod val="50000"/>
+                  </a:schemeClr>
+                </a:solidFill>
+              </a:rPr>
+              <a:t>Catboost</a:t>
+            </a:r>
+            <a:r>
+              <a:rPr lang="en-US" dirty="0">
+                <a:solidFill>
+                  <a:schemeClr val="accent2">
+                    <a:lumMod val="50000"/>
+                  </a:schemeClr>
+                </a:solidFill>
+              </a:rPr>
+              <a:t> - </a:t>
+            </a:r>
+            <a:r>
+              <a:rPr lang="ru-RU" dirty="0">
+                <a:solidFill>
+                  <a:schemeClr val="accent2">
+                    <a:lumMod val="50000"/>
+                  </a:schemeClr>
+                </a:solidFill>
+              </a:rPr>
+              <a:t>оказались менее эффективными в работе с </a:t>
+            </a:r>
+            <a:r>
+              <a:rPr lang="ru-RU" dirty="0" err="1">
+                <a:solidFill>
+                  <a:schemeClr val="accent2">
+                    <a:lumMod val="50000"/>
+                  </a:schemeClr>
+                </a:solidFill>
+              </a:rPr>
+              <a:t>датасетом</a:t>
+            </a:r>
+            <a:r>
+              <a:rPr lang="ru-RU" dirty="0">
+                <a:solidFill>
+                  <a:schemeClr val="accent2">
+                    <a:lumMod val="50000"/>
+                  </a:schemeClr>
+                </a:solidFill>
+              </a:rPr>
+              <a:t>, чем простые </a:t>
+            </a:r>
+            <a:r>
+              <a:rPr lang="en-US" dirty="0">
+                <a:solidFill>
+                  <a:schemeClr val="accent2">
+                    <a:lumMod val="50000"/>
+                  </a:schemeClr>
+                </a:solidFill>
+              </a:rPr>
+              <a:t>SVC </a:t>
+            </a:r>
+            <a:r>
+              <a:rPr lang="ru-RU" dirty="0">
+                <a:solidFill>
+                  <a:schemeClr val="accent2">
+                    <a:lumMod val="50000"/>
+                  </a:schemeClr>
+                </a:solidFill>
+              </a:rPr>
+              <a:t>и </a:t>
+            </a:r>
+            <a:r>
+              <a:rPr lang="en-US" dirty="0" err="1">
+                <a:solidFill>
+                  <a:schemeClr val="accent2">
+                    <a:lumMod val="50000"/>
+                  </a:schemeClr>
+                </a:solidFill>
+              </a:rPr>
+              <a:t>Lr</a:t>
+            </a:r>
+            <a:r>
+              <a:rPr lang="ru-RU" dirty="0">
+                <a:solidFill>
+                  <a:schemeClr val="accent2">
+                    <a:lumMod val="50000"/>
+                  </a:schemeClr>
+                </a:solidFill>
+              </a:rPr>
+              <a:t>. Возможная причина – большое количество признаков или категорий</a:t>
+            </a:r>
+          </a:p>
+          <a:p>
+            <a:pPr marL="342900" indent="-342900">
+              <a:buFont typeface="Wingdings" panose="05000000000000000000" pitchFamily="2" charset="2"/>
+              <a:buChar char="ü"/>
+            </a:pPr>
+            <a:endParaRPr lang="ru-RU" dirty="0">
+              <a:solidFill>
+                <a:schemeClr val="accent2">
+                  <a:lumMod val="50000"/>
+                </a:schemeClr>
+              </a:solidFill>
+            </a:endParaRPr>
+          </a:p>
+          <a:p>
+            <a:pPr marL="342900" indent="-342900">
+              <a:buFont typeface="Wingdings" panose="05000000000000000000" pitchFamily="2" charset="2"/>
+              <a:buChar char="ü"/>
+            </a:pPr>
+            <a:r>
+              <a:rPr lang="ru-RU" dirty="0">
+                <a:solidFill>
+                  <a:schemeClr val="accent2">
+                    <a:lumMod val="50000"/>
+                  </a:schemeClr>
+                </a:solidFill>
+              </a:rPr>
+              <a:t>Грамотный подбор </a:t>
+            </a:r>
+            <a:r>
+              <a:rPr lang="ru-RU" dirty="0" err="1">
+                <a:solidFill>
+                  <a:schemeClr val="accent2">
+                    <a:lumMod val="50000"/>
+                  </a:schemeClr>
+                </a:solidFill>
+              </a:rPr>
+              <a:t>гиперпараметров</a:t>
+            </a:r>
+            <a:r>
+              <a:rPr lang="ru-RU" dirty="0">
+                <a:solidFill>
+                  <a:schemeClr val="accent2">
+                    <a:lumMod val="50000"/>
+                  </a:schemeClr>
+                </a:solidFill>
+              </a:rPr>
+              <a:t> сыграл свою роль в приросте качества модели (банально, но факт)</a:t>
+            </a:r>
+          </a:p>
+        </p:txBody>
+      </p:sp>
     </p:spTree>
     <p:extLst>
       <p:ext uri="{BB962C8B-B14F-4D97-AF65-F5344CB8AC3E}">
-        <p14:creationId xmlns:p14="http://schemas.microsoft.com/office/powerpoint/2010/main" val="2011050069"/>
+        <p14:creationId xmlns:p14="http://schemas.microsoft.com/office/powerpoint/2010/main" val="2013242646"/>
       </p:ext>
     </p:extLst>
   </p:cSld>

</xml_diff>

<commit_message>
minor changes to slide 6
</commit_message>
<xml_diff>
--- a/whatscooking.pptx
+++ b/whatscooking.pptx
@@ -2,15 +2,15 @@
 <file path=ppt/presentation.xml><?xml version="1.0" encoding="utf-8"?>
 <p:presentation xmlns:a="http://schemas.openxmlformats.org/drawingml/2006/main" xmlns:r="http://schemas.openxmlformats.org/officeDocument/2006/relationships" xmlns:p="http://schemas.openxmlformats.org/presentationml/2006/main" saveSubsetFonts="1">
   <p:sldMasterIdLst>
-    <p:sldMasterId id="2147483648" r:id="rId1"/>
+    <p:sldMasterId id="2147483648" r:id="rId4"/>
   </p:sldMasterIdLst>
   <p:sldIdLst>
-    <p:sldId id="256" r:id="rId2"/>
-    <p:sldId id="261" r:id="rId3"/>
-    <p:sldId id="258" r:id="rId4"/>
-    <p:sldId id="262" r:id="rId5"/>
-    <p:sldId id="259" r:id="rId6"/>
-    <p:sldId id="263" r:id="rId7"/>
+    <p:sldId id="256" r:id="rId5"/>
+    <p:sldId id="261" r:id="rId6"/>
+    <p:sldId id="258" r:id="rId7"/>
+    <p:sldId id="262" r:id="rId8"/>
+    <p:sldId id="259" r:id="rId9"/>
+    <p:sldId id="263" r:id="rId10"/>
   </p:sldIdLst>
   <p:sldSz cx="12192000" cy="6858000"/>
   <p:notesSz cx="6858000" cy="9144000"/>
@@ -6675,36 +6675,13 @@
               </a:rPr>
               <a:t> </a:t>
             </a:r>
-            <a:r>
-              <a:rPr lang="en-US" dirty="0">
-                <a:solidFill>
-                  <a:schemeClr val="accent2">
-                    <a:lumMod val="50000"/>
-                  </a:schemeClr>
-                </a:solidFill>
-              </a:rPr>
-              <a:t>(</a:t>
-            </a:r>
-            <a:r>
-              <a:rPr lang="en-US" dirty="0" err="1">
-                <a:solidFill>
-                  <a:schemeClr val="accent2">
-                    <a:lumMod val="50000"/>
-                  </a:schemeClr>
-                </a:solidFill>
-              </a:rPr>
-              <a:t>SpaCy</a:t>
-            </a:r>
-            <a:r>
-              <a:rPr lang="en-US" dirty="0">
-                <a:solidFill>
-                  <a:schemeClr val="accent2">
-                    <a:lumMod val="50000"/>
-                  </a:schemeClr>
-                </a:solidFill>
-              </a:rPr>
-              <a:t>)</a:t>
-            </a:r>
+            <a:endParaRPr lang="en-US" dirty="0">
+              <a:solidFill>
+                <a:schemeClr val="accent2">
+                  <a:lumMod val="50000"/>
+                </a:schemeClr>
+              </a:solidFill>
+            </a:endParaRPr>
           </a:p>
           <a:p>
             <a:pPr marL="285750" indent="-285750">
@@ -6719,7 +6696,7 @@
                   </a:schemeClr>
                 </a:solidFill>
               </a:rPr>
-              <a:t>склейка в один текст</a:t>
+              <a:t>склейка в одну строку</a:t>
             </a:r>
           </a:p>
           <a:p>
@@ -8142,6 +8119,189 @@
           </a:prstGeom>
         </p:spPr>
       </p:pic>
+      <p:grpSp>
+        <p:nvGrpSpPr>
+          <p:cNvPr id="11" name="Group 10">
+            <a:extLst>
+              <a:ext uri="{FF2B5EF4-FFF2-40B4-BE49-F238E27FC236}">
+                <a16:creationId xmlns:a16="http://schemas.microsoft.com/office/drawing/2014/main" id="{7C85486B-326F-453D-8DA9-A05F922474DB}"/>
+              </a:ext>
+            </a:extLst>
+          </p:cNvPr>
+          <p:cNvGrpSpPr/>
+          <p:nvPr/>
+        </p:nvGrpSpPr>
+        <p:grpSpPr>
+          <a:xfrm>
+            <a:off x="9270085" y="5572637"/>
+            <a:ext cx="2350787" cy="954581"/>
+            <a:chOff x="6549053" y="5594173"/>
+            <a:chExt cx="2350787" cy="954581"/>
+          </a:xfrm>
+        </p:grpSpPr>
+        <p:pic>
+          <p:nvPicPr>
+            <p:cNvPr id="5" name="Picture 4">
+              <a:extLst>
+                <a:ext uri="{FF2B5EF4-FFF2-40B4-BE49-F238E27FC236}">
+                  <a16:creationId xmlns:a16="http://schemas.microsoft.com/office/drawing/2014/main" id="{5EE66C92-85AF-4BA9-A9E9-C9D07009C57E}"/>
+                </a:ext>
+              </a:extLst>
+            </p:cNvPr>
+            <p:cNvPicPr>
+              <a:picLocks noChangeAspect="1"/>
+            </p:cNvPicPr>
+            <p:nvPr/>
+          </p:nvPicPr>
+          <p:blipFill>
+            <a:blip r:embed="rId5"/>
+            <a:stretch>
+              <a:fillRect/>
+            </a:stretch>
+          </p:blipFill>
+          <p:spPr>
+            <a:xfrm>
+              <a:off x="6549053" y="5594173"/>
+              <a:ext cx="2350787" cy="954581"/>
+            </a:xfrm>
+            <a:prstGeom prst="rect">
+              <a:avLst/>
+            </a:prstGeom>
+          </p:spPr>
+        </p:pic>
+        <p:pic>
+          <p:nvPicPr>
+            <p:cNvPr id="3" name="Picture 2">
+              <a:extLst>
+                <a:ext uri="{FF2B5EF4-FFF2-40B4-BE49-F238E27FC236}">
+                  <a16:creationId xmlns:a16="http://schemas.microsoft.com/office/drawing/2014/main" id="{CFC83A9D-82AD-4E0D-802F-506D829A8A7A}"/>
+                </a:ext>
+              </a:extLst>
+            </p:cNvPr>
+            <p:cNvPicPr>
+              <a:picLocks noChangeAspect="1"/>
+            </p:cNvPicPr>
+            <p:nvPr/>
+          </p:nvPicPr>
+          <p:blipFill>
+            <a:blip r:embed="rId6"/>
+            <a:stretch>
+              <a:fillRect/>
+            </a:stretch>
+          </p:blipFill>
+          <p:spPr>
+            <a:xfrm>
+              <a:off x="6666498" y="5913563"/>
+              <a:ext cx="1917728" cy="549349"/>
+            </a:xfrm>
+            <a:prstGeom prst="rect">
+              <a:avLst/>
+            </a:prstGeom>
+          </p:spPr>
+        </p:pic>
+        <p:sp>
+          <p:nvSpPr>
+            <p:cNvPr id="8" name="TextBox 7">
+              <a:extLst>
+                <a:ext uri="{FF2B5EF4-FFF2-40B4-BE49-F238E27FC236}">
+                  <a16:creationId xmlns:a16="http://schemas.microsoft.com/office/drawing/2014/main" id="{ED0D3E3E-D402-458A-9333-A756EC7DF9FD}"/>
+                </a:ext>
+              </a:extLst>
+            </p:cNvPr>
+            <p:cNvSpPr txBox="1"/>
+            <p:nvPr/>
+          </p:nvSpPr>
+          <p:spPr>
+            <a:xfrm>
+              <a:off x="6666499" y="5671698"/>
+              <a:ext cx="1917727" cy="523220"/>
+            </a:xfrm>
+            <a:prstGeom prst="rect">
+              <a:avLst/>
+            </a:prstGeom>
+            <a:solidFill>
+              <a:schemeClr val="bg1"/>
+            </a:solidFill>
+          </p:spPr>
+          <p:txBody>
+            <a:bodyPr wrap="square" rtlCol="0">
+              <a:spAutoFit/>
+            </a:bodyPr>
+            <a:lstStyle/>
+            <a:p>
+              <a:r>
+                <a:rPr lang="ru-RU" sz="1400" dirty="0">
+                  <a:solidFill>
+                    <a:schemeClr val="accent2">
+                      <a:lumMod val="50000"/>
+                    </a:schemeClr>
+                  </a:solidFill>
+                </a:rPr>
+                <a:t>Для сравнения</a:t>
+              </a:r>
+              <a:r>
+                <a:rPr lang="de-DE" sz="1400" dirty="0">
+                  <a:solidFill>
+                    <a:schemeClr val="accent2">
+                      <a:lumMod val="50000"/>
+                    </a:schemeClr>
+                  </a:solidFill>
+                </a:rPr>
+                <a:t> </a:t>
+              </a:r>
+              <a:r>
+                <a:rPr lang="ru-RU" sz="1400" dirty="0">
+                  <a:solidFill>
+                    <a:schemeClr val="accent2">
+                      <a:lumMod val="50000"/>
+                    </a:schemeClr>
+                  </a:solidFill>
+                </a:rPr>
+                <a:t>:</a:t>
+              </a:r>
+            </a:p>
+            <a:p>
+              <a:r>
+                <a:rPr lang="de-DE" sz="1400" dirty="0" err="1">
+                  <a:solidFill>
+                    <a:schemeClr val="accent2">
+                      <a:lumMod val="50000"/>
+                    </a:schemeClr>
+                  </a:solidFill>
+                </a:rPr>
+                <a:t>kaggle</a:t>
+              </a:r>
+              <a:r>
+                <a:rPr lang="de-DE" sz="1400" dirty="0">
+                  <a:solidFill>
+                    <a:schemeClr val="accent2">
+                      <a:lumMod val="50000"/>
+                    </a:schemeClr>
+                  </a:solidFill>
+                </a:rPr>
+                <a:t> </a:t>
+              </a:r>
+              <a:r>
+                <a:rPr lang="de-DE" sz="1400" dirty="0" err="1">
+                  <a:solidFill>
+                    <a:schemeClr val="accent2">
+                      <a:lumMod val="50000"/>
+                    </a:schemeClr>
+                  </a:solidFill>
+                </a:rPr>
+                <a:t>leader</a:t>
+              </a:r>
+              <a:endParaRPr lang="ru-RU" sz="1400" dirty="0">
+                <a:solidFill>
+                  <a:schemeClr val="accent2">
+                    <a:lumMod val="50000"/>
+                  </a:schemeClr>
+                </a:solidFill>
+              </a:endParaRPr>
+            </a:p>
+          </p:txBody>
+        </p:sp>
+      </p:grpSp>
     </p:spTree>
     <p:extLst>
       <p:ext uri="{BB962C8B-B14F-4D97-AF65-F5344CB8AC3E}">
@@ -8934,4 +9094,278 @@
     </a:ext>
   </a:extLst>
 </a:theme>
+</file>
+
+<file path=customXml/item1.xml><?xml version="1.0" encoding="utf-8"?>
+<ct:contentTypeSchema xmlns:ct="http://schemas.microsoft.com/office/2006/metadata/contentType" xmlns:ma="http://schemas.microsoft.com/office/2006/metadata/properties/metaAttributes" ct:_="" ma:_="" ma:contentTypeName="Document" ma:contentTypeID="0x010100122A0CA4A2A2F8409DCF2765C70B4D34" ma:contentTypeVersion="13" ma:contentTypeDescription="Create a new document." ma:contentTypeScope="" ma:versionID="93d5752c5ac13a0c2e83a135c926ffed">
+  <xsd:schema xmlns:xsd="http://www.w3.org/2001/XMLSchema" xmlns:xs="http://www.w3.org/2001/XMLSchema" xmlns:p="http://schemas.microsoft.com/office/2006/metadata/properties" xmlns:ns3="f07d5986-07b8-4cf7-abbe-5648f1e96b33" xmlns:ns4="ae7fafb6-85c5-4e8d-abcd-f1655374da4a" targetNamespace="http://schemas.microsoft.com/office/2006/metadata/properties" ma:root="true" ma:fieldsID="bf8b175c5edfda514c6aa2e5e2d673c5" ns3:_="" ns4:_="">
+    <xsd:import namespace="f07d5986-07b8-4cf7-abbe-5648f1e96b33"/>
+    <xsd:import namespace="ae7fafb6-85c5-4e8d-abcd-f1655374da4a"/>
+    <xsd:element name="properties">
+      <xsd:complexType>
+        <xsd:sequence>
+          <xsd:element name="documentManagement">
+            <xsd:complexType>
+              <xsd:all>
+                <xsd:element ref="ns3:SharedWithUsers" minOccurs="0"/>
+                <xsd:element ref="ns3:SharedWithDetails" minOccurs="0"/>
+                <xsd:element ref="ns3:SharingHintHash" minOccurs="0"/>
+                <xsd:element ref="ns4:MediaServiceMetadata" minOccurs="0"/>
+                <xsd:element ref="ns4:MediaServiceFastMetadata" minOccurs="0"/>
+                <xsd:element ref="ns4:MediaServiceAutoTags" minOccurs="0"/>
+                <xsd:element ref="ns4:MediaServiceGenerationTime" minOccurs="0"/>
+                <xsd:element ref="ns4:MediaServiceEventHashCode" minOccurs="0"/>
+                <xsd:element ref="ns4:MediaServiceDateTaken" minOccurs="0"/>
+                <xsd:element ref="ns4:MediaServiceOCR" minOccurs="0"/>
+                <xsd:element ref="ns4:MediaLengthInSeconds" minOccurs="0"/>
+                <xsd:element ref="ns4:MediaServiceAutoKeyPoints" minOccurs="0"/>
+                <xsd:element ref="ns4:MediaServiceKeyPoints" minOccurs="0"/>
+              </xsd:all>
+            </xsd:complexType>
+          </xsd:element>
+        </xsd:sequence>
+      </xsd:complexType>
+    </xsd:element>
+  </xsd:schema>
+  <xsd:schema xmlns:xsd="http://www.w3.org/2001/XMLSchema" xmlns:xs="http://www.w3.org/2001/XMLSchema" xmlns:dms="http://schemas.microsoft.com/office/2006/documentManagement/types" xmlns:pc="http://schemas.microsoft.com/office/infopath/2007/PartnerControls" targetNamespace="f07d5986-07b8-4cf7-abbe-5648f1e96b33" elementFormDefault="qualified">
+    <xsd:import namespace="http://schemas.microsoft.com/office/2006/documentManagement/types"/>
+    <xsd:import namespace="http://schemas.microsoft.com/office/infopath/2007/PartnerControls"/>
+    <xsd:element name="SharedWithUsers" ma:index="8" nillable="true" ma:displayName="Shared With" ma:internalName="SharedWithUsers" ma:readOnly="true">
+      <xsd:complexType>
+        <xsd:complexContent>
+          <xsd:extension base="dms:UserMulti">
+            <xsd:sequence>
+              <xsd:element name="UserInfo" minOccurs="0" maxOccurs="unbounded">
+                <xsd:complexType>
+                  <xsd:sequence>
+                    <xsd:element name="DisplayName" type="xsd:string" minOccurs="0"/>
+                    <xsd:element name="AccountId" type="dms:UserId" minOccurs="0" nillable="true"/>
+                    <xsd:element name="AccountType" type="xsd:string" minOccurs="0"/>
+                  </xsd:sequence>
+                </xsd:complexType>
+              </xsd:element>
+            </xsd:sequence>
+          </xsd:extension>
+        </xsd:complexContent>
+      </xsd:complexType>
+    </xsd:element>
+    <xsd:element name="SharedWithDetails" ma:index="9" nillable="true" ma:displayName="Shared With Details" ma:internalName="SharedWithDetails" ma:readOnly="true">
+      <xsd:simpleType>
+        <xsd:restriction base="dms:Note">
+          <xsd:maxLength value="255"/>
+        </xsd:restriction>
+      </xsd:simpleType>
+    </xsd:element>
+    <xsd:element name="SharingHintHash" ma:index="10" nillable="true" ma:displayName="Sharing Hint Hash" ma:hidden="true" ma:internalName="SharingHintHash" ma:readOnly="true">
+      <xsd:simpleType>
+        <xsd:restriction base="dms:Text"/>
+      </xsd:simpleType>
+    </xsd:element>
+  </xsd:schema>
+  <xsd:schema xmlns:xsd="http://www.w3.org/2001/XMLSchema" xmlns:xs="http://www.w3.org/2001/XMLSchema" xmlns:dms="http://schemas.microsoft.com/office/2006/documentManagement/types" xmlns:pc="http://schemas.microsoft.com/office/infopath/2007/PartnerControls" targetNamespace="ae7fafb6-85c5-4e8d-abcd-f1655374da4a" elementFormDefault="qualified">
+    <xsd:import namespace="http://schemas.microsoft.com/office/2006/documentManagement/types"/>
+    <xsd:import namespace="http://schemas.microsoft.com/office/infopath/2007/PartnerControls"/>
+    <xsd:element name="MediaServiceMetadata" ma:index="11" nillable="true" ma:displayName="MediaServiceMetadata" ma:hidden="true" ma:internalName="MediaServiceMetadata" ma:readOnly="true">
+      <xsd:simpleType>
+        <xsd:restriction base="dms:Note"/>
+      </xsd:simpleType>
+    </xsd:element>
+    <xsd:element name="MediaServiceFastMetadata" ma:index="12" nillable="true" ma:displayName="MediaServiceFastMetadata" ma:hidden="true" ma:internalName="MediaServiceFastMetadata" ma:readOnly="true">
+      <xsd:simpleType>
+        <xsd:restriction base="dms:Note"/>
+      </xsd:simpleType>
+    </xsd:element>
+    <xsd:element name="MediaServiceAutoTags" ma:index="13" nillable="true" ma:displayName="Tags" ma:internalName="MediaServiceAutoTags" ma:readOnly="true">
+      <xsd:simpleType>
+        <xsd:restriction base="dms:Text"/>
+      </xsd:simpleType>
+    </xsd:element>
+    <xsd:element name="MediaServiceGenerationTime" ma:index="14" nillable="true" ma:displayName="MediaServiceGenerationTime" ma:hidden="true" ma:internalName="MediaServiceGenerationTime" ma:readOnly="true">
+      <xsd:simpleType>
+        <xsd:restriction base="dms:Text"/>
+      </xsd:simpleType>
+    </xsd:element>
+    <xsd:element name="MediaServiceEventHashCode" ma:index="15" nillable="true" ma:displayName="MediaServiceEventHashCode" ma:hidden="true" ma:internalName="MediaServiceEventHashCode" ma:readOnly="true">
+      <xsd:simpleType>
+        <xsd:restriction base="dms:Text"/>
+      </xsd:simpleType>
+    </xsd:element>
+    <xsd:element name="MediaServiceDateTaken" ma:index="16" nillable="true" ma:displayName="MediaServiceDateTaken" ma:hidden="true" ma:internalName="MediaServiceDateTaken" ma:readOnly="true">
+      <xsd:simpleType>
+        <xsd:restriction base="dms:Text"/>
+      </xsd:simpleType>
+    </xsd:element>
+    <xsd:element name="MediaServiceOCR" ma:index="17" nillable="true" ma:displayName="Extracted Text" ma:internalName="MediaServiceOCR" ma:readOnly="true">
+      <xsd:simpleType>
+        <xsd:restriction base="dms:Note">
+          <xsd:maxLength value="255"/>
+        </xsd:restriction>
+      </xsd:simpleType>
+    </xsd:element>
+    <xsd:element name="MediaLengthInSeconds" ma:index="18" nillable="true" ma:displayName="Length (seconds)" ma:internalName="MediaLengthInSeconds" ma:readOnly="true">
+      <xsd:simpleType>
+        <xsd:restriction base="dms:Unknown"/>
+      </xsd:simpleType>
+    </xsd:element>
+    <xsd:element name="MediaServiceAutoKeyPoints" ma:index="19" nillable="true" ma:displayName="MediaServiceAutoKeyPoints" ma:hidden="true" ma:internalName="MediaServiceAutoKeyPoints" ma:readOnly="true">
+      <xsd:simpleType>
+        <xsd:restriction base="dms:Note"/>
+      </xsd:simpleType>
+    </xsd:element>
+    <xsd:element name="MediaServiceKeyPoints" ma:index="20" nillable="true" ma:displayName="KeyPoints" ma:internalName="MediaServiceKeyPoints" ma:readOnly="true">
+      <xsd:simpleType>
+        <xsd:restriction base="dms:Note">
+          <xsd:maxLength value="255"/>
+        </xsd:restriction>
+      </xsd:simpleType>
+    </xsd:element>
+  </xsd:schema>
+  <xsd:schema xmlns="http://schemas.openxmlformats.org/package/2006/metadata/core-properties" xmlns:xsd="http://www.w3.org/2001/XMLSchema" xmlns:xsi="http://www.w3.org/2001/XMLSchema-instance" xmlns:dc="http://purl.org/dc/elements/1.1/" xmlns:dcterms="http://purl.org/dc/terms/" xmlns:odoc="http://schemas.microsoft.com/internal/obd" targetNamespace="http://schemas.openxmlformats.org/package/2006/metadata/core-properties" elementFormDefault="qualified" attributeFormDefault="unqualified" blockDefault="#all">
+    <xsd:import namespace="http://purl.org/dc/elements/1.1/" schemaLocation="http://dublincore.org/schemas/xmls/qdc/2003/04/02/dc.xsd"/>
+    <xsd:import namespace="http://purl.org/dc/terms/" schemaLocation="http://dublincore.org/schemas/xmls/qdc/2003/04/02/dcterms.xsd"/>
+    <xsd:element name="coreProperties" type="CT_coreProperties"/>
+    <xsd:complexType name="CT_coreProperties">
+      <xsd:all>
+        <xsd:element ref="dc:creator" minOccurs="0" maxOccurs="1"/>
+        <xsd:element ref="dcterms:created" minOccurs="0" maxOccurs="1"/>
+        <xsd:element ref="dc:identifier" minOccurs="0" maxOccurs="1"/>
+        <xsd:element name="contentType" minOccurs="0" maxOccurs="1" type="xsd:string" ma:index="0" ma:displayName="Content Type"/>
+        <xsd:element ref="dc:title" minOccurs="0" maxOccurs="1" ma:index="4" ma:displayName="Title"/>
+        <xsd:element ref="dc:subject" minOccurs="0" maxOccurs="1"/>
+        <xsd:element ref="dc:description" minOccurs="0" maxOccurs="1"/>
+        <xsd:element name="keywords" minOccurs="0" maxOccurs="1" type="xsd:string"/>
+        <xsd:element ref="dc:language" minOccurs="0" maxOccurs="1"/>
+        <xsd:element name="category" minOccurs="0" maxOccurs="1" type="xsd:string"/>
+        <xsd:element name="version" minOccurs="0" maxOccurs="1" type="xsd:string"/>
+        <xsd:element name="revision" minOccurs="0" maxOccurs="1" type="xsd:string">
+          <xsd:annotation>
+            <xsd:documentation>
+                        This value indicates the number of saves or revisions. The application is responsible for updating this value after each revision.
+                    </xsd:documentation>
+          </xsd:annotation>
+        </xsd:element>
+        <xsd:element name="lastModifiedBy" minOccurs="0" maxOccurs="1" type="xsd:string"/>
+        <xsd:element ref="dcterms:modified" minOccurs="0" maxOccurs="1"/>
+        <xsd:element name="contentStatus" minOccurs="0" maxOccurs="1" type="xsd:string"/>
+      </xsd:all>
+    </xsd:complexType>
+  </xsd:schema>
+  <xs:schema xmlns:pc="http://schemas.microsoft.com/office/infopath/2007/PartnerControls" xmlns:xs="http://www.w3.org/2001/XMLSchema" targetNamespace="http://schemas.microsoft.com/office/infopath/2007/PartnerControls" elementFormDefault="qualified" attributeFormDefault="unqualified">
+    <xs:element name="Person">
+      <xs:complexType>
+        <xs:sequence>
+          <xs:element ref="pc:DisplayName" minOccurs="0"/>
+          <xs:element ref="pc:AccountId" minOccurs="0"/>
+          <xs:element ref="pc:AccountType" minOccurs="0"/>
+        </xs:sequence>
+      </xs:complexType>
+    </xs:element>
+    <xs:element name="DisplayName" type="xs:string"/>
+    <xs:element name="AccountId" type="xs:string"/>
+    <xs:element name="AccountType" type="xs:string"/>
+    <xs:element name="BDCAssociatedEntity">
+      <xs:complexType>
+        <xs:sequence>
+          <xs:element ref="pc:BDCEntity" minOccurs="0" maxOccurs="unbounded"/>
+        </xs:sequence>
+        <xs:attribute ref="pc:EntityNamespace"/>
+        <xs:attribute ref="pc:EntityName"/>
+        <xs:attribute ref="pc:SystemInstanceName"/>
+        <xs:attribute ref="pc:AssociationName"/>
+      </xs:complexType>
+    </xs:element>
+    <xs:attribute name="EntityNamespace" type="xs:string"/>
+    <xs:attribute name="EntityName" type="xs:string"/>
+    <xs:attribute name="SystemInstanceName" type="xs:string"/>
+    <xs:attribute name="AssociationName" type="xs:string"/>
+    <xs:element name="BDCEntity">
+      <xs:complexType>
+        <xs:sequence>
+          <xs:element ref="pc:EntityDisplayName" minOccurs="0"/>
+          <xs:element ref="pc:EntityInstanceReference" minOccurs="0"/>
+          <xs:element ref="pc:EntityId1" minOccurs="0"/>
+          <xs:element ref="pc:EntityId2" minOccurs="0"/>
+          <xs:element ref="pc:EntityId3" minOccurs="0"/>
+          <xs:element ref="pc:EntityId4" minOccurs="0"/>
+          <xs:element ref="pc:EntityId5" minOccurs="0"/>
+        </xs:sequence>
+      </xs:complexType>
+    </xs:element>
+    <xs:element name="EntityDisplayName" type="xs:string"/>
+    <xs:element name="EntityInstanceReference" type="xs:string"/>
+    <xs:element name="EntityId1" type="xs:string"/>
+    <xs:element name="EntityId2" type="xs:string"/>
+    <xs:element name="EntityId3" type="xs:string"/>
+    <xs:element name="EntityId4" type="xs:string"/>
+    <xs:element name="EntityId5" type="xs:string"/>
+    <xs:element name="Terms">
+      <xs:complexType>
+        <xs:sequence>
+          <xs:element ref="pc:TermInfo" minOccurs="0" maxOccurs="unbounded"/>
+        </xs:sequence>
+      </xs:complexType>
+    </xs:element>
+    <xs:element name="TermInfo">
+      <xs:complexType>
+        <xs:sequence>
+          <xs:element ref="pc:TermName" minOccurs="0"/>
+          <xs:element ref="pc:TermId" minOccurs="0"/>
+        </xs:sequence>
+      </xs:complexType>
+    </xs:element>
+    <xs:element name="TermName" type="xs:string"/>
+    <xs:element name="TermId" type="xs:string"/>
+  </xs:schema>
+</ct:contentTypeSchema>
+</file>
+
+<file path=customXml/item2.xml><?xml version="1.0" encoding="utf-8"?>
+<?mso-contentType ?>
+<FormTemplates xmlns="http://schemas.microsoft.com/sharepoint/v3/contenttype/forms">
+  <Display>DocumentLibraryForm</Display>
+  <Edit>DocumentLibraryForm</Edit>
+  <New>DocumentLibraryForm</New>
+</FormTemplates>
+</file>
+
+<file path=customXml/item3.xml><?xml version="1.0" encoding="utf-8"?>
+<p:properties xmlns:p="http://schemas.microsoft.com/office/2006/metadata/properties" xmlns:xsi="http://www.w3.org/2001/XMLSchema-instance" xmlns:pc="http://schemas.microsoft.com/office/infopath/2007/PartnerControls">
+  <documentManagement/>
+</p:properties>
+</file>
+
+<file path=customXml/itemProps1.xml><?xml version="1.0" encoding="utf-8"?>
+<ds:datastoreItem xmlns:ds="http://schemas.openxmlformats.org/officeDocument/2006/customXml" ds:itemID="{70506F18-DFCF-4144-BA5C-14538EB47843}">
+  <ds:schemaRefs>
+    <ds:schemaRef ds:uri="http://schemas.microsoft.com/office/2006/metadata/contentType"/>
+    <ds:schemaRef ds:uri="http://schemas.microsoft.com/office/2006/metadata/properties/metaAttributes"/>
+    <ds:schemaRef ds:uri="http://www.w3.org/2001/XMLSchema"/>
+    <ds:schemaRef ds:uri="http://schemas.microsoft.com/office/2006/metadata/properties"/>
+    <ds:schemaRef ds:uri="f07d5986-07b8-4cf7-abbe-5648f1e96b33"/>
+    <ds:schemaRef ds:uri="ae7fafb6-85c5-4e8d-abcd-f1655374da4a"/>
+    <ds:schemaRef ds:uri="http://schemas.microsoft.com/office/2006/documentManagement/types"/>
+    <ds:schemaRef ds:uri="http://schemas.microsoft.com/office/infopath/2007/PartnerControls"/>
+    <ds:schemaRef ds:uri="http://schemas.openxmlformats.org/package/2006/metadata/core-properties"/>
+    <ds:schemaRef ds:uri="http://purl.org/dc/elements/1.1/"/>
+    <ds:schemaRef ds:uri="http://purl.org/dc/terms/"/>
+    <ds:schemaRef ds:uri="http://schemas.microsoft.com/internal/obd"/>
+  </ds:schemaRefs>
+</ds:datastoreItem>
+</file>
+
+<file path=customXml/itemProps2.xml><?xml version="1.0" encoding="utf-8"?>
+<ds:datastoreItem xmlns:ds="http://schemas.openxmlformats.org/officeDocument/2006/customXml" ds:itemID="{15A4D5CB-5409-4A5F-BAA0-C138DD5333CA}">
+  <ds:schemaRefs>
+    <ds:schemaRef ds:uri="http://schemas.microsoft.com/sharepoint/v3/contenttype/forms"/>
+  </ds:schemaRefs>
+</ds:datastoreItem>
+</file>
+
+<file path=customXml/itemProps3.xml><?xml version="1.0" encoding="utf-8"?>
+<ds:datastoreItem xmlns:ds="http://schemas.openxmlformats.org/officeDocument/2006/customXml" ds:itemID="{51FE3230-792D-4F78-9CBA-36B71781F45D}">
+  <ds:schemaRefs>
+    <ds:schemaRef ds:uri="http://schemas.microsoft.com/office/2006/metadata/properties"/>
+    <ds:schemaRef ds:uri="http://schemas.microsoft.com/office/infopath/2007/PartnerControls"/>
+  </ds:schemaRefs>
+</ds:datastoreItem>
 </file>
</xml_diff>

<commit_message>
add baseline, LightGBM score, changes to slide 6 conclusion about classifier types
</commit_message>
<xml_diff>
--- a/whatscooking.pptx
+++ b/whatscooking.pptx
@@ -264,7 +264,7 @@
           <a:p>
             <a:fld id="{1EADCE8D-6A8D-4A51-9A58-657A5970637E}" type="datetimeFigureOut">
               <a:rPr lang="ru-RU" smtClean="0"/>
-              <a:t>22.12.2021</a:t>
+              <a:t>23.12.2021</a:t>
             </a:fld>
             <a:endParaRPr lang="ru-RU"/>
           </a:p>
@@ -462,7 +462,7 @@
           <a:p>
             <a:fld id="{1EADCE8D-6A8D-4A51-9A58-657A5970637E}" type="datetimeFigureOut">
               <a:rPr lang="ru-RU" smtClean="0"/>
-              <a:t>22.12.2021</a:t>
+              <a:t>23.12.2021</a:t>
             </a:fld>
             <a:endParaRPr lang="ru-RU"/>
           </a:p>
@@ -670,7 +670,7 @@
           <a:p>
             <a:fld id="{1EADCE8D-6A8D-4A51-9A58-657A5970637E}" type="datetimeFigureOut">
               <a:rPr lang="ru-RU" smtClean="0"/>
-              <a:t>22.12.2021</a:t>
+              <a:t>23.12.2021</a:t>
             </a:fld>
             <a:endParaRPr lang="ru-RU"/>
           </a:p>
@@ -868,7 +868,7 @@
           <a:p>
             <a:fld id="{1EADCE8D-6A8D-4A51-9A58-657A5970637E}" type="datetimeFigureOut">
               <a:rPr lang="ru-RU" smtClean="0"/>
-              <a:t>22.12.2021</a:t>
+              <a:t>23.12.2021</a:t>
             </a:fld>
             <a:endParaRPr lang="ru-RU"/>
           </a:p>
@@ -1143,7 +1143,7 @@
           <a:p>
             <a:fld id="{1EADCE8D-6A8D-4A51-9A58-657A5970637E}" type="datetimeFigureOut">
               <a:rPr lang="ru-RU" smtClean="0"/>
-              <a:t>22.12.2021</a:t>
+              <a:t>23.12.2021</a:t>
             </a:fld>
             <a:endParaRPr lang="ru-RU"/>
           </a:p>
@@ -1408,7 +1408,7 @@
           <a:p>
             <a:fld id="{1EADCE8D-6A8D-4A51-9A58-657A5970637E}" type="datetimeFigureOut">
               <a:rPr lang="ru-RU" smtClean="0"/>
-              <a:t>22.12.2021</a:t>
+              <a:t>23.12.2021</a:t>
             </a:fld>
             <a:endParaRPr lang="ru-RU"/>
           </a:p>
@@ -1820,7 +1820,7 @@
           <a:p>
             <a:fld id="{1EADCE8D-6A8D-4A51-9A58-657A5970637E}" type="datetimeFigureOut">
               <a:rPr lang="ru-RU" smtClean="0"/>
-              <a:t>22.12.2021</a:t>
+              <a:t>23.12.2021</a:t>
             </a:fld>
             <a:endParaRPr lang="ru-RU"/>
           </a:p>
@@ -1961,7 +1961,7 @@
           <a:p>
             <a:fld id="{1EADCE8D-6A8D-4A51-9A58-657A5970637E}" type="datetimeFigureOut">
               <a:rPr lang="ru-RU" smtClean="0"/>
-              <a:t>22.12.2021</a:t>
+              <a:t>23.12.2021</a:t>
             </a:fld>
             <a:endParaRPr lang="ru-RU"/>
           </a:p>
@@ -2074,7 +2074,7 @@
           <a:p>
             <a:fld id="{1EADCE8D-6A8D-4A51-9A58-657A5970637E}" type="datetimeFigureOut">
               <a:rPr lang="ru-RU" smtClean="0"/>
-              <a:t>22.12.2021</a:t>
+              <a:t>23.12.2021</a:t>
             </a:fld>
             <a:endParaRPr lang="ru-RU"/>
           </a:p>
@@ -2385,7 +2385,7 @@
           <a:p>
             <a:fld id="{1EADCE8D-6A8D-4A51-9A58-657A5970637E}" type="datetimeFigureOut">
               <a:rPr lang="ru-RU" smtClean="0"/>
-              <a:t>22.12.2021</a:t>
+              <a:t>23.12.2021</a:t>
             </a:fld>
             <a:endParaRPr lang="ru-RU"/>
           </a:p>
@@ -2673,7 +2673,7 @@
           <a:p>
             <a:fld id="{1EADCE8D-6A8D-4A51-9A58-657A5970637E}" type="datetimeFigureOut">
               <a:rPr lang="ru-RU" smtClean="0"/>
-              <a:t>22.12.2021</a:t>
+              <a:t>23.12.2021</a:t>
             </a:fld>
             <a:endParaRPr lang="ru-RU"/>
           </a:p>
@@ -2914,7 +2914,7 @@
           <a:p>
             <a:fld id="{1EADCE8D-6A8D-4A51-9A58-657A5970637E}" type="datetimeFigureOut">
               <a:rPr lang="ru-RU" smtClean="0"/>
-              <a:t>22.12.2021</a:t>
+              <a:t>23.12.2021</a:t>
             </a:fld>
             <a:endParaRPr lang="ru-RU"/>
           </a:p>
@@ -3970,7 +3970,7 @@
         <p:spPr>
           <a:xfrm>
             <a:off x="297032" y="4975834"/>
-            <a:ext cx="11492514" cy="1477328"/>
+            <a:ext cx="11492514" cy="1754326"/>
           </a:xfrm>
           <a:prstGeom prst="rect">
             <a:avLst/>
@@ -3991,7 +3991,28 @@
                   </a:schemeClr>
                 </a:solidFill>
               </a:rPr>
-              <a:t>Baseline model		</a:t>
+              <a:t>Baseline model</a:t>
+            </a:r>
+          </a:p>
+          <a:p>
+            <a:endParaRPr lang="en-US" b="1" dirty="0">
+              <a:solidFill>
+                <a:schemeClr val="accent2">
+                  <a:lumMod val="50000"/>
+                </a:schemeClr>
+              </a:solidFill>
+            </a:endParaRPr>
+          </a:p>
+          <a:p>
+            <a:r>
+              <a:rPr lang="en-US" dirty="0" err="1">
+                <a:solidFill>
+                  <a:schemeClr val="accent2">
+                    <a:lumMod val="50000"/>
+                  </a:schemeClr>
+                </a:solidFill>
+              </a:rPr>
+              <a:t>sparknlp</a:t>
             </a:r>
             <a:r>
               <a:rPr lang="en-US" dirty="0">
@@ -4001,8 +4022,92 @@
                   </a:schemeClr>
                 </a:solidFill>
               </a:rPr>
-              <a:t>Kaggle score: 0.69046</a:t>
-            </a:r>
+              <a:t>: </a:t>
+            </a:r>
+            <a:r>
+              <a:rPr lang="en-US" dirty="0" err="1">
+                <a:solidFill>
+                  <a:schemeClr val="accent2">
+                    <a:lumMod val="50000"/>
+                  </a:schemeClr>
+                </a:solidFill>
+              </a:rPr>
+              <a:t>UniversalSentenceEncoder.pretrained</a:t>
+            </a:r>
+            <a:r>
+              <a:rPr lang="en-US" dirty="0">
+                <a:solidFill>
+                  <a:schemeClr val="accent2">
+                    <a:lumMod val="50000"/>
+                  </a:schemeClr>
+                </a:solidFill>
+              </a:rPr>
+              <a:t> (</a:t>
+            </a:r>
+            <a:r>
+              <a:rPr lang="ru-RU" dirty="0" err="1">
+                <a:solidFill>
+                  <a:schemeClr val="accent2">
+                    <a:lumMod val="50000"/>
+                  </a:schemeClr>
+                </a:solidFill>
+              </a:rPr>
+              <a:t>предобученная</a:t>
+            </a:r>
+            <a:r>
+              <a:rPr lang="ru-RU" dirty="0">
+                <a:solidFill>
+                  <a:schemeClr val="accent2">
+                    <a:lumMod val="50000"/>
+                  </a:schemeClr>
+                </a:solidFill>
+              </a:rPr>
+              <a:t> модель для кодирования текстов в виде векторов</a:t>
+            </a:r>
+            <a:r>
+              <a:rPr lang="en-US" dirty="0">
+                <a:solidFill>
+                  <a:schemeClr val="accent2">
+                    <a:lumMod val="50000"/>
+                  </a:schemeClr>
+                </a:solidFill>
+              </a:rPr>
+              <a:t>)</a:t>
+            </a:r>
+          </a:p>
+          <a:p>
+            <a:r>
+              <a:rPr lang="en-US" dirty="0">
+                <a:solidFill>
+                  <a:schemeClr val="accent2">
+                    <a:lumMod val="50000"/>
+                  </a:schemeClr>
+                </a:solidFill>
+              </a:rPr>
+              <a:t>	+ </a:t>
+            </a:r>
+            <a:r>
+              <a:rPr lang="en-US" dirty="0" err="1">
+                <a:solidFill>
+                  <a:schemeClr val="accent2">
+                    <a:lumMod val="50000"/>
+                  </a:schemeClr>
+                </a:solidFill>
+              </a:rPr>
+              <a:t>ClassifierDLApproach</a:t>
+            </a:r>
+            <a:r>
+              <a:rPr lang="ru-RU" dirty="0">
+                <a:solidFill>
+                  <a:schemeClr val="accent2">
+                    <a:lumMod val="50000"/>
+                  </a:schemeClr>
+                </a:solidFill>
+              </a:rPr>
+              <a:t> (классификатор текстов на основе нейронных сетей)</a:t>
+            </a:r>
+          </a:p>
+          <a:p>
             <a:endParaRPr lang="ru-RU" dirty="0">
               <a:solidFill>
                 <a:schemeClr val="accent2">
@@ -4012,24 +4117,16 @@
             </a:endParaRPr>
           </a:p>
           <a:p>
-            <a:endParaRPr lang="en-US" b="1" dirty="0">
-              <a:solidFill>
-                <a:schemeClr val="accent2">
-                  <a:lumMod val="50000"/>
-                </a:schemeClr>
-              </a:solidFill>
-            </a:endParaRPr>
-          </a:p>
-          <a:p>
-            <a:endParaRPr lang="en-US" b="1" dirty="0">
-              <a:solidFill>
-                <a:schemeClr val="accent2">
-                  <a:lumMod val="50000"/>
-                </a:schemeClr>
-              </a:solidFill>
-            </a:endParaRPr>
-          </a:p>
-          <a:p>
+            <a:r>
+              <a:rPr lang="en-US" dirty="0">
+                <a:solidFill>
+                  <a:schemeClr val="accent2">
+                    <a:lumMod val="50000"/>
+                  </a:schemeClr>
+                </a:solidFill>
+              </a:rPr>
+              <a:t>Kaggle score: </a:t>
+            </a:r>
             <a:r>
               <a:rPr lang="en-US" b="1" dirty="0">
                 <a:solidFill>
@@ -4038,19 +4135,17 @@
                   </a:schemeClr>
                 </a:solidFill>
               </a:rPr>
-              <a:t>-</a:t>
-            </a:r>
-          </a:p>
-          <a:p>
-            <a:r>
-              <a:rPr lang="en-US" b="1" dirty="0">
-                <a:solidFill>
-                  <a:schemeClr val="accent2">
-                    <a:lumMod val="50000"/>
-                  </a:schemeClr>
-                </a:solidFill>
-              </a:rPr>
-              <a:t>-</a:t>
+              <a:t>0.</a:t>
+            </a:r>
+            <a:r>
+              <a:rPr lang="ru-RU" b="1" dirty="0">
+                <a:solidFill>
+                  <a:schemeClr val="accent2">
+                    <a:lumMod val="50000"/>
+                  </a:schemeClr>
+                </a:solidFill>
+              </a:rPr>
+              <a:t>28278</a:t>
             </a:r>
           </a:p>
         </p:txBody>
@@ -5138,6 +5233,112 @@
           </a:p>
         </p:txBody>
       </p:sp>
+      <p:sp>
+        <p:nvSpPr>
+          <p:cNvPr id="16" name="Прямоугольник: скругленные углы 15">
+            <a:extLst>
+              <a:ext uri="{FF2B5EF4-FFF2-40B4-BE49-F238E27FC236}">
+                <a16:creationId xmlns:a16="http://schemas.microsoft.com/office/drawing/2014/main" id="{A3C3D236-30C3-45E6-B63F-C69445A27EB9}"/>
+              </a:ext>
+            </a:extLst>
+          </p:cNvPr>
+          <p:cNvSpPr/>
+          <p:nvPr/>
+        </p:nvSpPr>
+        <p:spPr>
+          <a:xfrm>
+            <a:off x="2549249" y="6223526"/>
+            <a:ext cx="5045597" cy="546000"/>
+          </a:xfrm>
+          <a:prstGeom prst="roundRect">
+            <a:avLst/>
+          </a:prstGeom>
+          <a:ln>
+            <a:solidFill>
+              <a:schemeClr val="accent4">
+                <a:lumMod val="50000"/>
+              </a:schemeClr>
+            </a:solidFill>
+          </a:ln>
+        </p:spPr>
+        <p:style>
+          <a:lnRef idx="2">
+            <a:schemeClr val="accent6"/>
+          </a:lnRef>
+          <a:fillRef idx="1">
+            <a:schemeClr val="lt1"/>
+          </a:fillRef>
+          <a:effectRef idx="0">
+            <a:schemeClr val="accent6"/>
+          </a:effectRef>
+          <a:fontRef idx="minor">
+            <a:schemeClr val="dk1"/>
+          </a:fontRef>
+        </p:style>
+        <p:txBody>
+          <a:bodyPr rtlCol="0" anchor="ctr"/>
+          <a:lstStyle/>
+          <a:p>
+            <a:pPr algn="r"/>
+            <a:r>
+              <a:rPr lang="en-US" dirty="0">
+                <a:solidFill>
+                  <a:schemeClr val="accent4">
+                    <a:lumMod val="50000"/>
+                  </a:schemeClr>
+                </a:solidFill>
+              </a:rPr>
+              <a:t>Never use a shotgun when a flyswatter will do</a:t>
+            </a:r>
+            <a:endParaRPr lang="ru-RU" dirty="0">
+              <a:solidFill>
+                <a:schemeClr val="accent4">
+                  <a:lumMod val="50000"/>
+                </a:schemeClr>
+              </a:solidFill>
+            </a:endParaRPr>
+          </a:p>
+        </p:txBody>
+      </p:sp>
+      <p:pic>
+        <p:nvPicPr>
+          <p:cNvPr id="17" name="Рисунок 16" descr="Предупреждение">
+            <a:extLst>
+              <a:ext uri="{FF2B5EF4-FFF2-40B4-BE49-F238E27FC236}">
+                <a16:creationId xmlns:a16="http://schemas.microsoft.com/office/drawing/2014/main" id="{350C8ABB-28E5-4DED-B9C6-BFA3DF1560AB}"/>
+              </a:ext>
+            </a:extLst>
+          </p:cNvPr>
+          <p:cNvPicPr>
+            <a:picLocks noChangeAspect="1"/>
+          </p:cNvPicPr>
+          <p:nvPr/>
+        </p:nvPicPr>
+        <p:blipFill>
+          <a:blip r:embed="rId4">
+            <a:extLst>
+              <a:ext uri="{28A0092B-C50C-407E-A947-70E740481C1C}">
+                <a14:useLocalDpi xmlns:a14="http://schemas.microsoft.com/office/drawing/2010/main" val="0"/>
+              </a:ext>
+              <a:ext uri="{96DAC541-7B7A-43D3-8B79-37D633B846F1}">
+                <asvg:svgBlip xmlns:asvg="http://schemas.microsoft.com/office/drawing/2016/SVG/main" r:embed="rId5"/>
+              </a:ext>
+            </a:extLst>
+          </a:blip>
+          <a:stretch>
+            <a:fillRect/>
+          </a:stretch>
+        </p:blipFill>
+        <p:spPr>
+          <a:xfrm>
+            <a:off x="2642400" y="6256271"/>
+            <a:ext cx="480509" cy="480509"/>
+          </a:xfrm>
+          <a:prstGeom prst="rect">
+            <a:avLst/>
+          </a:prstGeom>
+        </p:spPr>
+      </p:pic>
     </p:spTree>
     <p:extLst>
       <p:ext uri="{BB962C8B-B14F-4D97-AF65-F5344CB8AC3E}">
@@ -6522,7 +6723,7 @@
         </p:nvSpPr>
         <p:spPr>
           <a:xfrm>
-            <a:off x="1373080" y="365125"/>
+            <a:off x="1373080" y="311859"/>
             <a:ext cx="4583837" cy="1325563"/>
           </a:xfrm>
         </p:spPr>
@@ -6593,7 +6794,7 @@
         </p:nvSpPr>
         <p:spPr>
           <a:xfrm>
-            <a:off x="6096000" y="1078660"/>
+            <a:off x="6235085" y="561974"/>
             <a:ext cx="4206791" cy="1754326"/>
           </a:xfrm>
           <a:prstGeom prst="rect">
@@ -6734,12 +6935,249 @@
           </a:p>
         </p:txBody>
       </p:sp>
+      <p:sp>
+        <p:nvSpPr>
+          <p:cNvPr id="10" name="Правая фигурная скобка 9">
+            <a:extLst>
+              <a:ext uri="{FF2B5EF4-FFF2-40B4-BE49-F238E27FC236}">
+                <a16:creationId xmlns:a16="http://schemas.microsoft.com/office/drawing/2014/main" id="{441F8DFA-D55A-4404-A1AC-076914CAD0E2}"/>
+              </a:ext>
+            </a:extLst>
+          </p:cNvPr>
+          <p:cNvSpPr/>
+          <p:nvPr/>
+        </p:nvSpPr>
+        <p:spPr>
+          <a:xfrm rot="16200000">
+            <a:off x="7948487" y="-1007842"/>
+            <a:ext cx="322532" cy="7128771"/>
+          </a:xfrm>
+          <a:prstGeom prst="rightBrace">
+            <a:avLst>
+              <a:gd name="adj1" fmla="val 8333"/>
+              <a:gd name="adj2" fmla="val 50247"/>
+            </a:avLst>
+          </a:prstGeom>
+          <a:ln w="28575">
+            <a:solidFill>
+              <a:schemeClr val="accent2">
+                <a:lumMod val="50000"/>
+              </a:schemeClr>
+            </a:solidFill>
+          </a:ln>
+        </p:spPr>
+        <p:style>
+          <a:lnRef idx="1">
+            <a:schemeClr val="dk1"/>
+          </a:lnRef>
+          <a:fillRef idx="0">
+            <a:schemeClr val="dk1"/>
+          </a:fillRef>
+          <a:effectRef idx="0">
+            <a:schemeClr val="dk1"/>
+          </a:effectRef>
+          <a:fontRef idx="minor">
+            <a:schemeClr val="tx1"/>
+          </a:fontRef>
+        </p:style>
+        <p:txBody>
+          <a:bodyPr rtlCol="0" anchor="ctr"/>
+          <a:lstStyle/>
+          <a:p>
+            <a:pPr algn="ctr"/>
+            <a:endParaRPr lang="ru-RU" b="1" dirty="0"/>
+          </a:p>
+        </p:txBody>
+      </p:sp>
+      <p:grpSp>
+        <p:nvGrpSpPr>
+          <p:cNvPr id="11" name="Group 10">
+            <a:extLst>
+              <a:ext uri="{FF2B5EF4-FFF2-40B4-BE49-F238E27FC236}">
+                <a16:creationId xmlns:a16="http://schemas.microsoft.com/office/drawing/2014/main" id="{7C85486B-326F-453D-8DA9-A05F922474DB}"/>
+              </a:ext>
+            </a:extLst>
+          </p:cNvPr>
+          <p:cNvGrpSpPr/>
+          <p:nvPr/>
+        </p:nvGrpSpPr>
+        <p:grpSpPr>
+          <a:xfrm>
+            <a:off x="9425442" y="5503960"/>
+            <a:ext cx="2350787" cy="954581"/>
+            <a:chOff x="6549053" y="5594173"/>
+            <a:chExt cx="2350787" cy="954581"/>
+          </a:xfrm>
+        </p:grpSpPr>
+        <p:pic>
+          <p:nvPicPr>
+            <p:cNvPr id="5" name="Picture 4">
+              <a:extLst>
+                <a:ext uri="{FF2B5EF4-FFF2-40B4-BE49-F238E27FC236}">
+                  <a16:creationId xmlns:a16="http://schemas.microsoft.com/office/drawing/2014/main" id="{5EE66C92-85AF-4BA9-A9E9-C9D07009C57E}"/>
+                </a:ext>
+              </a:extLst>
+            </p:cNvPr>
+            <p:cNvPicPr>
+              <a:picLocks noChangeAspect="1"/>
+            </p:cNvPicPr>
+            <p:nvPr/>
+          </p:nvPicPr>
+          <p:blipFill>
+            <a:blip r:embed="rId3"/>
+            <a:stretch>
+              <a:fillRect/>
+            </a:stretch>
+          </p:blipFill>
+          <p:spPr>
+            <a:xfrm>
+              <a:off x="6549053" y="5594173"/>
+              <a:ext cx="2350787" cy="954581"/>
+            </a:xfrm>
+            <a:prstGeom prst="rect">
+              <a:avLst/>
+            </a:prstGeom>
+          </p:spPr>
+        </p:pic>
+        <p:pic>
+          <p:nvPicPr>
+            <p:cNvPr id="3" name="Picture 2">
+              <a:extLst>
+                <a:ext uri="{FF2B5EF4-FFF2-40B4-BE49-F238E27FC236}">
+                  <a16:creationId xmlns:a16="http://schemas.microsoft.com/office/drawing/2014/main" id="{CFC83A9D-82AD-4E0D-802F-506D829A8A7A}"/>
+                </a:ext>
+              </a:extLst>
+            </p:cNvPr>
+            <p:cNvPicPr>
+              <a:picLocks noChangeAspect="1"/>
+            </p:cNvPicPr>
+            <p:nvPr/>
+          </p:nvPicPr>
+          <p:blipFill>
+            <a:blip r:embed="rId4"/>
+            <a:stretch>
+              <a:fillRect/>
+            </a:stretch>
+          </p:blipFill>
+          <p:spPr>
+            <a:xfrm>
+              <a:off x="6666498" y="5913563"/>
+              <a:ext cx="1917728" cy="549349"/>
+            </a:xfrm>
+            <a:prstGeom prst="rect">
+              <a:avLst/>
+            </a:prstGeom>
+          </p:spPr>
+        </p:pic>
+        <p:sp>
+          <p:nvSpPr>
+            <p:cNvPr id="8" name="TextBox 7">
+              <a:extLst>
+                <a:ext uri="{FF2B5EF4-FFF2-40B4-BE49-F238E27FC236}">
+                  <a16:creationId xmlns:a16="http://schemas.microsoft.com/office/drawing/2014/main" id="{ED0D3E3E-D402-458A-9333-A756EC7DF9FD}"/>
+                </a:ext>
+              </a:extLst>
+            </p:cNvPr>
+            <p:cNvSpPr txBox="1"/>
+            <p:nvPr/>
+          </p:nvSpPr>
+          <p:spPr>
+            <a:xfrm>
+              <a:off x="6666499" y="5671698"/>
+              <a:ext cx="1917727" cy="523220"/>
+            </a:xfrm>
+            <a:prstGeom prst="rect">
+              <a:avLst/>
+            </a:prstGeom>
+            <a:solidFill>
+              <a:schemeClr val="bg1"/>
+            </a:solidFill>
+          </p:spPr>
+          <p:txBody>
+            <a:bodyPr wrap="square" rtlCol="0">
+              <a:spAutoFit/>
+            </a:bodyPr>
+            <a:lstStyle/>
+            <a:p>
+              <a:r>
+                <a:rPr lang="ru-RU" sz="1400" dirty="0">
+                  <a:solidFill>
+                    <a:schemeClr val="accent2">
+                      <a:lumMod val="50000"/>
+                    </a:schemeClr>
+                  </a:solidFill>
+                </a:rPr>
+                <a:t>Для сравнения</a:t>
+              </a:r>
+              <a:r>
+                <a:rPr lang="de-DE" sz="1400" dirty="0">
+                  <a:solidFill>
+                    <a:schemeClr val="accent2">
+                      <a:lumMod val="50000"/>
+                    </a:schemeClr>
+                  </a:solidFill>
+                </a:rPr>
+                <a:t> </a:t>
+              </a:r>
+              <a:r>
+                <a:rPr lang="ru-RU" sz="1400" dirty="0">
+                  <a:solidFill>
+                    <a:schemeClr val="accent2">
+                      <a:lumMod val="50000"/>
+                    </a:schemeClr>
+                  </a:solidFill>
+                </a:rPr>
+                <a:t>:</a:t>
+              </a:r>
+            </a:p>
+            <a:p>
+              <a:r>
+                <a:rPr lang="de-DE" sz="1400" dirty="0" err="1">
+                  <a:solidFill>
+                    <a:schemeClr val="accent2">
+                      <a:lumMod val="50000"/>
+                    </a:schemeClr>
+                  </a:solidFill>
+                </a:rPr>
+                <a:t>kaggle</a:t>
+              </a:r>
+              <a:r>
+                <a:rPr lang="de-DE" sz="1400" dirty="0">
+                  <a:solidFill>
+                    <a:schemeClr val="accent2">
+                      <a:lumMod val="50000"/>
+                    </a:schemeClr>
+                  </a:solidFill>
+                </a:rPr>
+                <a:t> </a:t>
+              </a:r>
+              <a:r>
+                <a:rPr lang="de-DE" sz="1400" dirty="0" err="1">
+                  <a:solidFill>
+                    <a:schemeClr val="accent2">
+                      <a:lumMod val="50000"/>
+                    </a:schemeClr>
+                  </a:solidFill>
+                </a:rPr>
+                <a:t>leader</a:t>
+              </a:r>
+              <a:endParaRPr lang="ru-RU" sz="1400" dirty="0">
+                <a:solidFill>
+                  <a:schemeClr val="accent2">
+                    <a:lumMod val="50000"/>
+                  </a:schemeClr>
+                </a:solidFill>
+              </a:endParaRPr>
+            </a:p>
+          </p:txBody>
+        </p:sp>
+      </p:grpSp>
       <p:graphicFrame>
         <p:nvGraphicFramePr>
-          <p:cNvPr id="9" name="Таблица 9">
-            <a:extLst>
-              <a:ext uri="{FF2B5EF4-FFF2-40B4-BE49-F238E27FC236}">
-                <a16:creationId xmlns:a16="http://schemas.microsoft.com/office/drawing/2014/main" id="{F0250C28-C118-4100-8695-A5E3C88F605A}"/>
+          <p:cNvPr id="13" name="Таблица 9">
+            <a:extLst>
+              <a:ext uri="{FF2B5EF4-FFF2-40B4-BE49-F238E27FC236}">
+                <a16:creationId xmlns:a16="http://schemas.microsoft.com/office/drawing/2014/main" id="{F0A26086-5157-4FAE-8802-6D6693091EAA}"/>
               </a:ext>
             </a:extLst>
           </p:cNvPr>
@@ -6749,14 +7187,14 @@
           <p:nvPr>
             <p:extLst>
               <p:ext uri="{D42A27DB-BD31-4B8C-83A1-F6EECF244321}">
-                <p14:modId xmlns:p14="http://schemas.microsoft.com/office/powerpoint/2010/main" val="3555482329"/>
+                <p14:modId xmlns:p14="http://schemas.microsoft.com/office/powerpoint/2010/main" val="1979503947"/>
               </p:ext>
             </p:extLst>
           </p:nvPr>
         </p:nvGraphicFramePr>
         <p:xfrm>
-          <a:off x="597255" y="3356335"/>
-          <a:ext cx="11121269" cy="2123440"/>
+          <a:off x="661385" y="2816601"/>
+          <a:ext cx="11114844" cy="2489777"/>
         </p:xfrm>
         <a:graphic>
           <a:graphicData uri="http://schemas.openxmlformats.org/drawingml/2006/table">
@@ -6765,28 +7203,35 @@
                 <a:tableStyleId>{5C22544A-7EE6-4342-B048-85BDC9FD1C3A}</a:tableStyleId>
               </a:tblPr>
               <a:tblGrid>
-                <a:gridCol w="1570302">
+                <a:gridCol w="1569395">
                   <a:extLst>
                     <a:ext uri="{9D8B030D-6E8A-4147-A177-3AD203B41FA5}">
                       <a16:colId xmlns:a16="http://schemas.microsoft.com/office/drawing/2014/main" val="1851153114"/>
                     </a:ext>
                   </a:extLst>
                 </a:gridCol>
-                <a:gridCol w="3002683">
+                <a:gridCol w="2216730">
                   <a:extLst>
                     <a:ext uri="{9D8B030D-6E8A-4147-A177-3AD203B41FA5}">
                       <a16:colId xmlns:a16="http://schemas.microsoft.com/office/drawing/2014/main" val="2480650698"/>
                     </a:ext>
                   </a:extLst>
                 </a:gridCol>
-                <a:gridCol w="3468042">
+                <a:gridCol w="2413331">
                   <a:extLst>
                     <a:ext uri="{9D8B030D-6E8A-4147-A177-3AD203B41FA5}">
                       <a16:colId xmlns:a16="http://schemas.microsoft.com/office/drawing/2014/main" val="3705659127"/>
                     </a:ext>
                   </a:extLst>
                 </a:gridCol>
-                <a:gridCol w="3080242">
+                <a:gridCol w="2513978">
+                  <a:extLst>
+                    <a:ext uri="{9D8B030D-6E8A-4147-A177-3AD203B41FA5}">
+                      <a16:colId xmlns:a16="http://schemas.microsoft.com/office/drawing/2014/main" val="637651014"/>
+                    </a:ext>
+                  </a:extLst>
+                </a:gridCol>
+                <a:gridCol w="2401410">
                   <a:extLst>
                     <a:ext uri="{9D8B030D-6E8A-4147-A177-3AD203B41FA5}">
                       <a16:colId xmlns:a16="http://schemas.microsoft.com/office/drawing/2014/main" val="2160169083"/>
@@ -6794,7 +7239,7 @@
                   </a:extLst>
                 </a:gridCol>
               </a:tblGrid>
-              <a:tr h="370840">
+              <a:tr h="1006073">
                 <a:tc>
                   <a:txBody>
                     <a:bodyPr/>
@@ -6803,7 +7248,7 @@
                       <a:endParaRPr lang="ru-RU" b="0" dirty="0"/>
                     </a:p>
                   </a:txBody>
-                  <a:tcPr>
+                  <a:tcPr anchor="ctr">
                     <a:lnB w="12700" cap="flat" cmpd="sng" algn="ctr">
                       <a:solidFill>
                         <a:schemeClr val="tx1"/>
@@ -6830,10 +7275,73 @@
                         <a:rPr lang="en-US" dirty="0"/>
                         <a:t>Baseline:</a:t>
                       </a:r>
-                      <a:endParaRPr lang="ru-RU" dirty="0"/>
+                    </a:p>
+                    <a:p>
+                      <a:pPr algn="ctr"/>
+                      <a:r>
+                        <a:rPr lang="en-US" sz="1400" b="0" dirty="0" err="1">
+                          <a:solidFill>
+                            <a:schemeClr val="bg1"/>
+                          </a:solidFill>
+                        </a:rPr>
+                        <a:t>UniversalSentenceEncoder</a:t>
+                      </a:r>
+                      <a:r>
+                        <a:rPr lang="en-US" sz="1400" b="0" dirty="0">
+                          <a:solidFill>
+                            <a:schemeClr val="bg1"/>
+                          </a:solidFill>
+                        </a:rPr>
+                        <a:t> + </a:t>
+                      </a:r>
+                      <a:r>
+                        <a:rPr lang="en-US" sz="1400" b="0" dirty="0" err="1">
+                          <a:solidFill>
+                            <a:schemeClr val="bg1"/>
+                          </a:solidFill>
+                        </a:rPr>
+                        <a:t>ClassifierDLApproach</a:t>
+                      </a:r>
+                      <a:endParaRPr lang="en-US" sz="1400" b="0" dirty="0">
+                        <a:solidFill>
+                          <a:schemeClr val="bg1"/>
+                        </a:solidFill>
+                      </a:endParaRPr>
+                    </a:p>
+                    <a:p>
+                      <a:pPr algn="ctr"/>
+                      <a:r>
+                        <a:rPr lang="en-US" sz="1400" b="0" dirty="0">
+                          <a:solidFill>
+                            <a:schemeClr val="bg1"/>
+                          </a:solidFill>
+                        </a:rPr>
+                        <a:t>(</a:t>
+                      </a:r>
+                      <a:r>
+                        <a:rPr lang="en-US" sz="1400" b="0" dirty="0" err="1">
+                          <a:solidFill>
+                            <a:schemeClr val="bg1"/>
+                          </a:solidFill>
+                        </a:rPr>
+                        <a:t>sparknlp</a:t>
+                      </a:r>
+                      <a:r>
+                        <a:rPr lang="en-US" sz="1400" b="0" dirty="0">
+                          <a:solidFill>
+                            <a:schemeClr val="bg1"/>
+                          </a:solidFill>
+                        </a:rPr>
+                        <a:t>)</a:t>
+                      </a:r>
+                      <a:endParaRPr lang="ru-RU" sz="1400" b="0" dirty="0">
+                        <a:solidFill>
+                          <a:schemeClr val="bg1"/>
+                        </a:solidFill>
+                      </a:endParaRPr>
                     </a:p>
                   </a:txBody>
-                  <a:tcPr>
+                  <a:tcPr anchor="ctr">
                     <a:lnB w="12700" cap="flat" cmpd="sng" algn="ctr">
                       <a:solidFill>
                         <a:schemeClr val="tx1"/>
@@ -6894,7 +7402,61 @@
                       </a:r>
                     </a:p>
                   </a:txBody>
-                  <a:tcPr>
+                  <a:tcPr anchor="ctr">
+                    <a:lnB w="12700" cap="flat" cmpd="sng" algn="ctr">
+                      <a:solidFill>
+                        <a:schemeClr val="tx1"/>
+                      </a:solidFill>
+                      <a:prstDash val="solid"/>
+                      <a:round/>
+                      <a:headEnd type="none" w="med" len="med"/>
+                      <a:tailEnd type="none" w="med" len="med"/>
+                    </a:lnB>
+                    <a:solidFill>
+                      <a:schemeClr val="accent2">
+                        <a:lumMod val="75000"/>
+                      </a:schemeClr>
+                    </a:solidFill>
+                  </a:tcPr>
+                </a:tc>
+                <a:tc>
+                  <a:txBody>
+                    <a:bodyPr/>
+                    <a:lstStyle/>
+                    <a:p>
+                      <a:pPr algn="ctr"/>
+                      <a:r>
+                        <a:rPr lang="en-US" b="1" dirty="0" err="1"/>
+                        <a:t>LightGBM</a:t>
+                      </a:r>
+                      <a:endParaRPr lang="en-US" b="1" dirty="0"/>
+                    </a:p>
+                    <a:p>
+                      <a:pPr algn="ctr"/>
+                      <a:r>
+                        <a:rPr lang="en-US" b="0" dirty="0"/>
+                        <a:t>(</a:t>
+                      </a:r>
+                      <a:r>
+                        <a:rPr lang="en-US" b="0" dirty="0" err="1"/>
+                        <a:t>min_child_samples</a:t>
+                      </a:r>
+                      <a:r>
+                        <a:rPr lang="en-US" b="0" dirty="0"/>
+                        <a:t>=10, </a:t>
+                      </a:r>
+                      <a:r>
+                        <a:rPr lang="en-US" b="0" dirty="0" err="1"/>
+                        <a:t>n_estimators</a:t>
+                      </a:r>
+                      <a:r>
+                        <a:rPr lang="en-US" b="0" dirty="0"/>
+                        <a:t>=200)</a:t>
+                      </a:r>
+                      <a:endParaRPr lang="ru-RU" b="0" dirty="0"/>
+                    </a:p>
+                  </a:txBody>
+                  <a:tcPr anchor="ctr">
                     <a:lnB w="12700" cap="flat" cmpd="sng" algn="ctr">
                       <a:solidFill>
                         <a:schemeClr val="tx1"/>
@@ -6931,7 +7493,7 @@
                       <a:endParaRPr lang="ru-RU" b="0" dirty="0"/>
                     </a:p>
                   </a:txBody>
-                  <a:tcPr>
+                  <a:tcPr anchor="ctr">
                     <a:lnB w="12700" cap="flat" cmpd="sng" algn="ctr">
                       <a:solidFill>
                         <a:schemeClr val="tx1"/>
@@ -6954,7 +7516,7 @@
                   </a:ext>
                 </a:extLst>
               </a:tr>
-              <a:tr h="370840">
+              <a:tr h="370926">
                 <a:tc>
                   <a:txBody>
                     <a:bodyPr/>
@@ -7025,6 +7587,16 @@
                     <a:lstStyle/>
                     <a:p>
                       <a:pPr algn="ctr"/>
+                      <a:r>
+                        <a:rPr lang="en-US" dirty="0">
+                          <a:solidFill>
+                            <a:schemeClr val="accent2">
+                              <a:lumMod val="50000"/>
+                            </a:schemeClr>
+                          </a:solidFill>
+                        </a:rPr>
+                        <a:t>-</a:t>
+                      </a:r>
                       <a:endParaRPr lang="ru-RU" dirty="0">
                         <a:solidFill>
                           <a:schemeClr val="accent2">
@@ -7146,6 +7718,64 @@
                     <a:p>
                       <a:pPr algn="ctr"/>
                       <a:r>
+                        <a:rPr lang="ru-RU" dirty="0">
+                          <a:solidFill>
+                            <a:schemeClr val="accent2">
+                              <a:lumMod val="50000"/>
+                            </a:schemeClr>
+                          </a:solidFill>
+                        </a:rPr>
+                        <a:t>0.999</a:t>
+                      </a:r>
+                    </a:p>
+                  </a:txBody>
+                  <a:tcPr>
+                    <a:lnL w="12700" cap="flat" cmpd="sng" algn="ctr">
+                      <a:solidFill>
+                        <a:schemeClr val="tx1"/>
+                      </a:solidFill>
+                      <a:prstDash val="solid"/>
+                      <a:round/>
+                      <a:headEnd type="none" w="med" len="med"/>
+                      <a:tailEnd type="none" w="med" len="med"/>
+                    </a:lnL>
+                    <a:lnR w="12700" cap="flat" cmpd="sng" algn="ctr">
+                      <a:solidFill>
+                        <a:schemeClr val="tx1"/>
+                      </a:solidFill>
+                      <a:prstDash val="solid"/>
+                      <a:round/>
+                      <a:headEnd type="none" w="med" len="med"/>
+                      <a:tailEnd type="none" w="med" len="med"/>
+                    </a:lnR>
+                    <a:lnT w="12700" cap="flat" cmpd="sng" algn="ctr">
+                      <a:solidFill>
+                        <a:schemeClr val="tx1"/>
+                      </a:solidFill>
+                      <a:prstDash val="solid"/>
+                      <a:round/>
+                      <a:headEnd type="none" w="med" len="med"/>
+                      <a:tailEnd type="none" w="med" len="med"/>
+                    </a:lnT>
+                    <a:lnB w="12700" cap="flat" cmpd="sng" algn="ctr">
+                      <a:solidFill>
+                        <a:schemeClr val="tx1"/>
+                      </a:solidFill>
+                      <a:prstDash val="solid"/>
+                      <a:round/>
+                      <a:headEnd type="none" w="med" len="med"/>
+                      <a:tailEnd type="none" w="med" len="med"/>
+                    </a:lnB>
+                    <a:noFill/>
+                  </a:tcPr>
+                </a:tc>
+                <a:tc>
+                  <a:txBody>
+                    <a:bodyPr/>
+                    <a:lstStyle/>
+                    <a:p>
+                      <a:pPr algn="ctr"/>
+                      <a:r>
                         <a:rPr lang="en-US" dirty="0">
                           <a:solidFill>
                             <a:schemeClr val="accent2">
@@ -7210,7 +7840,7 @@
                   </a:ext>
                 </a:extLst>
               </a:tr>
-              <a:tr h="370840">
+              <a:tr h="370926">
                 <a:tc>
                   <a:txBody>
                     <a:bodyPr/>
@@ -7281,6 +7911,16 @@
                     <a:lstStyle/>
                     <a:p>
                       <a:pPr algn="ctr"/>
+                      <a:r>
+                        <a:rPr lang="en-US" dirty="0">
+                          <a:solidFill>
+                            <a:schemeClr val="accent2">
+                              <a:lumMod val="50000"/>
+                            </a:schemeClr>
+                          </a:solidFill>
+                        </a:rPr>
+                        <a:t>-</a:t>
+                      </a:r>
                       <a:endParaRPr lang="ru-RU" dirty="0">
                         <a:solidFill>
                           <a:schemeClr val="accent2">
@@ -7409,6 +8049,71 @@
                             </a:schemeClr>
                           </a:solidFill>
                         </a:rPr>
+                        <a:t>0.797</a:t>
+                      </a:r>
+                      <a:endParaRPr lang="ru-RU" dirty="0">
+                        <a:solidFill>
+                          <a:schemeClr val="accent2">
+                            <a:lumMod val="50000"/>
+                          </a:schemeClr>
+                        </a:solidFill>
+                      </a:endParaRPr>
+                    </a:p>
+                  </a:txBody>
+                  <a:tcPr>
+                    <a:lnL w="12700" cap="flat" cmpd="sng" algn="ctr">
+                      <a:solidFill>
+                        <a:schemeClr val="tx1"/>
+                      </a:solidFill>
+                      <a:prstDash val="solid"/>
+                      <a:round/>
+                      <a:headEnd type="none" w="med" len="med"/>
+                      <a:tailEnd type="none" w="med" len="med"/>
+                    </a:lnL>
+                    <a:lnR w="12700" cap="flat" cmpd="sng" algn="ctr">
+                      <a:solidFill>
+                        <a:schemeClr val="tx1"/>
+                      </a:solidFill>
+                      <a:prstDash val="solid"/>
+                      <a:round/>
+                      <a:headEnd type="none" w="med" len="med"/>
+                      <a:tailEnd type="none" w="med" len="med"/>
+                    </a:lnR>
+                    <a:lnT w="12700" cap="flat" cmpd="sng" algn="ctr">
+                      <a:solidFill>
+                        <a:schemeClr val="tx1"/>
+                      </a:solidFill>
+                      <a:prstDash val="solid"/>
+                      <a:round/>
+                      <a:headEnd type="none" w="med" len="med"/>
+                      <a:tailEnd type="none" w="med" len="med"/>
+                    </a:lnT>
+                    <a:lnB w="12700" cap="flat" cmpd="sng" algn="ctr">
+                      <a:solidFill>
+                        <a:schemeClr val="tx1"/>
+                      </a:solidFill>
+                      <a:prstDash val="solid"/>
+                      <a:round/>
+                      <a:headEnd type="none" w="med" len="med"/>
+                      <a:tailEnd type="none" w="med" len="med"/>
+                    </a:lnB>
+                    <a:noFill/>
+                  </a:tcPr>
+                </a:tc>
+                <a:tc>
+                  <a:txBody>
+                    <a:bodyPr/>
+                    <a:lstStyle/>
+                    <a:p>
+                      <a:pPr algn="ctr"/>
+                      <a:r>
+                        <a:rPr lang="en-US" dirty="0">
+                          <a:solidFill>
+                            <a:schemeClr val="accent2">
+                              <a:lumMod val="50000"/>
+                            </a:schemeClr>
+                          </a:solidFill>
+                        </a:rPr>
                         <a:t>0.811</a:t>
                       </a:r>
                       <a:endParaRPr lang="ru-RU" dirty="0">
@@ -7466,7 +8171,7 @@
                   </a:ext>
                 </a:extLst>
               </a:tr>
-              <a:tr h="370840">
+              <a:tr h="370926">
                 <a:tc>
                   <a:txBody>
                     <a:bodyPr/>
@@ -7547,6 +8252,16 @@
                     <a:lstStyle/>
                     <a:p>
                       <a:pPr algn="ctr"/>
+                      <a:r>
+                        <a:rPr lang="en-US" dirty="0">
+                          <a:solidFill>
+                            <a:schemeClr val="accent2">
+                              <a:lumMod val="50000"/>
+                            </a:schemeClr>
+                          </a:solidFill>
+                        </a:rPr>
+                        <a:t>0.543</a:t>
+                      </a:r>
                       <a:endParaRPr lang="ru-RU" dirty="0">
                         <a:solidFill>
                           <a:schemeClr val="accent2">
@@ -7675,6 +8390,71 @@
                             </a:schemeClr>
                           </a:solidFill>
                         </a:rPr>
+                        <a:t>0.792</a:t>
+                      </a:r>
+                      <a:endParaRPr lang="ru-RU" dirty="0">
+                        <a:solidFill>
+                          <a:schemeClr val="accent2">
+                            <a:lumMod val="50000"/>
+                          </a:schemeClr>
+                        </a:solidFill>
+                      </a:endParaRPr>
+                    </a:p>
+                  </a:txBody>
+                  <a:tcPr>
+                    <a:lnL w="12700" cap="flat" cmpd="sng" algn="ctr">
+                      <a:solidFill>
+                        <a:schemeClr val="tx1"/>
+                      </a:solidFill>
+                      <a:prstDash val="solid"/>
+                      <a:round/>
+                      <a:headEnd type="none" w="med" len="med"/>
+                      <a:tailEnd type="none" w="med" len="med"/>
+                    </a:lnL>
+                    <a:lnR w="12700" cap="flat" cmpd="sng" algn="ctr">
+                      <a:solidFill>
+                        <a:schemeClr val="tx1"/>
+                      </a:solidFill>
+                      <a:prstDash val="solid"/>
+                      <a:round/>
+                      <a:headEnd type="none" w="med" len="med"/>
+                      <a:tailEnd type="none" w="med" len="med"/>
+                    </a:lnR>
+                    <a:lnT w="12700" cap="flat" cmpd="sng" algn="ctr">
+                      <a:solidFill>
+                        <a:schemeClr val="tx1"/>
+                      </a:solidFill>
+                      <a:prstDash val="solid"/>
+                      <a:round/>
+                      <a:headEnd type="none" w="med" len="med"/>
+                      <a:tailEnd type="none" w="med" len="med"/>
+                    </a:lnT>
+                    <a:lnB w="12700" cap="flat" cmpd="sng" algn="ctr">
+                      <a:solidFill>
+                        <a:schemeClr val="tx1"/>
+                      </a:solidFill>
+                      <a:prstDash val="solid"/>
+                      <a:round/>
+                      <a:headEnd type="none" w="med" len="med"/>
+                      <a:tailEnd type="none" w="med" len="med"/>
+                    </a:lnB>
+                    <a:noFill/>
+                  </a:tcPr>
+                </a:tc>
+                <a:tc>
+                  <a:txBody>
+                    <a:bodyPr/>
+                    <a:lstStyle/>
+                    <a:p>
+                      <a:pPr algn="ctr"/>
+                      <a:r>
+                        <a:rPr lang="en-US" dirty="0">
+                          <a:solidFill>
+                            <a:schemeClr val="accent2">
+                              <a:lumMod val="50000"/>
+                            </a:schemeClr>
+                          </a:solidFill>
+                        </a:rPr>
                         <a:t>0.810</a:t>
                       </a:r>
                       <a:endParaRPr lang="ru-RU" dirty="0">
@@ -7732,7 +8512,7 @@
                   </a:ext>
                 </a:extLst>
               </a:tr>
-              <a:tr h="370840">
+              <a:tr h="370926">
                 <a:tc>
                   <a:txBody>
                     <a:bodyPr/>
@@ -7816,15 +8596,8 @@
                             </a:schemeClr>
                           </a:solidFill>
                         </a:rPr>
-                        <a:t>0.69046</a:t>
+                        <a:t>0.28278</a:t>
                       </a:r>
-                      <a:endParaRPr lang="ru-RU" dirty="0">
-                        <a:solidFill>
-                          <a:schemeClr val="accent2">
-                            <a:lumMod val="50000"/>
-                          </a:schemeClr>
-                        </a:solidFill>
-                      </a:endParaRPr>
                     </a:p>
                   </a:txBody>
                   <a:tcPr>
@@ -7960,6 +8733,76 @@
                             </a:schemeClr>
                           </a:solidFill>
                         </a:rPr>
+                        <a:t>0.78801</a:t>
+                      </a:r>
+                      <a:endParaRPr lang="ru-RU" dirty="0">
+                        <a:solidFill>
+                          <a:schemeClr val="accent2">
+                            <a:lumMod val="50000"/>
+                          </a:schemeClr>
+                        </a:solidFill>
+                      </a:endParaRPr>
+                    </a:p>
+                  </a:txBody>
+                  <a:tcPr>
+                    <a:lnL w="12700" cap="flat" cmpd="sng" algn="ctr">
+                      <a:solidFill>
+                        <a:schemeClr val="tx1"/>
+                      </a:solidFill>
+                      <a:prstDash val="solid"/>
+                      <a:round/>
+                      <a:headEnd type="none" w="med" len="med"/>
+                      <a:tailEnd type="none" w="med" len="med"/>
+                    </a:lnL>
+                    <a:lnR w="12700" cap="flat" cmpd="sng" algn="ctr">
+                      <a:solidFill>
+                        <a:schemeClr val="tx1"/>
+                      </a:solidFill>
+                      <a:prstDash val="solid"/>
+                      <a:round/>
+                      <a:headEnd type="none" w="med" len="med"/>
+                      <a:tailEnd type="none" w="med" len="med"/>
+                    </a:lnR>
+                    <a:lnT w="12700" cap="flat" cmpd="sng" algn="ctr">
+                      <a:solidFill>
+                        <a:schemeClr val="tx1"/>
+                      </a:solidFill>
+                      <a:prstDash val="solid"/>
+                      <a:round/>
+                      <a:headEnd type="none" w="med" len="med"/>
+                      <a:tailEnd type="none" w="med" len="med"/>
+                    </a:lnT>
+                    <a:lnB w="12700" cap="flat" cmpd="sng" algn="ctr">
+                      <a:solidFill>
+                        <a:schemeClr val="tx1"/>
+                      </a:solidFill>
+                      <a:prstDash val="solid"/>
+                      <a:round/>
+                      <a:headEnd type="none" w="med" len="med"/>
+                      <a:tailEnd type="none" w="med" len="med"/>
+                    </a:lnB>
+                    <a:solidFill>
+                      <a:schemeClr val="accent2">
+                        <a:lumMod val="20000"/>
+                        <a:lumOff val="80000"/>
+                      </a:schemeClr>
+                    </a:solidFill>
+                  </a:tcPr>
+                </a:tc>
+                <a:tc>
+                  <a:txBody>
+                    <a:bodyPr/>
+                    <a:lstStyle/>
+                    <a:p>
+                      <a:pPr algn="ctr"/>
+                      <a:r>
+                        <a:rPr lang="en-US" dirty="0">
+                          <a:solidFill>
+                            <a:schemeClr val="accent2">
+                              <a:lumMod val="50000"/>
+                            </a:schemeClr>
+                          </a:solidFill>
+                        </a:rPr>
                         <a:t>0.81114</a:t>
                       </a:r>
                       <a:endParaRPr lang="ru-RU" dirty="0">
@@ -8026,60 +8869,6 @@
           </a:graphicData>
         </a:graphic>
       </p:graphicFrame>
-      <p:sp>
-        <p:nvSpPr>
-          <p:cNvPr id="10" name="Правая фигурная скобка 9">
-            <a:extLst>
-              <a:ext uri="{FF2B5EF4-FFF2-40B4-BE49-F238E27FC236}">
-                <a16:creationId xmlns:a16="http://schemas.microsoft.com/office/drawing/2014/main" id="{441F8DFA-D55A-4404-A1AC-076914CAD0E2}"/>
-              </a:ext>
-            </a:extLst>
-          </p:cNvPr>
-          <p:cNvSpPr/>
-          <p:nvPr/>
-        </p:nvSpPr>
-        <p:spPr>
-          <a:xfrm rot="16200000">
-            <a:off x="8317585" y="-61350"/>
-            <a:ext cx="294552" cy="6312021"/>
-          </a:xfrm>
-          <a:prstGeom prst="rightBrace">
-            <a:avLst>
-              <a:gd name="adj1" fmla="val 8333"/>
-              <a:gd name="adj2" fmla="val 50247"/>
-            </a:avLst>
-          </a:prstGeom>
-          <a:ln w="28575">
-            <a:solidFill>
-              <a:schemeClr val="accent2">
-                <a:lumMod val="50000"/>
-              </a:schemeClr>
-            </a:solidFill>
-          </a:ln>
-        </p:spPr>
-        <p:style>
-          <a:lnRef idx="1">
-            <a:schemeClr val="dk1"/>
-          </a:lnRef>
-          <a:fillRef idx="0">
-            <a:schemeClr val="dk1"/>
-          </a:fillRef>
-          <a:effectRef idx="0">
-            <a:schemeClr val="dk1"/>
-          </a:effectRef>
-          <a:fontRef idx="minor">
-            <a:schemeClr val="tx1"/>
-          </a:fontRef>
-        </p:style>
-        <p:txBody>
-          <a:bodyPr rtlCol="0" anchor="ctr"/>
-          <a:lstStyle/>
-          <a:p>
-            <a:pPr algn="ctr"/>
-            <a:endParaRPr lang="ru-RU" b="1" dirty="0"/>
-          </a:p>
-        </p:txBody>
-      </p:sp>
       <p:pic>
         <p:nvPicPr>
           <p:cNvPr id="12" name="Рисунок 11" descr="Кубок">
@@ -8095,13 +8884,13 @@
           <p:nvPr/>
         </p:nvPicPr>
         <p:blipFill>
-          <a:blip r:embed="rId3">
+          <a:blip r:embed="rId5">
             <a:extLst>
               <a:ext uri="{28A0092B-C50C-407E-A947-70E740481C1C}">
                 <a14:useLocalDpi xmlns:a14="http://schemas.microsoft.com/office/drawing/2010/main" val="0"/>
               </a:ext>
               <a:ext uri="{96DAC541-7B7A-43D3-8B79-37D633B846F1}">
-                <asvg:svgBlip xmlns:asvg="http://schemas.microsoft.com/office/drawing/2016/SVG/main" r:embed="rId4"/>
+                <asvg:svgBlip xmlns:asvg="http://schemas.microsoft.com/office/drawing/2016/SVG/main" r:embed="rId6"/>
               </a:ext>
             </a:extLst>
           </a:blip>
@@ -8111,7 +8900,7 @@
         </p:blipFill>
         <p:spPr>
           <a:xfrm>
-            <a:off x="10486008" y="4509122"/>
+            <a:off x="9425442" y="4330818"/>
             <a:ext cx="914400" cy="914400"/>
           </a:xfrm>
           <a:prstGeom prst="rect">
@@ -8119,189 +8908,6 @@
           </a:prstGeom>
         </p:spPr>
       </p:pic>
-      <p:grpSp>
-        <p:nvGrpSpPr>
-          <p:cNvPr id="11" name="Group 10">
-            <a:extLst>
-              <a:ext uri="{FF2B5EF4-FFF2-40B4-BE49-F238E27FC236}">
-                <a16:creationId xmlns:a16="http://schemas.microsoft.com/office/drawing/2014/main" id="{7C85486B-326F-453D-8DA9-A05F922474DB}"/>
-              </a:ext>
-            </a:extLst>
-          </p:cNvPr>
-          <p:cNvGrpSpPr/>
-          <p:nvPr/>
-        </p:nvGrpSpPr>
-        <p:grpSpPr>
-          <a:xfrm>
-            <a:off x="9270085" y="5572637"/>
-            <a:ext cx="2350787" cy="954581"/>
-            <a:chOff x="6549053" y="5594173"/>
-            <a:chExt cx="2350787" cy="954581"/>
-          </a:xfrm>
-        </p:grpSpPr>
-        <p:pic>
-          <p:nvPicPr>
-            <p:cNvPr id="5" name="Picture 4">
-              <a:extLst>
-                <a:ext uri="{FF2B5EF4-FFF2-40B4-BE49-F238E27FC236}">
-                  <a16:creationId xmlns:a16="http://schemas.microsoft.com/office/drawing/2014/main" id="{5EE66C92-85AF-4BA9-A9E9-C9D07009C57E}"/>
-                </a:ext>
-              </a:extLst>
-            </p:cNvPr>
-            <p:cNvPicPr>
-              <a:picLocks noChangeAspect="1"/>
-            </p:cNvPicPr>
-            <p:nvPr/>
-          </p:nvPicPr>
-          <p:blipFill>
-            <a:blip r:embed="rId5"/>
-            <a:stretch>
-              <a:fillRect/>
-            </a:stretch>
-          </p:blipFill>
-          <p:spPr>
-            <a:xfrm>
-              <a:off x="6549053" y="5594173"/>
-              <a:ext cx="2350787" cy="954581"/>
-            </a:xfrm>
-            <a:prstGeom prst="rect">
-              <a:avLst/>
-            </a:prstGeom>
-          </p:spPr>
-        </p:pic>
-        <p:pic>
-          <p:nvPicPr>
-            <p:cNvPr id="3" name="Picture 2">
-              <a:extLst>
-                <a:ext uri="{FF2B5EF4-FFF2-40B4-BE49-F238E27FC236}">
-                  <a16:creationId xmlns:a16="http://schemas.microsoft.com/office/drawing/2014/main" id="{CFC83A9D-82AD-4E0D-802F-506D829A8A7A}"/>
-                </a:ext>
-              </a:extLst>
-            </p:cNvPr>
-            <p:cNvPicPr>
-              <a:picLocks noChangeAspect="1"/>
-            </p:cNvPicPr>
-            <p:nvPr/>
-          </p:nvPicPr>
-          <p:blipFill>
-            <a:blip r:embed="rId6"/>
-            <a:stretch>
-              <a:fillRect/>
-            </a:stretch>
-          </p:blipFill>
-          <p:spPr>
-            <a:xfrm>
-              <a:off x="6666498" y="5913563"/>
-              <a:ext cx="1917728" cy="549349"/>
-            </a:xfrm>
-            <a:prstGeom prst="rect">
-              <a:avLst/>
-            </a:prstGeom>
-          </p:spPr>
-        </p:pic>
-        <p:sp>
-          <p:nvSpPr>
-            <p:cNvPr id="8" name="TextBox 7">
-              <a:extLst>
-                <a:ext uri="{FF2B5EF4-FFF2-40B4-BE49-F238E27FC236}">
-                  <a16:creationId xmlns:a16="http://schemas.microsoft.com/office/drawing/2014/main" id="{ED0D3E3E-D402-458A-9333-A756EC7DF9FD}"/>
-                </a:ext>
-              </a:extLst>
-            </p:cNvPr>
-            <p:cNvSpPr txBox="1"/>
-            <p:nvPr/>
-          </p:nvSpPr>
-          <p:spPr>
-            <a:xfrm>
-              <a:off x="6666499" y="5671698"/>
-              <a:ext cx="1917727" cy="523220"/>
-            </a:xfrm>
-            <a:prstGeom prst="rect">
-              <a:avLst/>
-            </a:prstGeom>
-            <a:solidFill>
-              <a:schemeClr val="bg1"/>
-            </a:solidFill>
-          </p:spPr>
-          <p:txBody>
-            <a:bodyPr wrap="square" rtlCol="0">
-              <a:spAutoFit/>
-            </a:bodyPr>
-            <a:lstStyle/>
-            <a:p>
-              <a:r>
-                <a:rPr lang="ru-RU" sz="1400" dirty="0">
-                  <a:solidFill>
-                    <a:schemeClr val="accent2">
-                      <a:lumMod val="50000"/>
-                    </a:schemeClr>
-                  </a:solidFill>
-                </a:rPr>
-                <a:t>Для сравнения</a:t>
-              </a:r>
-              <a:r>
-                <a:rPr lang="de-DE" sz="1400" dirty="0">
-                  <a:solidFill>
-                    <a:schemeClr val="accent2">
-                      <a:lumMod val="50000"/>
-                    </a:schemeClr>
-                  </a:solidFill>
-                </a:rPr>
-                <a:t> </a:t>
-              </a:r>
-              <a:r>
-                <a:rPr lang="ru-RU" sz="1400" dirty="0">
-                  <a:solidFill>
-                    <a:schemeClr val="accent2">
-                      <a:lumMod val="50000"/>
-                    </a:schemeClr>
-                  </a:solidFill>
-                </a:rPr>
-                <a:t>:</a:t>
-              </a:r>
-            </a:p>
-            <a:p>
-              <a:r>
-                <a:rPr lang="de-DE" sz="1400" dirty="0" err="1">
-                  <a:solidFill>
-                    <a:schemeClr val="accent2">
-                      <a:lumMod val="50000"/>
-                    </a:schemeClr>
-                  </a:solidFill>
-                </a:rPr>
-                <a:t>kaggle</a:t>
-              </a:r>
-              <a:r>
-                <a:rPr lang="de-DE" sz="1400" dirty="0">
-                  <a:solidFill>
-                    <a:schemeClr val="accent2">
-                      <a:lumMod val="50000"/>
-                    </a:schemeClr>
-                  </a:solidFill>
-                </a:rPr>
-                <a:t> </a:t>
-              </a:r>
-              <a:r>
-                <a:rPr lang="de-DE" sz="1400" dirty="0" err="1">
-                  <a:solidFill>
-                    <a:schemeClr val="accent2">
-                      <a:lumMod val="50000"/>
-                    </a:schemeClr>
-                  </a:solidFill>
-                </a:rPr>
-                <a:t>leader</a:t>
-              </a:r>
-              <a:endParaRPr lang="ru-RU" sz="1400" dirty="0">
-                <a:solidFill>
-                  <a:schemeClr val="accent2">
-                    <a:lumMod val="50000"/>
-                  </a:schemeClr>
-                </a:solidFill>
-              </a:endParaRPr>
-            </a:p>
-          </p:txBody>
-        </p:sp>
-      </p:grpSp>
     </p:spTree>
     <p:extLst>
       <p:ext uri="{BB962C8B-B14F-4D97-AF65-F5344CB8AC3E}">
@@ -8607,6 +9213,66 @@
               <a:buChar char="ü"/>
             </a:pPr>
             <a:r>
+              <a:rPr lang="en-US" dirty="0" err="1">
+                <a:solidFill>
+                  <a:schemeClr val="accent2">
+                    <a:lumMod val="50000"/>
+                  </a:schemeClr>
+                </a:solidFill>
+              </a:rPr>
+              <a:t>kNN</a:t>
+            </a:r>
+            <a:r>
+              <a:rPr lang="en-US" dirty="0">
+                <a:solidFill>
+                  <a:schemeClr val="accent2">
+                    <a:lumMod val="50000"/>
+                  </a:schemeClr>
+                </a:solidFill>
+              </a:rPr>
+              <a:t>, </a:t>
+            </a:r>
+            <a:r>
+              <a:rPr lang="en-US" dirty="0" err="1">
+                <a:solidFill>
+                  <a:schemeClr val="accent2">
+                    <a:lumMod val="50000"/>
+                  </a:schemeClr>
+                </a:solidFill>
+              </a:rPr>
+              <a:t>NaiveBayes</a:t>
+            </a:r>
+            <a:r>
+              <a:rPr lang="en-US" dirty="0">
+                <a:solidFill>
+                  <a:schemeClr val="accent2">
+                    <a:lumMod val="50000"/>
+                  </a:schemeClr>
+                </a:solidFill>
+              </a:rPr>
+              <a:t>, </a:t>
+            </a:r>
+            <a:r>
+              <a:rPr lang="en-US" dirty="0" err="1">
+                <a:solidFill>
+                  <a:schemeClr val="accent2">
+                    <a:lumMod val="50000"/>
+                  </a:schemeClr>
+                </a:solidFill>
+              </a:rPr>
+              <a:t>RandomForest</a:t>
+            </a:r>
+            <a:r>
+              <a:rPr lang="en-US" dirty="0">
+                <a:solidFill>
+                  <a:schemeClr val="accent2">
+                    <a:lumMod val="50000"/>
+                  </a:schemeClr>
+                </a:solidFill>
+              </a:rPr>
+              <a:t> </a:t>
+            </a:r>
+            <a:r>
               <a:rPr lang="ru-RU" dirty="0">
                 <a:solidFill>
                   <a:schemeClr val="accent2">
@@ -8614,7 +9280,17 @@
                   </a:schemeClr>
                 </a:solidFill>
               </a:rPr>
-              <a:t>Более сложные из протестированных моделей </a:t>
+              <a:t>не показали высоких результатов. </a:t>
+            </a:r>
+            <a:r>
+              <a:rPr lang="en-US" dirty="0" err="1">
+                <a:solidFill>
+                  <a:schemeClr val="accent2">
+                    <a:lumMod val="50000"/>
+                  </a:schemeClr>
+                </a:solidFill>
+              </a:rPr>
+              <a:t>LogisticRegression</a:t>
             </a:r>
             <a:r>
               <a:rPr lang="en-US" dirty="0">
@@ -8624,17 +9300,57 @@
                   </a:schemeClr>
                 </a:solidFill>
               </a:rPr>
-              <a:t>- </a:t>
-            </a:r>
-            <a:r>
-              <a:rPr lang="en-US" dirty="0" err="1">
-                <a:solidFill>
-                  <a:schemeClr val="accent2">
-                    <a:lumMod val="50000"/>
-                  </a:schemeClr>
-                </a:solidFill>
-              </a:rPr>
-              <a:t>RandomForest</a:t>
+              <a:t> </a:t>
+            </a:r>
+            <a:r>
+              <a:rPr lang="ru-RU" dirty="0">
+                <a:solidFill>
+                  <a:schemeClr val="accent2">
+                    <a:lumMod val="50000"/>
+                  </a:schemeClr>
+                </a:solidFill>
+              </a:rPr>
+              <a:t>и </a:t>
+            </a:r>
+            <a:r>
+              <a:rPr lang="ru-RU" dirty="0" err="1">
+                <a:solidFill>
+                  <a:schemeClr val="accent2">
+                    <a:lumMod val="50000"/>
+                  </a:schemeClr>
+                </a:solidFill>
+              </a:rPr>
+              <a:t>бустинги</a:t>
+            </a:r>
+            <a:r>
+              <a:rPr lang="ru-RU" dirty="0">
+                <a:solidFill>
+                  <a:schemeClr val="accent2">
+                    <a:lumMod val="50000"/>
+                  </a:schemeClr>
+                </a:solidFill>
+              </a:rPr>
+              <a:t> оказались более эффективными в работе с </a:t>
+            </a:r>
+            <a:r>
+              <a:rPr lang="ru-RU" dirty="0" err="1">
+                <a:solidFill>
+                  <a:schemeClr val="accent2">
+                    <a:lumMod val="50000"/>
+                  </a:schemeClr>
+                </a:solidFill>
+              </a:rPr>
+              <a:t>датасетом</a:t>
+            </a:r>
+            <a:r>
+              <a:rPr lang="ru-RU" dirty="0">
+                <a:solidFill>
+                  <a:schemeClr val="accent2">
+                    <a:lumMod val="50000"/>
+                  </a:schemeClr>
+                </a:solidFill>
+              </a:rPr>
+              <a:t>, а наилучшее качество продемонстрировал </a:t>
             </a:r>
             <a:r>
               <a:rPr lang="en-US" dirty="0">
@@ -8644,98 +9360,15 @@
                   </a:schemeClr>
                 </a:solidFill>
               </a:rPr>
-              <a:t>, </a:t>
-            </a:r>
-            <a:r>
-              <a:rPr lang="en-US" dirty="0" err="1">
-                <a:solidFill>
-                  <a:schemeClr val="accent2">
-                    <a:lumMod val="50000"/>
-                  </a:schemeClr>
-                </a:solidFill>
-              </a:rPr>
-              <a:t>Catboost</a:t>
-            </a:r>
-            <a:r>
-              <a:rPr lang="en-US" dirty="0">
-                <a:solidFill>
-                  <a:schemeClr val="accent2">
-                    <a:lumMod val="50000"/>
-                  </a:schemeClr>
-                </a:solidFill>
-              </a:rPr>
-              <a:t> - </a:t>
-            </a:r>
-            <a:r>
-              <a:rPr lang="ru-RU" dirty="0">
-                <a:solidFill>
-                  <a:schemeClr val="accent2">
-                    <a:lumMod val="50000"/>
-                  </a:schemeClr>
-                </a:solidFill>
-              </a:rPr>
-              <a:t>оказались менее эффективными в работе с </a:t>
-            </a:r>
-            <a:r>
-              <a:rPr lang="ru-RU" dirty="0" err="1">
-                <a:solidFill>
-                  <a:schemeClr val="accent2">
-                    <a:lumMod val="50000"/>
-                  </a:schemeClr>
-                </a:solidFill>
-              </a:rPr>
-              <a:t>датасетом</a:t>
-            </a:r>
-            <a:r>
-              <a:rPr lang="ru-RU" dirty="0">
-                <a:solidFill>
-                  <a:schemeClr val="accent2">
-                    <a:lumMod val="50000"/>
-                  </a:schemeClr>
-                </a:solidFill>
-              </a:rPr>
-              <a:t>, чем простые </a:t>
-            </a:r>
-            <a:r>
-              <a:rPr lang="en-US" dirty="0">
-                <a:solidFill>
-                  <a:schemeClr val="accent2">
-                    <a:lumMod val="50000"/>
-                  </a:schemeClr>
-                </a:solidFill>
-              </a:rPr>
-              <a:t>SVC </a:t>
-            </a:r>
-            <a:r>
-              <a:rPr lang="ru-RU" dirty="0">
-                <a:solidFill>
-                  <a:schemeClr val="accent2">
-                    <a:lumMod val="50000"/>
-                  </a:schemeClr>
-                </a:solidFill>
-              </a:rPr>
-              <a:t>и </a:t>
-            </a:r>
-            <a:r>
-              <a:rPr lang="en-US" dirty="0" err="1">
-                <a:solidFill>
-                  <a:schemeClr val="accent2">
-                    <a:lumMod val="50000"/>
-                  </a:schemeClr>
-                </a:solidFill>
-              </a:rPr>
-              <a:t>Lr</a:t>
-            </a:r>
-            <a:r>
-              <a:rPr lang="ru-RU" dirty="0">
-                <a:solidFill>
-                  <a:schemeClr val="accent2">
-                    <a:lumMod val="50000"/>
-                  </a:schemeClr>
-                </a:solidFill>
-              </a:rPr>
-              <a:t>. Возможная причина – большое количество признаков или категорий</a:t>
-            </a:r>
+              <a:t>SVC</a:t>
+            </a:r>
+            <a:endParaRPr lang="ru-RU" dirty="0">
+              <a:solidFill>
+                <a:schemeClr val="accent2">
+                  <a:lumMod val="50000"/>
+                </a:schemeClr>
+              </a:solidFill>
+            </a:endParaRPr>
           </a:p>
           <a:p>
             <a:pPr marL="342900" indent="-342900">
@@ -9097,6 +9730,15 @@
 </file>
 
 <file path=customXml/item1.xml><?xml version="1.0" encoding="utf-8"?>
+<?mso-contentType ?>
+<FormTemplates xmlns="http://schemas.microsoft.com/sharepoint/v3/contenttype/forms">
+  <Display>DocumentLibraryForm</Display>
+  <Edit>DocumentLibraryForm</Edit>
+  <New>DocumentLibraryForm</New>
+</FormTemplates>
+</file>
+
+<file path=customXml/item2.xml><?xml version="1.0" encoding="utf-8"?>
 <ct:contentTypeSchema xmlns:ct="http://schemas.microsoft.com/office/2006/metadata/contentType" xmlns:ma="http://schemas.microsoft.com/office/2006/metadata/properties/metaAttributes" ct:_="" ma:_="" ma:contentTypeName="Document" ma:contentTypeID="0x010100122A0CA4A2A2F8409DCF2765C70B4D34" ma:contentTypeVersion="13" ma:contentTypeDescription="Create a new document." ma:contentTypeScope="" ma:versionID="93d5752c5ac13a0c2e83a135c926ffed">
   <xsd:schema xmlns:xsd="http://www.w3.org/2001/XMLSchema" xmlns:xs="http://www.w3.org/2001/XMLSchema" xmlns:p="http://schemas.microsoft.com/office/2006/metadata/properties" xmlns:ns3="f07d5986-07b8-4cf7-abbe-5648f1e96b33" xmlns:ns4="ae7fafb6-85c5-4e8d-abcd-f1655374da4a" targetNamespace="http://schemas.microsoft.com/office/2006/metadata/properties" ma:root="true" ma:fieldsID="bf8b175c5edfda514c6aa2e5e2d673c5" ns3:_="" ns4:_="">
     <xsd:import namespace="f07d5986-07b8-4cf7-abbe-5648f1e96b33"/>
@@ -9319,15 +9961,6 @@
 </ct:contentTypeSchema>
 </file>
 
-<file path=customXml/item2.xml><?xml version="1.0" encoding="utf-8"?>
-<?mso-contentType ?>
-<FormTemplates xmlns="http://schemas.microsoft.com/sharepoint/v3/contenttype/forms">
-  <Display>DocumentLibraryForm</Display>
-  <Edit>DocumentLibraryForm</Edit>
-  <New>DocumentLibraryForm</New>
-</FormTemplates>
-</file>
-
 <file path=customXml/item3.xml><?xml version="1.0" encoding="utf-8"?>
 <p:properties xmlns:p="http://schemas.microsoft.com/office/2006/metadata/properties" xmlns:xsi="http://www.w3.org/2001/XMLSchema-instance" xmlns:pc="http://schemas.microsoft.com/office/infopath/2007/PartnerControls">
   <documentManagement/>
@@ -9335,6 +9968,14 @@
 </file>
 
 <file path=customXml/itemProps1.xml><?xml version="1.0" encoding="utf-8"?>
+<ds:datastoreItem xmlns:ds="http://schemas.openxmlformats.org/officeDocument/2006/customXml" ds:itemID="{15A4D5CB-5409-4A5F-BAA0-C138DD5333CA}">
+  <ds:schemaRefs>
+    <ds:schemaRef ds:uri="http://schemas.microsoft.com/sharepoint/v3/contenttype/forms"/>
+  </ds:schemaRefs>
+</ds:datastoreItem>
+</file>
+
+<file path=customXml/itemProps2.xml><?xml version="1.0" encoding="utf-8"?>
 <ds:datastoreItem xmlns:ds="http://schemas.openxmlformats.org/officeDocument/2006/customXml" ds:itemID="{70506F18-DFCF-4144-BA5C-14538EB47843}">
   <ds:schemaRefs>
     <ds:schemaRef ds:uri="http://schemas.microsoft.com/office/2006/metadata/contentType"/>
@@ -9353,14 +9994,6 @@
 </ds:datastoreItem>
 </file>
 
-<file path=customXml/itemProps2.xml><?xml version="1.0" encoding="utf-8"?>
-<ds:datastoreItem xmlns:ds="http://schemas.openxmlformats.org/officeDocument/2006/customXml" ds:itemID="{15A4D5CB-5409-4A5F-BAA0-C138DD5333CA}">
-  <ds:schemaRefs>
-    <ds:schemaRef ds:uri="http://schemas.microsoft.com/sharepoint/v3/contenttype/forms"/>
-  </ds:schemaRefs>
-</ds:datastoreItem>
-</file>
-
 <file path=customXml/itemProps3.xml><?xml version="1.0" encoding="utf-8"?>
 <ds:datastoreItem xmlns:ds="http://schemas.openxmlformats.org/officeDocument/2006/customXml" ds:itemID="{51FE3230-792D-4F78-9CBA-36B71781F45D}">
   <ds:schemaRefs>

</xml_diff>